<commit_message>
faults in presentation/praesentation.pptx removed
</commit_message>
<xml_diff>
--- a/presentation/praesentation.pptx
+++ b/presentation/praesentation.pptx
@@ -218,14 +218,14 @@
           <a:effectLst/>
           <a:extLst>
             <a:ext uri="{909E8E84-426E-40dd-AFC4-6F175D3DCCD1}">
-              <a14:hiddenFill xmlns="" xmlns:a14="http://schemas.microsoft.com/office/drawing/2010/main">
+              <a14:hiddenFill xmlns:a14="http://schemas.microsoft.com/office/drawing/2010/main" xmlns="">
                 <a:solidFill>
                   <a:schemeClr val="accent1"/>
                 </a:solidFill>
               </a14:hiddenFill>
             </a:ext>
             <a:ext uri="{91240B29-F687-4f45-9708-019B960494DF}">
-              <a14:hiddenLine xmlns="" xmlns:a14="http://schemas.microsoft.com/office/drawing/2010/main" w="9525">
+              <a14:hiddenLine xmlns:a14="http://schemas.microsoft.com/office/drawing/2010/main" xmlns="" w="9525">
                 <a:solidFill>
                   <a:schemeClr val="tx1"/>
                 </a:solidFill>
@@ -235,7 +235,7 @@
               </a14:hiddenLine>
             </a:ext>
             <a:ext uri="{AF507438-7753-43e0-B8FC-AC1667EBCBE1}">
-              <a14:hiddenEffects xmlns="" xmlns:a14="http://schemas.microsoft.com/office/drawing/2010/main">
+              <a14:hiddenEffects xmlns:a14="http://schemas.microsoft.com/office/drawing/2010/main" xmlns="">
                 <a:effectLst>
                   <a:outerShdw blurRad="63500" dist="38099" dir="2700000" algn="ctr" rotWithShape="0">
                     <a:schemeClr val="bg2">
@@ -246,7 +246,7 @@
               </a14:hiddenEffects>
             </a:ext>
             <a:ext uri="{FAA26D3D-D897-4be2-8F04-BA451C77F1D7}">
-              <ma14:placeholderFlag xmlns="" xmlns:ma14="http://schemas.microsoft.com/office/mac/drawingml/2011/main" val="1"/>
+              <ma14:placeholderFlag xmlns:ma14="http://schemas.microsoft.com/office/mac/drawingml/2011/main" xmlns="" val="1"/>
             </a:ext>
           </a:extLst>
         </p:spPr>
@@ -303,14 +303,14 @@
           <a:effectLst/>
           <a:extLst>
             <a:ext uri="{909E8E84-426E-40dd-AFC4-6F175D3DCCD1}">
-              <a14:hiddenFill xmlns="" xmlns:a14="http://schemas.microsoft.com/office/drawing/2010/main">
+              <a14:hiddenFill xmlns:a14="http://schemas.microsoft.com/office/drawing/2010/main" xmlns="">
                 <a:solidFill>
                   <a:schemeClr val="accent1"/>
                 </a:solidFill>
               </a14:hiddenFill>
             </a:ext>
             <a:ext uri="{91240B29-F687-4f45-9708-019B960494DF}">
-              <a14:hiddenLine xmlns="" xmlns:a14="http://schemas.microsoft.com/office/drawing/2010/main" w="9525">
+              <a14:hiddenLine xmlns:a14="http://schemas.microsoft.com/office/drawing/2010/main" xmlns="" w="9525">
                 <a:solidFill>
                   <a:schemeClr val="tx1"/>
                 </a:solidFill>
@@ -320,7 +320,7 @@
               </a14:hiddenLine>
             </a:ext>
             <a:ext uri="{AF507438-7753-43e0-B8FC-AC1667EBCBE1}">
-              <a14:hiddenEffects xmlns="" xmlns:a14="http://schemas.microsoft.com/office/drawing/2010/main">
+              <a14:hiddenEffects xmlns:a14="http://schemas.microsoft.com/office/drawing/2010/main" xmlns="">
                 <a:effectLst>
                   <a:outerShdw blurRad="63500" dist="38099" dir="2700000" algn="ctr" rotWithShape="0">
                     <a:schemeClr val="bg2">
@@ -331,7 +331,7 @@
               </a14:hiddenEffects>
             </a:ext>
             <a:ext uri="{FAA26D3D-D897-4be2-8F04-BA451C77F1D7}">
-              <ma14:placeholderFlag xmlns="" xmlns:ma14="http://schemas.microsoft.com/office/mac/drawingml/2011/main" val="1"/>
+              <ma14:placeholderFlag xmlns:ma14="http://schemas.microsoft.com/office/mac/drawingml/2011/main" xmlns="" val="1"/>
             </a:ext>
           </a:extLst>
         </p:spPr>
@@ -388,14 +388,14 @@
           <a:effectLst/>
           <a:extLst>
             <a:ext uri="{909E8E84-426E-40dd-AFC4-6F175D3DCCD1}">
-              <a14:hiddenFill xmlns="" xmlns:a14="http://schemas.microsoft.com/office/drawing/2010/main">
+              <a14:hiddenFill xmlns:a14="http://schemas.microsoft.com/office/drawing/2010/main" xmlns="">
                 <a:solidFill>
                   <a:schemeClr val="accent1"/>
                 </a:solidFill>
               </a14:hiddenFill>
             </a:ext>
             <a:ext uri="{91240B29-F687-4f45-9708-019B960494DF}">
-              <a14:hiddenLine xmlns="" xmlns:a14="http://schemas.microsoft.com/office/drawing/2010/main" w="9525">
+              <a14:hiddenLine xmlns:a14="http://schemas.microsoft.com/office/drawing/2010/main" xmlns="" w="9525">
                 <a:solidFill>
                   <a:schemeClr val="tx1"/>
                 </a:solidFill>
@@ -405,7 +405,7 @@
               </a14:hiddenLine>
             </a:ext>
             <a:ext uri="{AF507438-7753-43e0-B8FC-AC1667EBCBE1}">
-              <a14:hiddenEffects xmlns="" xmlns:a14="http://schemas.microsoft.com/office/drawing/2010/main">
+              <a14:hiddenEffects xmlns:a14="http://schemas.microsoft.com/office/drawing/2010/main" xmlns="">
                 <a:effectLst>
                   <a:outerShdw blurRad="63500" dist="38099" dir="2700000" algn="ctr" rotWithShape="0">
                     <a:schemeClr val="bg2">
@@ -416,7 +416,7 @@
               </a14:hiddenEffects>
             </a:ext>
             <a:ext uri="{FAA26D3D-D897-4be2-8F04-BA451C77F1D7}">
-              <ma14:placeholderFlag xmlns="" xmlns:ma14="http://schemas.microsoft.com/office/mac/drawingml/2011/main" val="1"/>
+              <ma14:placeholderFlag xmlns:ma14="http://schemas.microsoft.com/office/mac/drawingml/2011/main" xmlns="" val="1"/>
             </a:ext>
           </a:extLst>
         </p:spPr>
@@ -473,14 +473,14 @@
           <a:effectLst/>
           <a:extLst>
             <a:ext uri="{909E8E84-426E-40dd-AFC4-6F175D3DCCD1}">
-              <a14:hiddenFill xmlns="" xmlns:a14="http://schemas.microsoft.com/office/drawing/2010/main">
+              <a14:hiddenFill xmlns:a14="http://schemas.microsoft.com/office/drawing/2010/main" xmlns="">
                 <a:solidFill>
                   <a:schemeClr val="accent1"/>
                 </a:solidFill>
               </a14:hiddenFill>
             </a:ext>
             <a:ext uri="{91240B29-F687-4f45-9708-019B960494DF}">
-              <a14:hiddenLine xmlns="" xmlns:a14="http://schemas.microsoft.com/office/drawing/2010/main" w="9525">
+              <a14:hiddenLine xmlns:a14="http://schemas.microsoft.com/office/drawing/2010/main" xmlns="" w="9525">
                 <a:solidFill>
                   <a:schemeClr val="tx1"/>
                 </a:solidFill>
@@ -490,7 +490,7 @@
               </a14:hiddenLine>
             </a:ext>
             <a:ext uri="{AF507438-7753-43e0-B8FC-AC1667EBCBE1}">
-              <a14:hiddenEffects xmlns="" xmlns:a14="http://schemas.microsoft.com/office/drawing/2010/main">
+              <a14:hiddenEffects xmlns:a14="http://schemas.microsoft.com/office/drawing/2010/main" xmlns="">
                 <a:effectLst>
                   <a:outerShdw blurRad="63500" dist="38099" dir="2700000" algn="ctr" rotWithShape="0">
                     <a:schemeClr val="bg2">
@@ -501,7 +501,7 @@
               </a14:hiddenEffects>
             </a:ext>
             <a:ext uri="{FAA26D3D-D897-4be2-8F04-BA451C77F1D7}">
-              <ma14:placeholderFlag xmlns="" xmlns:ma14="http://schemas.microsoft.com/office/mac/drawingml/2011/main" val="1"/>
+              <ma14:placeholderFlag xmlns:ma14="http://schemas.microsoft.com/office/mac/drawingml/2011/main" xmlns="" val="1"/>
             </a:ext>
           </a:extLst>
         </p:spPr>
@@ -595,14 +595,14 @@
           <a:effectLst/>
           <a:extLst>
             <a:ext uri="{909E8E84-426E-40dd-AFC4-6F175D3DCCD1}">
-              <a14:hiddenFill xmlns="" xmlns:a14="http://schemas.microsoft.com/office/drawing/2010/main">
+              <a14:hiddenFill xmlns:a14="http://schemas.microsoft.com/office/drawing/2010/main" xmlns="">
                 <a:solidFill>
                   <a:schemeClr val="accent1"/>
                 </a:solidFill>
               </a14:hiddenFill>
             </a:ext>
             <a:ext uri="{91240B29-F687-4f45-9708-019B960494DF}">
-              <a14:hiddenLine xmlns="" xmlns:a14="http://schemas.microsoft.com/office/drawing/2010/main" w="9525">
+              <a14:hiddenLine xmlns:a14="http://schemas.microsoft.com/office/drawing/2010/main" xmlns="" w="9525">
                 <a:solidFill>
                   <a:schemeClr val="tx1"/>
                 </a:solidFill>
@@ -612,7 +612,7 @@
               </a14:hiddenLine>
             </a:ext>
             <a:ext uri="{AF507438-7753-43e0-B8FC-AC1667EBCBE1}">
-              <a14:hiddenEffects xmlns="" xmlns:a14="http://schemas.microsoft.com/office/drawing/2010/main">
+              <a14:hiddenEffects xmlns:a14="http://schemas.microsoft.com/office/drawing/2010/main" xmlns="">
                 <a:effectLst>
                   <a:outerShdw blurRad="63500" dist="38099" dir="2700000" algn="ctr" rotWithShape="0">
                     <a:schemeClr val="bg2">
@@ -623,7 +623,7 @@
               </a14:hiddenEffects>
             </a:ext>
             <a:ext uri="{FAA26D3D-D897-4be2-8F04-BA451C77F1D7}">
-              <ma14:placeholderFlag xmlns="" xmlns:ma14="http://schemas.microsoft.com/office/mac/drawingml/2011/main" val="1"/>
+              <ma14:placeholderFlag xmlns:ma14="http://schemas.microsoft.com/office/mac/drawingml/2011/main" xmlns="" val="1"/>
             </a:ext>
           </a:extLst>
         </p:spPr>
@@ -680,14 +680,14 @@
           <a:effectLst/>
           <a:extLst>
             <a:ext uri="{909E8E84-426E-40dd-AFC4-6F175D3DCCD1}">
-              <a14:hiddenFill xmlns="" xmlns:a14="http://schemas.microsoft.com/office/drawing/2010/main">
+              <a14:hiddenFill xmlns:a14="http://schemas.microsoft.com/office/drawing/2010/main" xmlns="">
                 <a:solidFill>
                   <a:schemeClr val="accent1"/>
                 </a:solidFill>
               </a14:hiddenFill>
             </a:ext>
             <a:ext uri="{91240B29-F687-4f45-9708-019B960494DF}">
-              <a14:hiddenLine xmlns="" xmlns:a14="http://schemas.microsoft.com/office/drawing/2010/main" w="9525">
+              <a14:hiddenLine xmlns:a14="http://schemas.microsoft.com/office/drawing/2010/main" xmlns="" w="9525">
                 <a:solidFill>
                   <a:schemeClr val="tx1"/>
                 </a:solidFill>
@@ -697,7 +697,7 @@
               </a14:hiddenLine>
             </a:ext>
             <a:ext uri="{AF507438-7753-43e0-B8FC-AC1667EBCBE1}">
-              <a14:hiddenEffects xmlns="" xmlns:a14="http://schemas.microsoft.com/office/drawing/2010/main">
+              <a14:hiddenEffects xmlns:a14="http://schemas.microsoft.com/office/drawing/2010/main" xmlns="">
                 <a:effectLst>
                   <a:outerShdw blurRad="63500" dist="38099" dir="2700000" algn="ctr" rotWithShape="0">
                     <a:schemeClr val="bg2">
@@ -708,7 +708,7 @@
               </a14:hiddenEffects>
             </a:ext>
             <a:ext uri="{FAA26D3D-D897-4be2-8F04-BA451C77F1D7}">
-              <ma14:placeholderFlag xmlns="" xmlns:ma14="http://schemas.microsoft.com/office/mac/drawingml/2011/main" val="1"/>
+              <ma14:placeholderFlag xmlns:ma14="http://schemas.microsoft.com/office/mac/drawingml/2011/main" xmlns="" val="1"/>
             </a:ext>
           </a:extLst>
         </p:spPr>
@@ -770,7 +770,7 @@
           <a:effectLst/>
           <a:extLst>
             <a:ext uri="{AF507438-7753-43e0-B8FC-AC1667EBCBE1}">
-              <a14:hiddenEffects xmlns="" xmlns:a14="http://schemas.microsoft.com/office/drawing/2010/main">
+              <a14:hiddenEffects xmlns:a14="http://schemas.microsoft.com/office/drawing/2010/main" xmlns="">
                 <a:effectLst>
                   <a:outerShdw blurRad="63500" dist="38099" dir="2700000" algn="ctr" rotWithShape="0">
                     <a:srgbClr val="000000">
@@ -781,7 +781,7 @@
               </a14:hiddenEffects>
             </a:ext>
             <a:ext uri="{53640926-AAD7-44d8-BBD7-CCE9431645EC}">
-              <a14:shadowObscured xmlns="" xmlns:a14="http://schemas.microsoft.com/office/drawing/2010/main" val="1"/>
+              <a14:shadowObscured xmlns:a14="http://schemas.microsoft.com/office/drawing/2010/main" xmlns="" val="1"/>
             </a:ext>
           </a:extLst>
         </p:spPr>
@@ -811,14 +811,14 @@
           <a:effectLst/>
           <a:extLst>
             <a:ext uri="{909E8E84-426E-40dd-AFC4-6F175D3DCCD1}">
-              <a14:hiddenFill xmlns="" xmlns:a14="http://schemas.microsoft.com/office/drawing/2010/main">
+              <a14:hiddenFill xmlns:a14="http://schemas.microsoft.com/office/drawing/2010/main" xmlns="">
                 <a:solidFill>
                   <a:schemeClr val="accent1"/>
                 </a:solidFill>
               </a14:hiddenFill>
             </a:ext>
             <a:ext uri="{91240B29-F687-4f45-9708-019B960494DF}">
-              <a14:hiddenLine xmlns="" xmlns:a14="http://schemas.microsoft.com/office/drawing/2010/main" w="9525">
+              <a14:hiddenLine xmlns:a14="http://schemas.microsoft.com/office/drawing/2010/main" xmlns="" w="9525">
                 <a:solidFill>
                   <a:schemeClr val="tx1"/>
                 </a:solidFill>
@@ -828,7 +828,7 @@
               </a14:hiddenLine>
             </a:ext>
             <a:ext uri="{AF507438-7753-43e0-B8FC-AC1667EBCBE1}">
-              <a14:hiddenEffects xmlns="" xmlns:a14="http://schemas.microsoft.com/office/drawing/2010/main">
+              <a14:hiddenEffects xmlns:a14="http://schemas.microsoft.com/office/drawing/2010/main" xmlns="">
                 <a:effectLst>
                   <a:outerShdw blurRad="63500" dist="38099" dir="2700000" algn="ctr" rotWithShape="0">
                     <a:schemeClr val="bg2">
@@ -839,7 +839,7 @@
               </a14:hiddenEffects>
             </a:ext>
             <a:ext uri="{FAA26D3D-D897-4be2-8F04-BA451C77F1D7}">
-              <ma14:placeholderFlag xmlns="" xmlns:ma14="http://schemas.microsoft.com/office/mac/drawingml/2011/main" val="1"/>
+              <ma14:placeholderFlag xmlns:ma14="http://schemas.microsoft.com/office/mac/drawingml/2011/main" xmlns="" val="1"/>
             </a:ext>
           </a:extLst>
         </p:spPr>
@@ -912,14 +912,14 @@
           <a:effectLst/>
           <a:extLst>
             <a:ext uri="{909E8E84-426E-40dd-AFC4-6F175D3DCCD1}">
-              <a14:hiddenFill xmlns="" xmlns:a14="http://schemas.microsoft.com/office/drawing/2010/main">
+              <a14:hiddenFill xmlns:a14="http://schemas.microsoft.com/office/drawing/2010/main" xmlns="">
                 <a:solidFill>
                   <a:schemeClr val="accent1"/>
                 </a:solidFill>
               </a14:hiddenFill>
             </a:ext>
             <a:ext uri="{91240B29-F687-4f45-9708-019B960494DF}">
-              <a14:hiddenLine xmlns="" xmlns:a14="http://schemas.microsoft.com/office/drawing/2010/main" w="9525">
+              <a14:hiddenLine xmlns:a14="http://schemas.microsoft.com/office/drawing/2010/main" xmlns="" w="9525">
                 <a:solidFill>
                   <a:schemeClr val="tx1"/>
                 </a:solidFill>
@@ -929,7 +929,7 @@
               </a14:hiddenLine>
             </a:ext>
             <a:ext uri="{AF507438-7753-43e0-B8FC-AC1667EBCBE1}">
-              <a14:hiddenEffects xmlns="" xmlns:a14="http://schemas.microsoft.com/office/drawing/2010/main">
+              <a14:hiddenEffects xmlns:a14="http://schemas.microsoft.com/office/drawing/2010/main" xmlns="">
                 <a:effectLst>
                   <a:outerShdw blurRad="63500" dist="38099" dir="2700000" algn="ctr" rotWithShape="0">
                     <a:schemeClr val="bg2">
@@ -940,7 +940,7 @@
               </a14:hiddenEffects>
             </a:ext>
             <a:ext uri="{FAA26D3D-D897-4be2-8F04-BA451C77F1D7}">
-              <ma14:placeholderFlag xmlns="" xmlns:ma14="http://schemas.microsoft.com/office/mac/drawingml/2011/main" val="1"/>
+              <ma14:placeholderFlag xmlns:ma14="http://schemas.microsoft.com/office/mac/drawingml/2011/main" xmlns="" val="1"/>
             </a:ext>
           </a:extLst>
         </p:spPr>
@@ -997,14 +997,14 @@
           <a:effectLst/>
           <a:extLst>
             <a:ext uri="{909E8E84-426E-40dd-AFC4-6F175D3DCCD1}">
-              <a14:hiddenFill xmlns="" xmlns:a14="http://schemas.microsoft.com/office/drawing/2010/main">
+              <a14:hiddenFill xmlns:a14="http://schemas.microsoft.com/office/drawing/2010/main" xmlns="">
                 <a:solidFill>
                   <a:schemeClr val="accent1"/>
                 </a:solidFill>
               </a14:hiddenFill>
             </a:ext>
             <a:ext uri="{91240B29-F687-4f45-9708-019B960494DF}">
-              <a14:hiddenLine xmlns="" xmlns:a14="http://schemas.microsoft.com/office/drawing/2010/main" w="9525">
+              <a14:hiddenLine xmlns:a14="http://schemas.microsoft.com/office/drawing/2010/main" xmlns="" w="9525">
                 <a:solidFill>
                   <a:schemeClr val="tx1"/>
                 </a:solidFill>
@@ -1014,7 +1014,7 @@
               </a14:hiddenLine>
             </a:ext>
             <a:ext uri="{AF507438-7753-43e0-B8FC-AC1667EBCBE1}">
-              <a14:hiddenEffects xmlns="" xmlns:a14="http://schemas.microsoft.com/office/drawing/2010/main">
+              <a14:hiddenEffects xmlns:a14="http://schemas.microsoft.com/office/drawing/2010/main" xmlns="">
                 <a:effectLst>
                   <a:outerShdw blurRad="63500" dist="38099" dir="2700000" algn="ctr" rotWithShape="0">
                     <a:schemeClr val="bg2">
@@ -1025,7 +1025,7 @@
               </a14:hiddenEffects>
             </a:ext>
             <a:ext uri="{FAA26D3D-D897-4be2-8F04-BA451C77F1D7}">
-              <ma14:placeholderFlag xmlns="" xmlns:ma14="http://schemas.microsoft.com/office/mac/drawingml/2011/main" val="1"/>
+              <ma14:placeholderFlag xmlns:ma14="http://schemas.microsoft.com/office/mac/drawingml/2011/main" xmlns="" val="1"/>
             </a:ext>
           </a:extLst>
         </p:spPr>
@@ -1248,12 +1248,12 @@
           <a:effectLst/>
           <a:extLst>
             <a:ext uri="{909E8E84-426E-40dd-AFC4-6F175D3DCCD1}">
-              <a14:hiddenFill xmlns="" xmlns:a14="http://schemas.microsoft.com/office/drawing/2010/main">
+              <a14:hiddenFill xmlns:a14="http://schemas.microsoft.com/office/drawing/2010/main" xmlns="">
                 <a:noFill/>
               </a14:hiddenFill>
             </a:ext>
             <a:ext uri="{AF507438-7753-43e0-B8FC-AC1667EBCBE1}">
-              <a14:hiddenEffects xmlns="" xmlns:a14="http://schemas.microsoft.com/office/drawing/2010/main">
+              <a14:hiddenEffects xmlns:a14="http://schemas.microsoft.com/office/drawing/2010/main" xmlns="">
                 <a:effectLst>
                   <a:outerShdw blurRad="63500" dist="38099" dir="2700000" algn="ctr" rotWithShape="0">
                     <a:schemeClr val="bg2">
@@ -1307,12 +1307,12 @@
           <a:effectLst/>
           <a:extLst>
             <a:ext uri="{909E8E84-426E-40dd-AFC4-6F175D3DCCD1}">
-              <a14:hiddenFill xmlns="" xmlns:a14="http://schemas.microsoft.com/office/drawing/2010/main">
+              <a14:hiddenFill xmlns:a14="http://schemas.microsoft.com/office/drawing/2010/main" xmlns="">
                 <a:noFill/>
               </a14:hiddenFill>
             </a:ext>
             <a:ext uri="{AF507438-7753-43e0-B8FC-AC1667EBCBE1}">
-              <a14:hiddenEffects xmlns="" xmlns:a14="http://schemas.microsoft.com/office/drawing/2010/main">
+              <a14:hiddenEffects xmlns:a14="http://schemas.microsoft.com/office/drawing/2010/main" xmlns="">
                 <a:effectLst>
                   <a:outerShdw blurRad="63500" dist="38099" dir="2700000" algn="ctr" rotWithShape="0">
                     <a:schemeClr val="bg2">
@@ -1402,7 +1402,7 @@
         </p:nvSpPr>
         <p:spPr bwMode="auto">
           <a:xfrm>
-            <a:off x="1546225" y="4257675"/>
+            <a:off x="250155" y="4221088"/>
             <a:ext cx="6842125" cy="2140138"/>
           </a:xfrm>
           <a:prstGeom prst="rect">
@@ -1415,14 +1415,14 @@
           <a:effectLst/>
           <a:extLst>
             <a:ext uri="{909E8E84-426E-40dd-AFC4-6F175D3DCCD1}">
-              <a14:hiddenFill xmlns="" xmlns:a14="http://schemas.microsoft.com/office/drawing/2010/main">
+              <a14:hiddenFill xmlns:a14="http://schemas.microsoft.com/office/drawing/2010/main" xmlns="">
                 <a:solidFill>
                   <a:schemeClr val="accent1"/>
                 </a:solidFill>
               </a14:hiddenFill>
             </a:ext>
             <a:ext uri="{91240B29-F687-4f45-9708-019B960494DF}">
-              <a14:hiddenLine xmlns="" xmlns:a14="http://schemas.microsoft.com/office/drawing/2010/main" w="9525">
+              <a14:hiddenLine xmlns:a14="http://schemas.microsoft.com/office/drawing/2010/main" xmlns="" w="9525">
                 <a:solidFill>
                   <a:schemeClr val="tx1"/>
                 </a:solidFill>
@@ -1432,7 +1432,7 @@
               </a14:hiddenLine>
             </a:ext>
             <a:ext uri="{AF507438-7753-43e0-B8FC-AC1667EBCBE1}">
-              <a14:hiddenEffects xmlns="" xmlns:a14="http://schemas.microsoft.com/office/drawing/2010/main">
+              <a14:hiddenEffects xmlns:a14="http://schemas.microsoft.com/office/drawing/2010/main" xmlns="">
                 <a:effectLst>
                   <a:outerShdw blurRad="63500" dist="38099" dir="2700000" algn="ctr" rotWithShape="0">
                     <a:schemeClr val="bg2">
@@ -1575,15 +1575,6 @@
           </a:p>
           <a:p>
             <a:pPr eaLnBrk="1" hangingPunct="1"/>
-            <a:endParaRPr lang="en-US" altLang="de-DE" sz="1600" dirty="0" smtClean="0">
-              <a:solidFill>
-                <a:schemeClr val="bg1"/>
-              </a:solidFill>
-              <a:latin typeface="Univers Light" pitchFamily="-84" charset="0"/>
-            </a:endParaRPr>
-          </a:p>
-          <a:p>
-            <a:pPr eaLnBrk="1" hangingPunct="1"/>
             <a:endParaRPr lang="en-US" altLang="de-DE" sz="1600" dirty="0">
               <a:solidFill>
                 <a:schemeClr val="bg1"/>
@@ -1593,9 +1584,46 @@
           </a:p>
           <a:p>
             <a:pPr eaLnBrk="1" hangingPunct="1"/>
-            <a:endParaRPr lang="en-US" altLang="de-DE" sz="1600" dirty="0">
+            <a:r>
+              <a:rPr lang="de-DE" altLang="de-DE" sz="1600" dirty="0" smtClean="0">
+                <a:solidFill>
+                  <a:schemeClr val="bg1"/>
+                </a:solidFill>
+                <a:latin typeface="Univers Light" pitchFamily="-84" charset="0"/>
+              </a:rPr>
+              <a:t>Tobias </a:t>
+            </a:r>
+            <a:r>
+              <a:rPr lang="de-DE" altLang="de-DE" sz="1600" dirty="0" smtClean="0">
+                <a:solidFill>
+                  <a:schemeClr val="bg1"/>
+                </a:solidFill>
+                <a:latin typeface="Univers Light" pitchFamily="-84" charset="0"/>
+              </a:rPr>
+              <a:t>Frust (</a:t>
+            </a:r>
+            <a:r>
+              <a:rPr lang="de-DE" altLang="de-DE" sz="1600" dirty="0" smtClean="0">
+                <a:solidFill>
+                  <a:schemeClr val="bg1"/>
+                </a:solidFill>
+                <a:latin typeface="Univers Light" pitchFamily="-84" charset="0"/>
+                <a:hlinkClick r:id="rId4"/>
+              </a:rPr>
+              <a:t>tobias.frust@mailbox.tu-dresden.de</a:t>
+            </a:r>
+            <a:r>
+              <a:rPr lang="de-DE" altLang="de-DE" sz="1600" dirty="0" smtClean="0">
+                <a:solidFill>
+                  <a:schemeClr val="bg1"/>
+                </a:solidFill>
+                <a:latin typeface="Univers Light" pitchFamily="-84" charset="0"/>
+              </a:rPr>
+              <a:t>)</a:t>
+            </a:r>
+            <a:endParaRPr lang="de-DE" altLang="de-DE" sz="1600" dirty="0" smtClean="0">
               <a:solidFill>
-                <a:schemeClr val="bg1"/>
+                <a:srgbClr val="FFFFFF"/>
               </a:solidFill>
               <a:latin typeface="Univers Light" pitchFamily="-84" charset="0"/>
             </a:endParaRPr>
@@ -1605,22 +1633,83 @@
             <a:r>
               <a:rPr lang="de-DE" altLang="de-DE" sz="1600" dirty="0" smtClean="0">
                 <a:solidFill>
+                  <a:srgbClr val="FFFFFF"/>
+                </a:solidFill>
+                <a:latin typeface="Univers Light" pitchFamily="-84" charset="0"/>
+              </a:rPr>
+              <a:t>Tutor:</a:t>
+            </a:r>
+            <a:r>
+              <a:rPr lang="de-DE" altLang="de-DE" sz="1600" baseline="0" dirty="0" smtClean="0">
+                <a:solidFill>
+                  <a:srgbClr val="FFFFFF"/>
+                </a:solidFill>
+                <a:latin typeface="Univers Light" pitchFamily="-84" charset="0"/>
+              </a:rPr>
+              <a:t> Ronny Brendel (</a:t>
+            </a:r>
+            <a:r>
+              <a:rPr lang="de-DE" altLang="de-DE" sz="1600" baseline="0" dirty="0" smtClean="0">
+                <a:solidFill>
+                  <a:srgbClr val="FFFFFF"/>
+                </a:solidFill>
+                <a:latin typeface="Univers Light" pitchFamily="-84" charset="0"/>
+                <a:hlinkClick r:id="rId5"/>
+              </a:rPr>
+              <a:t>ronny.brendel@tu-dresden.de</a:t>
+            </a:r>
+            <a:r>
+              <a:rPr lang="de-DE" altLang="de-DE" sz="1600" baseline="0" dirty="0" smtClean="0">
+                <a:solidFill>
+                  <a:srgbClr val="FFFFFF"/>
+                </a:solidFill>
+                <a:latin typeface="Univers Light" pitchFamily="-84" charset="0"/>
+              </a:rPr>
+              <a:t>)</a:t>
+            </a:r>
+          </a:p>
+          <a:p>
+            <a:pPr eaLnBrk="1" hangingPunct="1"/>
+            <a:r>
+              <a:rPr lang="de-DE" altLang="de-DE" sz="1600" baseline="0" dirty="0" smtClean="0">
+                <a:solidFill>
+                  <a:srgbClr val="FFFFFF"/>
+                </a:solidFill>
+                <a:latin typeface="Univers Light" pitchFamily="-84" charset="0"/>
+              </a:rPr>
+              <a:t>17th </a:t>
+            </a:r>
+            <a:r>
+              <a:rPr lang="de-DE" altLang="de-DE" sz="1600" baseline="0" dirty="0" err="1" smtClean="0">
+                <a:solidFill>
+                  <a:srgbClr val="FFFFFF"/>
+                </a:solidFill>
+                <a:latin typeface="Univers Light" pitchFamily="-84" charset="0"/>
+              </a:rPr>
+              <a:t>July</a:t>
+            </a:r>
+            <a:r>
+              <a:rPr lang="de-DE" altLang="de-DE" sz="1600" baseline="0" dirty="0" smtClean="0">
+                <a:solidFill>
+                  <a:srgbClr val="FFFFFF"/>
+                </a:solidFill>
+                <a:latin typeface="Univers Light" pitchFamily="-84" charset="0"/>
+              </a:rPr>
+              <a:t>, 2015</a:t>
+            </a:r>
+            <a:r>
+              <a:rPr lang="de-DE" altLang="de-DE" sz="1600" baseline="0" dirty="0" smtClean="0">
+                <a:solidFill>
                   <a:schemeClr val="bg1"/>
                 </a:solidFill>
                 <a:latin typeface="Univers Light" pitchFamily="-84" charset="0"/>
               </a:rPr>
-              <a:t>Tobias, Frust (tobias.frust@mailbox.tu-dresden.de</a:t>
-            </a:r>
-            <a:r>
-              <a:rPr lang="de-DE" altLang="de-DE" sz="1600" dirty="0">
-                <a:solidFill>
-                  <a:schemeClr val="bg1"/>
-                </a:solidFill>
-                <a:latin typeface="Univers Light" pitchFamily="-84" charset="0"/>
-              </a:rPr>
-              <a:t>)</a:t>
-            </a:r>
-            <a:endParaRPr lang="de-DE" altLang="de-DE" sz="1600" dirty="0">
+              <a:t> </a:t>
+            </a:r>
+            <a:endParaRPr lang="de-DE" altLang="de-DE" sz="1600" baseline="0" dirty="0" smtClean="0">
+              <a:solidFill>
+                <a:srgbClr val="FFFFFF"/>
+              </a:solidFill>
               <a:latin typeface="Univers Light" pitchFamily="-84" charset="0"/>
             </a:endParaRPr>
           </a:p>
@@ -1717,14 +1806,14 @@
           </a:xfrm>
           <a:extLst>
             <a:ext uri="{909E8E84-426E-40dd-AFC4-6F175D3DCCD1}">
-              <a14:hiddenFill xmlns="" xmlns:a14="http://schemas.microsoft.com/office/drawing/2010/main">
+              <a14:hiddenFill xmlns:a14="http://schemas.microsoft.com/office/drawing/2010/main" xmlns="">
                 <a:solidFill>
                   <a:schemeClr val="accent1"/>
                 </a:solidFill>
               </a14:hiddenFill>
             </a:ext>
             <a:ext uri="{91240B29-F687-4f45-9708-019B960494DF}">
-              <a14:hiddenLine xmlns="" xmlns:a14="http://schemas.microsoft.com/office/drawing/2010/main" w="9525">
+              <a14:hiddenLine xmlns:a14="http://schemas.microsoft.com/office/drawing/2010/main" xmlns="" w="9525">
                 <a:solidFill>
                   <a:schemeClr val="tx1"/>
                 </a:solidFill>
@@ -1734,7 +1823,7 @@
               </a14:hiddenLine>
             </a:ext>
             <a:ext uri="{AF507438-7753-43e0-B8FC-AC1667EBCBE1}">
-              <a14:hiddenEffects xmlns="" xmlns:a14="http://schemas.microsoft.com/office/drawing/2010/main">
+              <a14:hiddenEffects xmlns:a14="http://schemas.microsoft.com/office/drawing/2010/main" xmlns="">
                 <a:effectLst>
                   <a:outerShdw blurRad="63500" dist="38099" dir="2700000" algn="ctr" rotWithShape="0">
                     <a:schemeClr val="bg2">
@@ -1745,7 +1834,7 @@
               </a14:hiddenEffects>
             </a:ext>
             <a:ext uri="{FAA26D3D-D897-4be2-8F04-BA451C77F1D7}">
-              <ma14:placeholderFlag xmlns="" xmlns:ma14="http://schemas.microsoft.com/office/mac/drawingml/2011/main" val="1"/>
+              <ma14:placeholderFlag xmlns:ma14="http://schemas.microsoft.com/office/mac/drawingml/2011/main" xmlns="" val="1"/>
             </a:ext>
           </a:extLst>
         </p:spPr>
@@ -3787,14 +3876,14 @@
           <a:effectLst/>
           <a:extLst>
             <a:ext uri="{909E8E84-426E-40dd-AFC4-6F175D3DCCD1}">
-              <a14:hiddenFill xmlns="" xmlns:a14="http://schemas.microsoft.com/office/drawing/2010/main">
+              <a14:hiddenFill xmlns:a14="http://schemas.microsoft.com/office/drawing/2010/main" xmlns="">
                 <a:solidFill>
                   <a:schemeClr val="accent1"/>
                 </a:solidFill>
               </a14:hiddenFill>
             </a:ext>
             <a:ext uri="{91240B29-F687-4f45-9708-019B960494DF}">
-              <a14:hiddenLine xmlns="" xmlns:a14="http://schemas.microsoft.com/office/drawing/2010/main" w="9525">
+              <a14:hiddenLine xmlns:a14="http://schemas.microsoft.com/office/drawing/2010/main" xmlns="" w="9525">
                 <a:solidFill>
                   <a:schemeClr val="tx1"/>
                 </a:solidFill>
@@ -3804,7 +3893,7 @@
               </a14:hiddenLine>
             </a:ext>
             <a:ext uri="{AF507438-7753-43e0-B8FC-AC1667EBCBE1}">
-              <a14:hiddenEffects xmlns="" xmlns:a14="http://schemas.microsoft.com/office/drawing/2010/main">
+              <a14:hiddenEffects xmlns:a14="http://schemas.microsoft.com/office/drawing/2010/main" xmlns="">
                 <a:effectLst>
                   <a:outerShdw blurRad="63500" dist="38099" dir="2700000" algn="ctr" rotWithShape="0">
                     <a:schemeClr val="bg2">
@@ -3815,7 +3904,7 @@
               </a14:hiddenEffects>
             </a:ext>
             <a:ext uri="{FAA26D3D-D897-4be2-8F04-BA451C77F1D7}">
-              <ma14:placeholderFlag xmlns="" xmlns:ma14="http://schemas.microsoft.com/office/mac/drawingml/2011/main" val="1"/>
+              <ma14:placeholderFlag xmlns:ma14="http://schemas.microsoft.com/office/mac/drawingml/2011/main" xmlns="" val="1"/>
             </a:ext>
           </a:extLst>
         </p:spPr>
@@ -3930,14 +4019,14 @@
           <a:effectLst/>
           <a:extLst>
             <a:ext uri="{909E8E84-426E-40dd-AFC4-6F175D3DCCD1}">
-              <a14:hiddenFill xmlns="" xmlns:a14="http://schemas.microsoft.com/office/drawing/2010/main">
+              <a14:hiddenFill xmlns:a14="http://schemas.microsoft.com/office/drawing/2010/main" xmlns="">
                 <a:solidFill>
                   <a:schemeClr val="accent1"/>
                 </a:solidFill>
               </a14:hiddenFill>
             </a:ext>
             <a:ext uri="{91240B29-F687-4f45-9708-019B960494DF}">
-              <a14:hiddenLine xmlns="" xmlns:a14="http://schemas.microsoft.com/office/drawing/2010/main" w="9525">
+              <a14:hiddenLine xmlns:a14="http://schemas.microsoft.com/office/drawing/2010/main" xmlns="" w="9525">
                 <a:solidFill>
                   <a:schemeClr val="tx1"/>
                 </a:solidFill>
@@ -3947,7 +4036,7 @@
               </a14:hiddenLine>
             </a:ext>
             <a:ext uri="{AF507438-7753-43e0-B8FC-AC1667EBCBE1}">
-              <a14:hiddenEffects xmlns="" xmlns:a14="http://schemas.microsoft.com/office/drawing/2010/main">
+              <a14:hiddenEffects xmlns:a14="http://schemas.microsoft.com/office/drawing/2010/main" xmlns="">
                 <a:effectLst>
                   <a:outerShdw blurRad="63500" dist="38099" dir="2700000" algn="ctr" rotWithShape="0">
                     <a:schemeClr val="bg2">
@@ -3958,7 +4047,7 @@
               </a14:hiddenEffects>
             </a:ext>
             <a:ext uri="{FAA26D3D-D897-4be2-8F04-BA451C77F1D7}">
-              <ma14:placeholderFlag xmlns="" xmlns:ma14="http://schemas.microsoft.com/office/mac/drawingml/2011/main" val="1"/>
+              <ma14:placeholderFlag xmlns:ma14="http://schemas.microsoft.com/office/mac/drawingml/2011/main" xmlns="" val="1"/>
             </a:ext>
           </a:extLst>
         </p:spPr>
@@ -4003,14 +4092,14 @@
           <a:effectLst/>
           <a:extLst>
             <a:ext uri="{909E8E84-426E-40dd-AFC4-6F175D3DCCD1}">
-              <a14:hiddenFill xmlns="" xmlns:a14="http://schemas.microsoft.com/office/drawing/2010/main">
+              <a14:hiddenFill xmlns:a14="http://schemas.microsoft.com/office/drawing/2010/main" xmlns="">
                 <a:solidFill>
                   <a:schemeClr val="accent1"/>
                 </a:solidFill>
               </a14:hiddenFill>
             </a:ext>
             <a:ext uri="{91240B29-F687-4f45-9708-019B960494DF}">
-              <a14:hiddenLine xmlns="" xmlns:a14="http://schemas.microsoft.com/office/drawing/2010/main" w="9525">
+              <a14:hiddenLine xmlns:a14="http://schemas.microsoft.com/office/drawing/2010/main" xmlns="" w="9525">
                 <a:solidFill>
                   <a:schemeClr val="tx1"/>
                 </a:solidFill>
@@ -4020,7 +4109,7 @@
               </a14:hiddenLine>
             </a:ext>
             <a:ext uri="{AF507438-7753-43e0-B8FC-AC1667EBCBE1}">
-              <a14:hiddenEffects xmlns="" xmlns:a14="http://schemas.microsoft.com/office/drawing/2010/main">
+              <a14:hiddenEffects xmlns:a14="http://schemas.microsoft.com/office/drawing/2010/main" xmlns="">
                 <a:effectLst>
                   <a:outerShdw blurRad="63500" dist="38099" dir="2700000" algn="ctr" rotWithShape="0">
                     <a:schemeClr val="bg2">
@@ -4031,7 +4120,7 @@
               </a14:hiddenEffects>
             </a:ext>
             <a:ext uri="{FAA26D3D-D897-4be2-8F04-BA451C77F1D7}">
-              <ma14:placeholderFlag xmlns="" xmlns:ma14="http://schemas.microsoft.com/office/mac/drawingml/2011/main" val="1"/>
+              <ma14:placeholderFlag xmlns:ma14="http://schemas.microsoft.com/office/mac/drawingml/2011/main" xmlns="" val="1"/>
             </a:ext>
           </a:extLst>
         </p:spPr>
@@ -4546,14 +4635,14 @@
           <a:effectLst/>
           <a:extLst>
             <a:ext uri="{909E8E84-426E-40dd-AFC4-6F175D3DCCD1}">
-              <a14:hiddenFill xmlns="" xmlns:a14="http://schemas.microsoft.com/office/drawing/2010/main">
+              <a14:hiddenFill xmlns:a14="http://schemas.microsoft.com/office/drawing/2010/main" xmlns="">
                 <a:solidFill>
                   <a:schemeClr val="accent1"/>
                 </a:solidFill>
               </a14:hiddenFill>
             </a:ext>
             <a:ext uri="{91240B29-F687-4f45-9708-019B960494DF}">
-              <a14:hiddenLine xmlns="" xmlns:a14="http://schemas.microsoft.com/office/drawing/2010/main" w="9525">
+              <a14:hiddenLine xmlns:a14="http://schemas.microsoft.com/office/drawing/2010/main" xmlns="" w="9525">
                 <a:solidFill>
                   <a:schemeClr val="tx1"/>
                 </a:solidFill>
@@ -4563,7 +4652,7 @@
               </a14:hiddenLine>
             </a:ext>
             <a:ext uri="{AF507438-7753-43e0-B8FC-AC1667EBCBE1}">
-              <a14:hiddenEffects xmlns="" xmlns:a14="http://schemas.microsoft.com/office/drawing/2010/main">
+              <a14:hiddenEffects xmlns:a14="http://schemas.microsoft.com/office/drawing/2010/main" xmlns="">
                 <a:effectLst>
                   <a:outerShdw blurRad="63500" dist="38099" dir="2700000" algn="ctr" rotWithShape="0">
                     <a:schemeClr val="bg2">
@@ -4691,7 +4780,7 @@
               </a:spcBef>
             </a:pPr>
             <a:r>
-              <a:rPr lang="de-DE" altLang="de-DE" sz="1100" b="1">
+              <a:rPr lang="de-DE" altLang="de-DE" sz="1100" b="1" dirty="0">
                 <a:solidFill>
                   <a:schemeClr val="bg1"/>
                 </a:solidFill>
@@ -4714,14 +4803,14 @@
         <p:spPr>
           <a:extLst>
             <a:ext uri="{909E8E84-426E-40dd-AFC4-6F175D3DCCD1}">
-              <a14:hiddenFill xmlns="" xmlns:a14="http://schemas.microsoft.com/office/drawing/2010/main">
+              <a14:hiddenFill xmlns:a14="http://schemas.microsoft.com/office/drawing/2010/main" xmlns="">
                 <a:solidFill>
                   <a:schemeClr val="accent1"/>
                 </a:solidFill>
               </a14:hiddenFill>
             </a:ext>
             <a:ext uri="{91240B29-F687-4f45-9708-019B960494DF}">
-              <a14:hiddenLine xmlns="" xmlns:a14="http://schemas.microsoft.com/office/drawing/2010/main" w="9525">
+              <a14:hiddenLine xmlns:a14="http://schemas.microsoft.com/office/drawing/2010/main" xmlns="" w="9525">
                 <a:solidFill>
                   <a:schemeClr val="tx1"/>
                 </a:solidFill>
@@ -4731,7 +4820,7 @@
               </a14:hiddenLine>
             </a:ext>
             <a:ext uri="{AF507438-7753-43e0-B8FC-AC1667EBCBE1}">
-              <a14:hiddenEffects xmlns="" xmlns:a14="http://schemas.microsoft.com/office/drawing/2010/main">
+              <a14:hiddenEffects xmlns:a14="http://schemas.microsoft.com/office/drawing/2010/main" xmlns="">
                 <a:effectLst>
                   <a:outerShdw blurRad="63500" dist="38099" dir="2700000" algn="ctr" rotWithShape="0">
                     <a:schemeClr val="bg2">
@@ -4742,7 +4831,7 @@
               </a14:hiddenEffects>
             </a:ext>
             <a:ext uri="{FAA26D3D-D897-4be2-8F04-BA451C77F1D7}">
-              <ma14:placeholderFlag xmlns="" xmlns:ma14="http://schemas.microsoft.com/office/mac/drawingml/2011/main" val="1"/>
+              <ma14:placeholderFlag xmlns:ma14="http://schemas.microsoft.com/office/mac/drawingml/2011/main" xmlns="" val="1"/>
             </a:ext>
           </a:extLst>
         </p:spPr>
@@ -4755,20 +4844,28 @@
             </a:pPr>
             <a:r>
               <a:rPr lang="en-US" dirty="0" err="1" smtClean="0"/>
-              <a:t>Adapteva</a:t>
-            </a:r>
-            <a:r>
-              <a:rPr lang="en-US" dirty="0" smtClean="0"/>
-              <a:t> </a:t>
-            </a:r>
-            <a:r>
-              <a:rPr lang="en-US" dirty="0" err="1" smtClean="0"/>
-              <a:t>Parallela</a:t>
-            </a:r>
-            <a:r>
-              <a:rPr lang="en-US" dirty="0" smtClean="0"/>
-              <a:t>:</a:t>
-            </a:r>
+              <a:t>Hauptseminar</a:t>
+            </a:r>
+            <a:r>
+              <a:rPr lang="en-US" sz="3200" dirty="0" smtClean="0"/>
+              <a:t/>
+            </a:r>
+            <a:br>
+              <a:rPr lang="en-US" sz="3200" dirty="0" smtClean="0"/>
+            </a:br>
+            <a:r>
+              <a:rPr lang="en-US" sz="3200" dirty="0" err="1" smtClean="0"/>
+              <a:t>Rechnerarchitektur</a:t>
+            </a:r>
+            <a:r>
+              <a:rPr lang="en-US" sz="3200" dirty="0" smtClean="0"/>
+              <a:t> und </a:t>
+            </a:r>
+            <a:r>
+              <a:rPr lang="en-US" sz="3200" dirty="0" err="1" smtClean="0"/>
+              <a:t>Programmierung</a:t>
+            </a:r>
+            <a:endParaRPr lang="en-US" sz="3200" dirty="0" smtClean="0"/>
           </a:p>
         </p:txBody>
       </p:sp>
@@ -4783,16 +4880,20 @@
           </p:nvPr>
         </p:nvSpPr>
         <p:spPr>
+          <a:xfrm>
+            <a:off x="323850" y="3717081"/>
+            <a:ext cx="8496300" cy="1008063"/>
+          </a:xfrm>
           <a:extLst>
             <a:ext uri="{909E8E84-426E-40dd-AFC4-6F175D3DCCD1}">
-              <a14:hiddenFill xmlns="" xmlns:a14="http://schemas.microsoft.com/office/drawing/2010/main">
+              <a14:hiddenFill xmlns:a14="http://schemas.microsoft.com/office/drawing/2010/main" xmlns="">
                 <a:solidFill>
                   <a:schemeClr val="accent1"/>
                 </a:solidFill>
               </a14:hiddenFill>
             </a:ext>
             <a:ext uri="{91240B29-F687-4f45-9708-019B960494DF}">
-              <a14:hiddenLine xmlns="" xmlns:a14="http://schemas.microsoft.com/office/drawing/2010/main" w="9525">
+              <a14:hiddenLine xmlns:a14="http://schemas.microsoft.com/office/drawing/2010/main" xmlns="" w="9525">
                 <a:solidFill>
                   <a:schemeClr val="tx1"/>
                 </a:solidFill>
@@ -4802,7 +4903,7 @@
               </a14:hiddenLine>
             </a:ext>
             <a:ext uri="{AF507438-7753-43e0-B8FC-AC1667EBCBE1}">
-              <a14:hiddenEffects xmlns="" xmlns:a14="http://schemas.microsoft.com/office/drawing/2010/main">
+              <a14:hiddenEffects xmlns:a14="http://schemas.microsoft.com/office/drawing/2010/main" xmlns="">
                 <a:effectLst>
                   <a:outerShdw blurRad="63500" dist="38099" dir="2700000" algn="ctr" rotWithShape="0">
                     <a:schemeClr val="bg2">
@@ -4813,7 +4914,7 @@
               </a14:hiddenEffects>
             </a:ext>
             <a:ext uri="{FAA26D3D-D897-4be2-8F04-BA451C77F1D7}">
-              <ma14:placeholderFlag xmlns="" xmlns:ma14="http://schemas.microsoft.com/office/mac/drawingml/2011/main" val="1"/>
+              <ma14:placeholderFlag xmlns:ma14="http://schemas.microsoft.com/office/mac/drawingml/2011/main" xmlns="" val="1"/>
             </a:ext>
           </a:extLst>
         </p:spPr>
@@ -4825,9 +4926,36 @@
               <a:defRPr/>
             </a:pPr>
             <a:r>
+              <a:rPr lang="en-US" dirty="0" err="1" smtClean="0"/>
+              <a:t>Adapteva</a:t>
+            </a:r>
+            <a:r>
               <a:rPr lang="en-US" dirty="0" smtClean="0"/>
+              <a:t> </a:t>
+            </a:r>
+            <a:r>
+              <a:rPr lang="en-US" dirty="0" err="1" smtClean="0"/>
+              <a:t>Parallella</a:t>
+            </a:r>
+            <a:r>
+              <a:rPr lang="en-US" dirty="0" smtClean="0"/>
+              <a:t>:</a:t>
+            </a:r>
+          </a:p>
+          <a:p>
+            <a:pPr marL="0" indent="0">
+              <a:defRPr/>
+            </a:pPr>
+            <a:r>
+              <a:rPr lang="en-US" dirty="0"/>
               <a:t>Crowd-funded Low-budget Open-source HPC</a:t>
             </a:r>
+          </a:p>
+          <a:p>
+            <a:pPr marL="0" indent="0" eaLnBrk="1" hangingPunct="1">
+              <a:defRPr/>
+            </a:pPr>
+            <a:endParaRPr lang="en-US" dirty="0" smtClean="0"/>
           </a:p>
         </p:txBody>
       </p:sp>
@@ -4937,13 +5065,19 @@
               <a:rPr lang="en-US" altLang="de-DE" dirty="0" err="1" smtClean="0">
                 <a:latin typeface="Univers Light" pitchFamily="-84" charset="0"/>
               </a:rPr>
-              <a:t>Parallela</a:t>
+              <a:t>Parallella</a:t>
             </a:r>
             <a:r>
               <a:rPr lang="en-US" altLang="de-DE" dirty="0" smtClean="0">
                 <a:latin typeface="Univers Light" pitchFamily="-84" charset="0"/>
               </a:rPr>
-              <a:t> Platform</a:t>
+              <a:t> </a:t>
+            </a:r>
+            <a:r>
+              <a:rPr lang="en-US" altLang="de-DE" dirty="0" smtClean="0">
+                <a:latin typeface="Univers Light" pitchFamily="-84" charset="0"/>
+              </a:rPr>
+              <a:t>Platform</a:t>
             </a:r>
           </a:p>
           <a:p>
@@ -4955,10 +5089,16 @@
               <a:t>Company history of </a:t>
             </a:r>
             <a:r>
+              <a:rPr lang="en-US" altLang="de-DE" dirty="0" err="1">
+                <a:latin typeface="Univers Light" pitchFamily="-84" charset="0"/>
+              </a:rPr>
+              <a:t>A</a:t>
+            </a:r>
+            <a:r>
               <a:rPr lang="en-US" altLang="de-DE" dirty="0" err="1" smtClean="0">
                 <a:latin typeface="Univers Light" pitchFamily="-84" charset="0"/>
               </a:rPr>
-              <a:t>adapteva</a:t>
+              <a:t>dapteva</a:t>
             </a:r>
             <a:endParaRPr lang="en-US" altLang="de-DE" dirty="0" smtClean="0">
               <a:latin typeface="Univers Light" pitchFamily="-84" charset="0"/>
@@ -4970,13 +5110,19 @@
               <a:rPr lang="en-US" altLang="de-DE" dirty="0" err="1" smtClean="0">
                 <a:latin typeface="Univers Light" pitchFamily="-84" charset="0"/>
               </a:rPr>
-              <a:t>Parallela</a:t>
+              <a:t>Parallella</a:t>
             </a:r>
             <a:r>
               <a:rPr lang="en-US" altLang="de-DE" dirty="0" smtClean="0">
                 <a:latin typeface="Univers Light" pitchFamily="-84" charset="0"/>
               </a:rPr>
-              <a:t> board</a:t>
+              <a:t> </a:t>
+            </a:r>
+            <a:r>
+              <a:rPr lang="en-US" altLang="de-DE" dirty="0" smtClean="0">
+                <a:latin typeface="Univers Light" pitchFamily="-84" charset="0"/>
+              </a:rPr>
+              <a:t>board</a:t>
             </a:r>
           </a:p>
           <a:p>
@@ -5058,14 +5204,14 @@
           <a:effectLst/>
           <a:extLst>
             <a:ext uri="{909E8E84-426E-40dd-AFC4-6F175D3DCCD1}">
-              <a14:hiddenFill xmlns="" xmlns:a14="http://schemas.microsoft.com/office/drawing/2010/main">
+              <a14:hiddenFill xmlns:a14="http://schemas.microsoft.com/office/drawing/2010/main" xmlns="">
                 <a:solidFill>
                   <a:schemeClr val="accent1"/>
                 </a:solidFill>
               </a14:hiddenFill>
             </a:ext>
             <a:ext uri="{91240B29-F687-4f45-9708-019B960494DF}">
-              <a14:hiddenLine xmlns="" xmlns:a14="http://schemas.microsoft.com/office/drawing/2010/main" w="9525">
+              <a14:hiddenLine xmlns:a14="http://schemas.microsoft.com/office/drawing/2010/main" xmlns="" w="9525">
                 <a:solidFill>
                   <a:schemeClr val="tx1"/>
                 </a:solidFill>
@@ -5075,7 +5221,7 @@
               </a14:hiddenLine>
             </a:ext>
             <a:ext uri="{AF507438-7753-43e0-B8FC-AC1667EBCBE1}">
-              <a14:hiddenEffects xmlns="" xmlns:a14="http://schemas.microsoft.com/office/drawing/2010/main">
+              <a14:hiddenEffects xmlns:a14="http://schemas.microsoft.com/office/drawing/2010/main" xmlns="">
                 <a:effectLst>
                   <a:outerShdw blurRad="63500" dist="38099" dir="2700000" algn="ctr" rotWithShape="0">
                     <a:schemeClr val="bg2">
@@ -5331,13 +5477,16 @@
               <a:rPr lang="en-US" altLang="de-DE" dirty="0" smtClean="0">
                 <a:latin typeface="Univers Light" pitchFamily="-84" charset="0"/>
               </a:rPr>
-              <a:t> of  Epiphany-III product (65nm</a:t>
-            </a:r>
+              <a:t> of  Epiphany-III product (65nm)</a:t>
+            </a:r>
+          </a:p>
+          <a:p>
+            <a:pPr lvl="1"/>
             <a:r>
               <a:rPr lang="en-US" altLang="de-DE" dirty="0" smtClean="0">
                 <a:latin typeface="Univers Light" pitchFamily="-84" charset="0"/>
               </a:rPr>
-              <a:t>)</a:t>
+              <a:t>May 2011: Sampled Epiphany-III (65nm) product</a:t>
             </a:r>
           </a:p>
           <a:p>
@@ -5346,7 +5495,19 @@
               <a:rPr lang="en-US" altLang="de-DE" dirty="0" smtClean="0">
                 <a:latin typeface="Univers Light" pitchFamily="-84" charset="0"/>
               </a:rPr>
-              <a:t>May 2011: Sampled Epiphany-III (65nm) product</a:t>
+              <a:t>Aug 2012: Demonstration of 50 </a:t>
+            </a:r>
+            <a:r>
+              <a:rPr lang="en-US" altLang="de-DE" dirty="0" smtClean="0">
+                <a:latin typeface="Univers Light" pitchFamily="-84" charset="0"/>
+              </a:rPr>
+              <a:t>GFLOPS/Watt </a:t>
+            </a:r>
+            <a:r>
+              <a:rPr lang="en-US" altLang="de-DE" dirty="0" smtClean="0">
+                <a:latin typeface="Univers Light" pitchFamily="-84" charset="0"/>
+              </a:rPr>
+              <a:t>efficiency at 28nm</a:t>
             </a:r>
           </a:p>
           <a:p>
@@ -5355,22 +5516,13 @@
               <a:rPr lang="en-US" altLang="de-DE" dirty="0" smtClean="0">
                 <a:latin typeface="Univers Light" pitchFamily="-84" charset="0"/>
               </a:rPr>
-              <a:t>Aug 2012: Demonstration of 50 GFLOPS/WATT efficiency at 28nm</a:t>
-            </a:r>
-          </a:p>
-          <a:p>
-            <a:pPr lvl="1"/>
-            <a:r>
-              <a:rPr lang="en-US" altLang="de-DE" dirty="0" smtClean="0">
-                <a:latin typeface="Univers Light" pitchFamily="-84" charset="0"/>
-              </a:rPr>
               <a:t>Oct 2012: Launch of </a:t>
             </a:r>
             <a:r>
               <a:rPr lang="en-US" altLang="de-DE" dirty="0" err="1" smtClean="0">
                 <a:latin typeface="Univers Light" pitchFamily="-84" charset="0"/>
               </a:rPr>
-              <a:t>Parallela</a:t>
+              <a:t>Parallella</a:t>
             </a:r>
             <a:r>
               <a:rPr lang="en-US" altLang="de-DE" dirty="0" smtClean="0">
@@ -5406,13 +5558,19 @@
               <a:rPr lang="en-US" altLang="de-DE" dirty="0" err="1" smtClean="0">
                 <a:latin typeface="Univers Light" pitchFamily="-84" charset="0"/>
               </a:rPr>
-              <a:t>Parallela</a:t>
+              <a:t>Parallella</a:t>
             </a:r>
             <a:r>
               <a:rPr lang="en-US" altLang="de-DE" dirty="0" smtClean="0">
                 <a:latin typeface="Univers Light" pitchFamily="-84" charset="0"/>
               </a:rPr>
-              <a:t> prototypes</a:t>
+              <a:t> </a:t>
+            </a:r>
+            <a:r>
+              <a:rPr lang="en-US" altLang="de-DE" dirty="0" smtClean="0">
+                <a:latin typeface="Univers Light" pitchFamily="-84" charset="0"/>
+              </a:rPr>
+              <a:t>prototypes</a:t>
             </a:r>
           </a:p>
           <a:p>
@@ -5427,13 +5585,25 @@
               <a:rPr lang="en-US" altLang="de-DE" dirty="0" err="1" smtClean="0">
                 <a:latin typeface="Univers Light" pitchFamily="-84" charset="0"/>
               </a:rPr>
-              <a:t>parallela</a:t>
+              <a:t>P</a:t>
+            </a:r>
+            <a:r>
+              <a:rPr lang="en-US" altLang="de-DE" dirty="0" err="1" smtClean="0">
+                <a:latin typeface="Univers Light" pitchFamily="-84" charset="0"/>
+              </a:rPr>
+              <a:t>arallella</a:t>
             </a:r>
             <a:r>
               <a:rPr lang="en-US" altLang="de-DE" dirty="0" smtClean="0">
                 <a:latin typeface="Univers Light" pitchFamily="-84" charset="0"/>
               </a:rPr>
-              <a:t> boards shipped to Kickstarter backers</a:t>
+              <a:t> </a:t>
+            </a:r>
+            <a:r>
+              <a:rPr lang="en-US" altLang="de-DE" dirty="0" smtClean="0">
+                <a:latin typeface="Univers Light" pitchFamily="-84" charset="0"/>
+              </a:rPr>
+              <a:t>boards shipped to Kickstarter backers</a:t>
             </a:r>
           </a:p>
           <a:p>
@@ -5448,13 +5618,19 @@
               <a:rPr lang="en-US" altLang="de-DE" dirty="0" err="1" smtClean="0">
                 <a:latin typeface="Univers Light" pitchFamily="-84" charset="0"/>
               </a:rPr>
-              <a:t>Parallela</a:t>
+              <a:t>Parallella</a:t>
             </a:r>
             <a:r>
               <a:rPr lang="en-US" altLang="de-DE" dirty="0" smtClean="0">
                 <a:latin typeface="Univers Light" pitchFamily="-84" charset="0"/>
               </a:rPr>
-              <a:t> boards to </a:t>
+              <a:t> </a:t>
+            </a:r>
+            <a:r>
+              <a:rPr lang="en-US" altLang="de-DE" dirty="0" smtClean="0">
+                <a:latin typeface="Univers Light" pitchFamily="-84" charset="0"/>
+              </a:rPr>
+              <a:t>boards to </a:t>
             </a:r>
             <a:r>
               <a:rPr lang="en-US" altLang="de-DE" dirty="0">
@@ -5502,14 +5678,14 @@
           <a:effectLst/>
           <a:extLst>
             <a:ext uri="{909E8E84-426E-40dd-AFC4-6F175D3DCCD1}">
-              <a14:hiddenFill xmlns="" xmlns:a14="http://schemas.microsoft.com/office/drawing/2010/main">
+              <a14:hiddenFill xmlns:a14="http://schemas.microsoft.com/office/drawing/2010/main" xmlns="">
                 <a:solidFill>
                   <a:schemeClr val="accent1"/>
                 </a:solidFill>
               </a14:hiddenFill>
             </a:ext>
             <a:ext uri="{91240B29-F687-4f45-9708-019B960494DF}">
-              <a14:hiddenLine xmlns="" xmlns:a14="http://schemas.microsoft.com/office/drawing/2010/main" w="9525">
+              <a14:hiddenLine xmlns:a14="http://schemas.microsoft.com/office/drawing/2010/main" xmlns="" w="9525">
                 <a:solidFill>
                   <a:schemeClr val="tx1"/>
                 </a:solidFill>
@@ -5519,7 +5695,7 @@
               </a14:hiddenLine>
             </a:ext>
             <a:ext uri="{AF507438-7753-43e0-B8FC-AC1667EBCBE1}">
-              <a14:hiddenEffects xmlns="" xmlns:a14="http://schemas.microsoft.com/office/drawing/2010/main">
+              <a14:hiddenEffects xmlns:a14="http://schemas.microsoft.com/office/drawing/2010/main" xmlns="">
                 <a:effectLst>
                   <a:outerShdw blurRad="63500" dist="38099" dir="2700000" algn="ctr" rotWithShape="0">
                     <a:schemeClr val="bg2">
@@ -5618,13 +5794,19 @@
               <a:rPr lang="de-DE" altLang="de-DE" dirty="0" err="1" smtClean="0">
                 <a:latin typeface="Univers Light" pitchFamily="-84" charset="0"/>
               </a:rPr>
-              <a:t>Parallela</a:t>
+              <a:t>Parallella</a:t>
             </a:r>
             <a:r>
               <a:rPr lang="de-DE" altLang="de-DE" dirty="0" smtClean="0">
                 <a:latin typeface="Univers Light" pitchFamily="-84" charset="0"/>
               </a:rPr>
-              <a:t> Kickstarter </a:t>
+              <a:t> </a:t>
+            </a:r>
+            <a:r>
+              <a:rPr lang="de-DE" altLang="de-DE" dirty="0" smtClean="0">
+                <a:latin typeface="Univers Light" pitchFamily="-84" charset="0"/>
+              </a:rPr>
+              <a:t>Kickstarter </a:t>
             </a:r>
             <a:r>
               <a:rPr lang="de-DE" altLang="de-DE" dirty="0" err="1" smtClean="0">
@@ -5679,13 +5861,19 @@
               <a:rPr lang="en-US" altLang="de-DE" i="1" dirty="0" err="1" smtClean="0">
                 <a:latin typeface="Univers Light" pitchFamily="-84" charset="0"/>
               </a:rPr>
-              <a:t>parallela</a:t>
+              <a:t>parallella</a:t>
             </a:r>
             <a:r>
               <a:rPr lang="en-US" altLang="de-DE" i="1" dirty="0" smtClean="0">
                 <a:latin typeface="Univers Light" pitchFamily="-84" charset="0"/>
               </a:rPr>
-              <a:t> project will make parallel computing accessible to 				everyone”</a:t>
+              <a:t> </a:t>
+            </a:r>
+            <a:r>
+              <a:rPr lang="en-US" altLang="de-DE" i="1" dirty="0" smtClean="0">
+                <a:latin typeface="Univers Light" pitchFamily="-84" charset="0"/>
+              </a:rPr>
+              <a:t>project will make parallel computing accessible to 				everyone”</a:t>
             </a:r>
           </a:p>
           <a:p>
@@ -5748,13 +5936,19 @@
               <a:rPr lang="en-US" altLang="de-DE" dirty="0" err="1" smtClean="0">
                 <a:latin typeface="Univers Light" pitchFamily="-84" charset="0"/>
               </a:rPr>
-              <a:t>Parallela</a:t>
+              <a:t>Parallella</a:t>
             </a:r>
             <a:r>
               <a:rPr lang="en-US" altLang="de-DE" dirty="0" smtClean="0">
                 <a:latin typeface="Univers Light" pitchFamily="-84" charset="0"/>
               </a:rPr>
-              <a:t> high performance computer at costs below 100$</a:t>
+              <a:t> </a:t>
+            </a:r>
+            <a:r>
+              <a:rPr lang="en-US" altLang="de-DE" dirty="0" smtClean="0">
+                <a:latin typeface="Univers Light" pitchFamily="-84" charset="0"/>
+              </a:rPr>
+              <a:t>high performance computer at costs below 100$</a:t>
             </a:r>
           </a:p>
           <a:p>
@@ -5815,14 +6009,14 @@
           <a:effectLst/>
           <a:extLst>
             <a:ext uri="{909E8E84-426E-40dd-AFC4-6F175D3DCCD1}">
-              <a14:hiddenFill xmlns="" xmlns:a14="http://schemas.microsoft.com/office/drawing/2010/main">
+              <a14:hiddenFill xmlns:a14="http://schemas.microsoft.com/office/drawing/2010/main" xmlns="">
                 <a:solidFill>
                   <a:schemeClr val="accent1"/>
                 </a:solidFill>
               </a14:hiddenFill>
             </a:ext>
             <a:ext uri="{91240B29-F687-4f45-9708-019B960494DF}">
-              <a14:hiddenLine xmlns="" xmlns:a14="http://schemas.microsoft.com/office/drawing/2010/main" w="9525">
+              <a14:hiddenLine xmlns:a14="http://schemas.microsoft.com/office/drawing/2010/main" xmlns="" w="9525">
                 <a:solidFill>
                   <a:schemeClr val="tx1"/>
                 </a:solidFill>
@@ -5832,7 +6026,7 @@
               </a14:hiddenLine>
             </a:ext>
             <a:ext uri="{AF507438-7753-43e0-B8FC-AC1667EBCBE1}">
-              <a14:hiddenEffects xmlns="" xmlns:a14="http://schemas.microsoft.com/office/drawing/2010/main">
+              <a14:hiddenEffects xmlns:a14="http://schemas.microsoft.com/office/drawing/2010/main" xmlns="">
                 <a:effectLst>
                   <a:outerShdw blurRad="63500" dist="38099" dir="2700000" algn="ctr" rotWithShape="0">
                     <a:schemeClr val="bg2">
@@ -5931,13 +6125,19 @@
               <a:rPr lang="de-DE" altLang="de-DE" dirty="0" err="1" smtClean="0">
                 <a:latin typeface="Univers Light" pitchFamily="-84" charset="0"/>
               </a:rPr>
-              <a:t>Parallela</a:t>
+              <a:t>Parallella</a:t>
             </a:r>
             <a:r>
               <a:rPr lang="de-DE" altLang="de-DE" dirty="0" smtClean="0">
                 <a:latin typeface="Univers Light" pitchFamily="-84" charset="0"/>
               </a:rPr>
-              <a:t> Kickstarter </a:t>
+              <a:t> </a:t>
+            </a:r>
+            <a:r>
+              <a:rPr lang="de-DE" altLang="de-DE" dirty="0" smtClean="0">
+                <a:latin typeface="Univers Light" pitchFamily="-84" charset="0"/>
+              </a:rPr>
+              <a:t>Kickstarter </a:t>
             </a:r>
             <a:r>
               <a:rPr lang="de-DE" altLang="de-DE" dirty="0" err="1" smtClean="0">
@@ -5974,14 +6174,14 @@
           <a:effectLst/>
           <a:extLst>
             <a:ext uri="{909E8E84-426E-40dd-AFC4-6F175D3DCCD1}">
-              <a14:hiddenFill xmlns="" xmlns:a14="http://schemas.microsoft.com/office/drawing/2010/main">
+              <a14:hiddenFill xmlns:a14="http://schemas.microsoft.com/office/drawing/2010/main" xmlns="">
                 <a:solidFill>
                   <a:schemeClr val="accent1"/>
                 </a:solidFill>
               </a14:hiddenFill>
             </a:ext>
             <a:ext uri="{91240B29-F687-4f45-9708-019B960494DF}">
-              <a14:hiddenLine xmlns="" xmlns:a14="http://schemas.microsoft.com/office/drawing/2010/main" w="9525">
+              <a14:hiddenLine xmlns:a14="http://schemas.microsoft.com/office/drawing/2010/main" xmlns="" w="9525">
                 <a:solidFill>
                   <a:schemeClr val="tx1"/>
                 </a:solidFill>
@@ -5991,7 +6191,7 @@
               </a14:hiddenLine>
             </a:ext>
             <a:ext uri="{AF507438-7753-43e0-B8FC-AC1667EBCBE1}">
-              <a14:hiddenEffects xmlns="" xmlns:a14="http://schemas.microsoft.com/office/drawing/2010/main">
+              <a14:hiddenEffects xmlns:a14="http://schemas.microsoft.com/office/drawing/2010/main" xmlns="">
                 <a:effectLst>
                   <a:outerShdw blurRad="63500" dist="38099" dir="2700000" algn="ctr" rotWithShape="0">
                     <a:schemeClr val="bg2">
@@ -6097,14 +6297,14 @@
           <a:effectLst/>
           <a:extLst>
             <a:ext uri="{909E8E84-426E-40dd-AFC4-6F175D3DCCD1}">
-              <a14:hiddenFill xmlns="" xmlns:a14="http://schemas.microsoft.com/office/drawing/2010/main">
+              <a14:hiddenFill xmlns:a14="http://schemas.microsoft.com/office/drawing/2010/main" xmlns="">
                 <a:solidFill>
                   <a:schemeClr val="accent1"/>
                 </a:solidFill>
               </a14:hiddenFill>
             </a:ext>
             <a:ext uri="{91240B29-F687-4f45-9708-019B960494DF}">
-              <a14:hiddenLine xmlns="" xmlns:a14="http://schemas.microsoft.com/office/drawing/2010/main" w="9525">
+              <a14:hiddenLine xmlns:a14="http://schemas.microsoft.com/office/drawing/2010/main" xmlns="" w="9525">
                 <a:solidFill>
                   <a:schemeClr val="tx1"/>
                 </a:solidFill>
@@ -6114,7 +6314,7 @@
               </a14:hiddenLine>
             </a:ext>
             <a:ext uri="{AF507438-7753-43e0-B8FC-AC1667EBCBE1}">
-              <a14:hiddenEffects xmlns="" xmlns:a14="http://schemas.microsoft.com/office/drawing/2010/main">
+              <a14:hiddenEffects xmlns:a14="http://schemas.microsoft.com/office/drawing/2010/main" xmlns="">
                 <a:effectLst>
                   <a:outerShdw blurRad="63500" dist="38099" dir="2700000" algn="ctr" rotWithShape="0">
                     <a:schemeClr val="bg2">
@@ -6125,7 +6325,7 @@
               </a14:hiddenEffects>
             </a:ext>
             <a:ext uri="{FAA26D3D-D897-4be2-8F04-BA451C77F1D7}">
-              <ma14:placeholderFlag xmlns="" xmlns:ma14="http://schemas.microsoft.com/office/mac/drawingml/2011/main" val="1"/>
+              <ma14:placeholderFlag xmlns:ma14="http://schemas.microsoft.com/office/mac/drawingml/2011/main" xmlns="" val="1"/>
             </a:ext>
           </a:extLst>
         </p:spPr>
@@ -6436,14 +6636,14 @@
           </a:ln>
           <a:extLst>
             <a:ext uri="{909E8E84-426E-40dd-AFC4-6F175D3DCCD1}">
-              <a14:hiddenFill xmlns="" xmlns:a14="http://schemas.microsoft.com/office/drawing/2010/main">
+              <a14:hiddenFill xmlns:a14="http://schemas.microsoft.com/office/drawing/2010/main" xmlns="">
                 <a:solidFill>
                   <a:schemeClr val="accent1"/>
                 </a:solidFill>
               </a14:hiddenFill>
             </a:ext>
             <a:ext uri="{91240B29-F687-4f45-9708-019B960494DF}">
-              <a14:hiddenLine xmlns="" xmlns:a14="http://schemas.microsoft.com/office/drawing/2010/main" w="9525" cap="flat" cmpd="sng" algn="ctr">
+              <a14:hiddenLine xmlns:a14="http://schemas.microsoft.com/office/drawing/2010/main" xmlns="" w="9525" cap="flat" cmpd="sng" algn="ctr">
                 <a:solidFill>
                   <a:schemeClr val="tx1"/>
                 </a:solidFill>
@@ -6454,7 +6654,7 @@
               </a14:hiddenLine>
             </a:ext>
             <a:ext uri="{AF507438-7753-43e0-B8FC-AC1667EBCBE1}">
-              <a14:hiddenEffects xmlns="" xmlns:a14="http://schemas.microsoft.com/office/drawing/2010/main">
+              <a14:hiddenEffects xmlns:a14="http://schemas.microsoft.com/office/drawing/2010/main" xmlns="">
                 <a:effectLst>
                   <a:outerShdw blurRad="63500" dist="35921" dir="2700000" algn="ctr" rotWithShape="0">
                     <a:schemeClr val="bg2"/>
@@ -6500,14 +6700,14 @@
           </a:ln>
           <a:extLst>
             <a:ext uri="{909E8E84-426E-40dd-AFC4-6F175D3DCCD1}">
-              <a14:hiddenFill xmlns="" xmlns:a14="http://schemas.microsoft.com/office/drawing/2010/main">
+              <a14:hiddenFill xmlns:a14="http://schemas.microsoft.com/office/drawing/2010/main" xmlns="">
                 <a:solidFill>
                   <a:schemeClr val="accent1"/>
                 </a:solidFill>
               </a14:hiddenFill>
             </a:ext>
             <a:ext uri="{91240B29-F687-4f45-9708-019B960494DF}">
-              <a14:hiddenLine xmlns="" xmlns:a14="http://schemas.microsoft.com/office/drawing/2010/main" w="9525" cap="flat" cmpd="sng" algn="ctr">
+              <a14:hiddenLine xmlns:a14="http://schemas.microsoft.com/office/drawing/2010/main" xmlns="" w="9525" cap="flat" cmpd="sng" algn="ctr">
                 <a:solidFill>
                   <a:schemeClr val="tx1"/>
                 </a:solidFill>
@@ -6518,7 +6718,7 @@
               </a14:hiddenLine>
             </a:ext>
             <a:ext uri="{AF507438-7753-43e0-B8FC-AC1667EBCBE1}">
-              <a14:hiddenEffects xmlns="" xmlns:a14="http://schemas.microsoft.com/office/drawing/2010/main">
+              <a14:hiddenEffects xmlns:a14="http://schemas.microsoft.com/office/drawing/2010/main" xmlns="">
                 <a:effectLst>
                   <a:outerShdw blurRad="63500" dist="35921" dir="2700000" algn="ctr" rotWithShape="0">
                     <a:schemeClr val="bg2"/>
@@ -6564,14 +6764,14 @@
           </a:ln>
           <a:extLst>
             <a:ext uri="{909E8E84-426E-40dd-AFC4-6F175D3DCCD1}">
-              <a14:hiddenFill xmlns="" xmlns:a14="http://schemas.microsoft.com/office/drawing/2010/main">
+              <a14:hiddenFill xmlns:a14="http://schemas.microsoft.com/office/drawing/2010/main" xmlns="">
                 <a:solidFill>
                   <a:schemeClr val="accent1"/>
                 </a:solidFill>
               </a14:hiddenFill>
             </a:ext>
             <a:ext uri="{91240B29-F687-4f45-9708-019B960494DF}">
-              <a14:hiddenLine xmlns="" xmlns:a14="http://schemas.microsoft.com/office/drawing/2010/main" w="9525" cap="flat" cmpd="sng" algn="ctr">
+              <a14:hiddenLine xmlns:a14="http://schemas.microsoft.com/office/drawing/2010/main" xmlns="" w="9525" cap="flat" cmpd="sng" algn="ctr">
                 <a:solidFill>
                   <a:schemeClr val="tx1"/>
                 </a:solidFill>
@@ -6582,7 +6782,7 @@
               </a14:hiddenLine>
             </a:ext>
             <a:ext uri="{AF507438-7753-43e0-B8FC-AC1667EBCBE1}">
-              <a14:hiddenEffects xmlns="" xmlns:a14="http://schemas.microsoft.com/office/drawing/2010/main">
+              <a14:hiddenEffects xmlns:a14="http://schemas.microsoft.com/office/drawing/2010/main" xmlns="">
                 <a:effectLst>
                   <a:outerShdw blurRad="63500" dist="35921" dir="2700000" algn="ctr" rotWithShape="0">
                     <a:schemeClr val="bg2"/>
@@ -6628,14 +6828,14 @@
           </a:ln>
           <a:extLst>
             <a:ext uri="{909E8E84-426E-40dd-AFC4-6F175D3DCCD1}">
-              <a14:hiddenFill xmlns="" xmlns:a14="http://schemas.microsoft.com/office/drawing/2010/main">
+              <a14:hiddenFill xmlns:a14="http://schemas.microsoft.com/office/drawing/2010/main" xmlns="">
                 <a:solidFill>
                   <a:schemeClr val="accent1"/>
                 </a:solidFill>
               </a14:hiddenFill>
             </a:ext>
             <a:ext uri="{91240B29-F687-4f45-9708-019B960494DF}">
-              <a14:hiddenLine xmlns="" xmlns:a14="http://schemas.microsoft.com/office/drawing/2010/main" w="9525" cap="flat" cmpd="sng" algn="ctr">
+              <a14:hiddenLine xmlns:a14="http://schemas.microsoft.com/office/drawing/2010/main" xmlns="" w="9525" cap="flat" cmpd="sng" algn="ctr">
                 <a:solidFill>
                   <a:schemeClr val="tx1"/>
                 </a:solidFill>
@@ -6646,7 +6846,7 @@
               </a14:hiddenLine>
             </a:ext>
             <a:ext uri="{AF507438-7753-43e0-B8FC-AC1667EBCBE1}">
-              <a14:hiddenEffects xmlns="" xmlns:a14="http://schemas.microsoft.com/office/drawing/2010/main">
+              <a14:hiddenEffects xmlns:a14="http://schemas.microsoft.com/office/drawing/2010/main" xmlns="">
                 <a:effectLst>
                   <a:outerShdw blurRad="63500" dist="35921" dir="2700000" algn="ctr" rotWithShape="0">
                     <a:schemeClr val="bg2"/>
@@ -6929,14 +7129,14 @@
         <a:effectLst/>
         <a:extLst>
           <a:ext uri="{909E8E84-426E-40dd-AFC4-6F175D3DCCD1}">
-            <a14:hiddenFill xmlns="" xmlns:a14="http://schemas.microsoft.com/office/drawing/2010/main">
+            <a14:hiddenFill xmlns:a14="http://schemas.microsoft.com/office/drawing/2010/main" xmlns="">
               <a:solidFill>
                 <a:schemeClr val="accent1"/>
               </a:solidFill>
             </a14:hiddenFill>
           </a:ext>
           <a:ext uri="{91240B29-F687-4f45-9708-019B960494DF}">
-            <a14:hiddenLine xmlns="" xmlns:a14="http://schemas.microsoft.com/office/drawing/2010/main" w="9525" cap="flat" cmpd="sng" algn="ctr">
+            <a14:hiddenLine xmlns:a14="http://schemas.microsoft.com/office/drawing/2010/main" xmlns="" w="9525" cap="flat" cmpd="sng" algn="ctr">
               <a:solidFill>
                 <a:schemeClr val="tx1"/>
               </a:solidFill>
@@ -6947,7 +7147,7 @@
             </a14:hiddenLine>
           </a:ext>
           <a:ext uri="{AF507438-7753-43e0-B8FC-AC1667EBCBE1}">
-            <a14:hiddenEffects xmlns="" xmlns:a14="http://schemas.microsoft.com/office/drawing/2010/main">
+            <a14:hiddenEffects xmlns:a14="http://schemas.microsoft.com/office/drawing/2010/main" xmlns="">
               <a:effectLst>
                 <a:outerShdw blurRad="63500" dist="35921" dir="2700000" algn="ctr" rotWithShape="0">
                   <a:schemeClr val="bg2"/>
@@ -7013,14 +7213,14 @@
         <a:effectLst/>
         <a:extLst>
           <a:ext uri="{909E8E84-426E-40dd-AFC4-6F175D3DCCD1}">
-            <a14:hiddenFill xmlns="" xmlns:a14="http://schemas.microsoft.com/office/drawing/2010/main">
+            <a14:hiddenFill xmlns:a14="http://schemas.microsoft.com/office/drawing/2010/main" xmlns="">
               <a:solidFill>
                 <a:schemeClr val="accent1"/>
               </a:solidFill>
             </a14:hiddenFill>
           </a:ext>
           <a:ext uri="{91240B29-F687-4f45-9708-019B960494DF}">
-            <a14:hiddenLine xmlns="" xmlns:a14="http://schemas.microsoft.com/office/drawing/2010/main" w="9525" cap="flat" cmpd="sng" algn="ctr">
+            <a14:hiddenLine xmlns:a14="http://schemas.microsoft.com/office/drawing/2010/main" xmlns="" w="9525" cap="flat" cmpd="sng" algn="ctr">
               <a:solidFill>
                 <a:schemeClr val="tx1"/>
               </a:solidFill>
@@ -7031,7 +7231,7 @@
             </a14:hiddenLine>
           </a:ext>
           <a:ext uri="{AF507438-7753-43e0-B8FC-AC1667EBCBE1}">
-            <a14:hiddenEffects xmlns="" xmlns:a14="http://schemas.microsoft.com/office/drawing/2010/main">
+            <a14:hiddenEffects xmlns:a14="http://schemas.microsoft.com/office/drawing/2010/main" xmlns="">
               <a:effectLst>
                 <a:outerShdw blurRad="63500" dist="35921" dir="2700000" algn="ctr" rotWithShape="0">
                   <a:schemeClr val="bg2"/>

</xml_diff>

<commit_message>
version now works on all cores some new slides in presentation
</commit_message>
<xml_diff>
--- a/presentation/praesentation.pptx
+++ b/presentation/praesentation.pptx
@@ -5,17 +5,21 @@
     <p:sldMasterId id="2147483650" r:id="rId1"/>
   </p:sldMasterIdLst>
   <p:notesMasterIdLst>
-    <p:notesMasterId r:id="rId7"/>
+    <p:notesMasterId r:id="rId11"/>
   </p:notesMasterIdLst>
   <p:handoutMasterIdLst>
-    <p:handoutMasterId r:id="rId8"/>
+    <p:handoutMasterId r:id="rId12"/>
   </p:handoutMasterIdLst>
   <p:sldIdLst>
     <p:sldId id="257" r:id="rId2"/>
     <p:sldId id="256" r:id="rId3"/>
     <p:sldId id="259" r:id="rId4"/>
     <p:sldId id="260" r:id="rId5"/>
-    <p:sldId id="261" r:id="rId6"/>
+    <p:sldId id="263" r:id="rId6"/>
+    <p:sldId id="261" r:id="rId7"/>
+    <p:sldId id="262" r:id="rId8"/>
+    <p:sldId id="264" r:id="rId9"/>
+    <p:sldId id="265" r:id="rId10"/>
   </p:sldIdLst>
   <p:sldSz cx="9144000" cy="6858000" type="screen4x3"/>
   <p:notesSz cx="6669088" cy="9928225"/>
@@ -153,7 +157,11 @@
             <p14:sldId id="256"/>
             <p14:sldId id="259"/>
             <p14:sldId id="260"/>
+            <p14:sldId id="263"/>
             <p14:sldId id="261"/>
+            <p14:sldId id="262"/>
+            <p14:sldId id="264"/>
+            <p14:sldId id="265"/>
           </p14:sldIdLst>
         </p14:section>
       </p14:sectionLst>
@@ -1591,16 +1599,7 @@
                 </a:solidFill>
                 <a:latin typeface="Univers Light" pitchFamily="-84" charset="0"/>
               </a:rPr>
-              <a:t>Tobias </a:t>
-            </a:r>
-            <a:r>
-              <a:rPr lang="de-DE" altLang="de-DE" sz="1600" dirty="0" smtClean="0">
-                <a:solidFill>
-                  <a:schemeClr val="bg1"/>
-                </a:solidFill>
-                <a:latin typeface="Univers Light" pitchFamily="-84" charset="0"/>
-              </a:rPr>
-              <a:t>Frust (</a:t>
+              <a:t>Tobias Frust (</a:t>
             </a:r>
             <a:r>
               <a:rPr lang="de-DE" altLang="de-DE" sz="1600" dirty="0" smtClean="0">
@@ -4622,7 +4621,7 @@
         </p:nvSpPr>
         <p:spPr bwMode="auto">
           <a:xfrm>
-            <a:off x="989013" y="1168400"/>
+            <a:off x="683568" y="1196752"/>
             <a:ext cx="7197725" cy="161925"/>
           </a:xfrm>
           <a:prstGeom prst="rect">
@@ -4780,7 +4779,7 @@
               </a:spcBef>
             </a:pPr>
             <a:r>
-              <a:rPr lang="de-DE" altLang="de-DE" sz="1100" b="1" dirty="0">
+              <a:rPr lang="de-DE" altLang="de-DE" sz="1200" b="1" dirty="0">
                 <a:solidFill>
                   <a:schemeClr val="bg1"/>
                 </a:solidFill>
@@ -5071,34 +5070,22 @@
               <a:rPr lang="en-US" altLang="de-DE" dirty="0" smtClean="0">
                 <a:latin typeface="Univers Light" pitchFamily="-84" charset="0"/>
               </a:rPr>
-              <a:t> </a:t>
-            </a:r>
+              <a:t> Platform</a:t>
+            </a:r>
+          </a:p>
+          <a:p>
+            <a:pPr lvl="2"/>
             <a:r>
               <a:rPr lang="en-US" altLang="de-DE" dirty="0" smtClean="0">
                 <a:latin typeface="Univers Light" pitchFamily="-84" charset="0"/>
               </a:rPr>
-              <a:t>Platform</a:t>
-            </a:r>
-          </a:p>
-          <a:p>
-            <a:pPr lvl="2"/>
-            <a:r>
-              <a:rPr lang="en-US" altLang="de-DE" dirty="0" smtClean="0">
-                <a:latin typeface="Univers Light" pitchFamily="-84" charset="0"/>
-              </a:rPr>
               <a:t>Company history of </a:t>
             </a:r>
             <a:r>
-              <a:rPr lang="en-US" altLang="de-DE" dirty="0" err="1">
-                <a:latin typeface="Univers Light" pitchFamily="-84" charset="0"/>
-              </a:rPr>
-              <a:t>A</a:t>
-            </a:r>
-            <a:r>
               <a:rPr lang="en-US" altLang="de-DE" dirty="0" err="1" smtClean="0">
                 <a:latin typeface="Univers Light" pitchFamily="-84" charset="0"/>
               </a:rPr>
-              <a:t>dapteva</a:t>
+              <a:t>Adapteva</a:t>
             </a:r>
             <a:endParaRPr lang="en-US" altLang="de-DE" dirty="0" smtClean="0">
               <a:latin typeface="Univers Light" pitchFamily="-84" charset="0"/>
@@ -5107,6 +5094,15 @@
           <a:p>
             <a:pPr lvl="2"/>
             <a:r>
+              <a:rPr lang="en-US" altLang="de-DE" dirty="0" smtClean="0">
+                <a:latin typeface="Univers Light" pitchFamily="-84" charset="0"/>
+              </a:rPr>
+              <a:t>Motivation</a:t>
+            </a:r>
+          </a:p>
+          <a:p>
+            <a:pPr lvl="2"/>
+            <a:r>
               <a:rPr lang="en-US" altLang="de-DE" dirty="0" err="1" smtClean="0">
                 <a:latin typeface="Univers Light" pitchFamily="-84" charset="0"/>
               </a:rPr>
@@ -5116,31 +5112,34 @@
               <a:rPr lang="en-US" altLang="de-DE" dirty="0" smtClean="0">
                 <a:latin typeface="Univers Light" pitchFamily="-84" charset="0"/>
               </a:rPr>
-              <a:t> </a:t>
-            </a:r>
+              <a:t> board</a:t>
+            </a:r>
+          </a:p>
+          <a:p>
+            <a:pPr lvl="2"/>
             <a:r>
               <a:rPr lang="en-US" altLang="de-DE" dirty="0" smtClean="0">
                 <a:latin typeface="Univers Light" pitchFamily="-84" charset="0"/>
               </a:rPr>
-              <a:t>board</a:t>
-            </a:r>
-          </a:p>
-          <a:p>
-            <a:pPr lvl="2"/>
+              <a:t>Epiphany coprocessor</a:t>
+            </a:r>
+          </a:p>
+          <a:p>
+            <a:pPr lvl="1" eaLnBrk="1" hangingPunct="1"/>
             <a:r>
               <a:rPr lang="en-US" altLang="de-DE" dirty="0" smtClean="0">
                 <a:latin typeface="Univers Light" pitchFamily="-84" charset="0"/>
               </a:rPr>
-              <a:t>Epiphany coprocessor</a:t>
-            </a:r>
-          </a:p>
-          <a:p>
-            <a:pPr lvl="1" eaLnBrk="1" hangingPunct="1"/>
+              <a:t>Implementation of 1D-FFT with filtering</a:t>
+            </a:r>
+          </a:p>
+          <a:p>
+            <a:pPr lvl="2" eaLnBrk="1" hangingPunct="1"/>
             <a:r>
               <a:rPr lang="en-US" altLang="de-DE" dirty="0" smtClean="0">
                 <a:latin typeface="Univers Light" pitchFamily="-84" charset="0"/>
               </a:rPr>
-              <a:t>Implementation of 1D-FFT with filtering</a:t>
+              <a:t>Motivation and explanation</a:t>
             </a:r>
           </a:p>
           <a:p>
@@ -5149,7 +5148,7 @@
               <a:rPr lang="en-US" altLang="de-DE" dirty="0" smtClean="0">
                 <a:latin typeface="Univers Light" pitchFamily="-84" charset="0"/>
               </a:rPr>
-              <a:t>Motivation and explanation</a:t>
+              <a:t>Details of implementation</a:t>
             </a:r>
           </a:p>
           <a:p>
@@ -5158,7 +5157,7 @@
               <a:rPr lang="en-US" altLang="de-DE" dirty="0" smtClean="0">
                 <a:latin typeface="Univers Light" pitchFamily="-84" charset="0"/>
               </a:rPr>
-              <a:t>Details of implementation</a:t>
+              <a:t>Performance results</a:t>
             </a:r>
           </a:p>
           <a:p>
@@ -5495,19 +5494,7 @@
               <a:rPr lang="en-US" altLang="de-DE" dirty="0" smtClean="0">
                 <a:latin typeface="Univers Light" pitchFamily="-84" charset="0"/>
               </a:rPr>
-              <a:t>Aug 2012: Demonstration of 50 </a:t>
-            </a:r>
-            <a:r>
-              <a:rPr lang="en-US" altLang="de-DE" dirty="0" smtClean="0">
-                <a:latin typeface="Univers Light" pitchFamily="-84" charset="0"/>
-              </a:rPr>
-              <a:t>GFLOPS/Watt </a:t>
-            </a:r>
-            <a:r>
-              <a:rPr lang="en-US" altLang="de-DE" dirty="0" smtClean="0">
-                <a:latin typeface="Univers Light" pitchFamily="-84" charset="0"/>
-              </a:rPr>
-              <a:t>efficiency at 28nm</a:t>
+              <a:t>Aug 2012: Demonstration of 50 GFLOPS/Watt efficiency at 28nm</a:t>
             </a:r>
           </a:p>
           <a:p>
@@ -5564,13 +5551,28 @@
               <a:rPr lang="en-US" altLang="de-DE" dirty="0" smtClean="0">
                 <a:latin typeface="Univers Light" pitchFamily="-84" charset="0"/>
               </a:rPr>
-              <a:t> </a:t>
-            </a:r>
+              <a:t> prototypes</a:t>
+            </a:r>
+          </a:p>
+          <a:p>
+            <a:pPr lvl="1"/>
             <a:r>
               <a:rPr lang="en-US" altLang="de-DE" dirty="0" smtClean="0">
                 <a:latin typeface="Univers Light" pitchFamily="-84" charset="0"/>
               </a:rPr>
-              <a:t>prototypes</a:t>
+              <a:t>Jul 2013: first </a:t>
+            </a:r>
+            <a:r>
+              <a:rPr lang="en-US" altLang="de-DE" dirty="0" err="1" smtClean="0">
+                <a:latin typeface="Univers Light" pitchFamily="-84" charset="0"/>
+              </a:rPr>
+              <a:t>Parallella</a:t>
+            </a:r>
+            <a:r>
+              <a:rPr lang="en-US" altLang="de-DE" dirty="0" smtClean="0">
+                <a:latin typeface="Univers Light" pitchFamily="-84" charset="0"/>
+              </a:rPr>
+              <a:t> boards shipped to Kickstarter backers</a:t>
             </a:r>
           </a:p>
           <a:p>
@@ -5579,58 +5581,19 @@
               <a:rPr lang="en-US" altLang="de-DE" dirty="0" smtClean="0">
                 <a:latin typeface="Univers Light" pitchFamily="-84" charset="0"/>
               </a:rPr>
-              <a:t>Jul 2013: first </a:t>
+              <a:t>Apr 2014: Completed shipping of all </a:t>
             </a:r>
             <a:r>
               <a:rPr lang="en-US" altLang="de-DE" dirty="0" err="1" smtClean="0">
                 <a:latin typeface="Univers Light" pitchFamily="-84" charset="0"/>
               </a:rPr>
-              <a:t>P</a:t>
-            </a:r>
-            <a:r>
-              <a:rPr lang="en-US" altLang="de-DE" dirty="0" err="1" smtClean="0">
-                <a:latin typeface="Univers Light" pitchFamily="-84" charset="0"/>
-              </a:rPr>
-              <a:t>arallella</a:t>
+              <a:t>Parallella</a:t>
             </a:r>
             <a:r>
               <a:rPr lang="en-US" altLang="de-DE" dirty="0" smtClean="0">
                 <a:latin typeface="Univers Light" pitchFamily="-84" charset="0"/>
               </a:rPr>
-              <a:t> </a:t>
-            </a:r>
-            <a:r>
-              <a:rPr lang="en-US" altLang="de-DE" dirty="0" smtClean="0">
-                <a:latin typeface="Univers Light" pitchFamily="-84" charset="0"/>
-              </a:rPr>
-              <a:t>boards shipped to Kickstarter backers</a:t>
-            </a:r>
-          </a:p>
-          <a:p>
-            <a:pPr lvl="1"/>
-            <a:r>
-              <a:rPr lang="en-US" altLang="de-DE" dirty="0" smtClean="0">
-                <a:latin typeface="Univers Light" pitchFamily="-84" charset="0"/>
-              </a:rPr>
-              <a:t>Apr 2014: Completed shipping of all </a:t>
-            </a:r>
-            <a:r>
-              <a:rPr lang="en-US" altLang="de-DE" dirty="0" err="1" smtClean="0">
-                <a:latin typeface="Univers Light" pitchFamily="-84" charset="0"/>
-              </a:rPr>
-              <a:t>Parallella</a:t>
-            </a:r>
-            <a:r>
-              <a:rPr lang="en-US" altLang="de-DE" dirty="0" smtClean="0">
-                <a:latin typeface="Univers Light" pitchFamily="-84" charset="0"/>
-              </a:rPr>
-              <a:t> </a:t>
-            </a:r>
-            <a:r>
-              <a:rPr lang="en-US" altLang="de-DE" dirty="0" smtClean="0">
-                <a:latin typeface="Univers Light" pitchFamily="-84" charset="0"/>
-              </a:rPr>
-              <a:t>boards to </a:t>
+              <a:t> boards to </a:t>
             </a:r>
             <a:r>
               <a:rPr lang="en-US" altLang="de-DE" dirty="0">
@@ -5800,13 +5763,7 @@
               <a:rPr lang="de-DE" altLang="de-DE" dirty="0" smtClean="0">
                 <a:latin typeface="Univers Light" pitchFamily="-84" charset="0"/>
               </a:rPr>
-              <a:t> </a:t>
-            </a:r>
-            <a:r>
-              <a:rPr lang="de-DE" altLang="de-DE" dirty="0" smtClean="0">
-                <a:latin typeface="Univers Light" pitchFamily="-84" charset="0"/>
-              </a:rPr>
-              <a:t>Kickstarter </a:t>
+              <a:t> Kickstarter </a:t>
             </a:r>
             <a:r>
               <a:rPr lang="de-DE" altLang="de-DE" dirty="0" err="1" smtClean="0">
@@ -5867,13 +5824,7 @@
               <a:rPr lang="en-US" altLang="de-DE" i="1" dirty="0" smtClean="0">
                 <a:latin typeface="Univers Light" pitchFamily="-84" charset="0"/>
               </a:rPr>
-              <a:t> </a:t>
-            </a:r>
-            <a:r>
-              <a:rPr lang="en-US" altLang="de-DE" i="1" dirty="0" smtClean="0">
-                <a:latin typeface="Univers Light" pitchFamily="-84" charset="0"/>
-              </a:rPr>
-              <a:t>project will make parallel computing accessible to 				everyone”</a:t>
+              <a:t> project will make parallel computing accessible to 				everyone”</a:t>
             </a:r>
           </a:p>
           <a:p>
@@ -5942,13 +5893,7 @@
               <a:rPr lang="en-US" altLang="de-DE" dirty="0" smtClean="0">
                 <a:latin typeface="Univers Light" pitchFamily="-84" charset="0"/>
               </a:rPr>
-              <a:t> </a:t>
-            </a:r>
-            <a:r>
-              <a:rPr lang="en-US" altLang="de-DE" dirty="0" smtClean="0">
-                <a:latin typeface="Univers Light" pitchFamily="-84" charset="0"/>
-              </a:rPr>
-              <a:t>high performance computer at costs below 100$</a:t>
+              <a:t> high performance computer at costs below 100$</a:t>
             </a:r>
           </a:p>
           <a:p>
@@ -6120,12 +6065,17 @@
           <a:bodyPr/>
           <a:lstStyle/>
           <a:p>
-            <a:pPr eaLnBrk="1" hangingPunct="1"/>
+            <a:r>
+              <a:rPr lang="de-DE" altLang="de-DE" dirty="0" smtClean="0">
+                <a:latin typeface="Univers Light" pitchFamily="-84" charset="0"/>
+              </a:rPr>
+              <a:t>Motivation </a:t>
+            </a:r>
             <a:r>
               <a:rPr lang="de-DE" altLang="de-DE" dirty="0" err="1" smtClean="0">
                 <a:latin typeface="Univers Light" pitchFamily="-84" charset="0"/>
               </a:rPr>
-              <a:t>Parallella</a:t>
+              <a:t>for</a:t>
             </a:r>
             <a:r>
               <a:rPr lang="de-DE" altLang="de-DE" dirty="0" smtClean="0">
@@ -6134,16 +6084,24 @@
               <a:t> </a:t>
             </a:r>
             <a:r>
-              <a:rPr lang="de-DE" altLang="de-DE" dirty="0" smtClean="0">
-                <a:latin typeface="Univers Light" pitchFamily="-84" charset="0"/>
-              </a:rPr>
-              <a:t>Kickstarter </a:t>
-            </a:r>
-            <a:r>
-              <a:rPr lang="de-DE" altLang="de-DE" dirty="0" err="1" smtClean="0">
-                <a:latin typeface="Univers Light" pitchFamily="-84" charset="0"/>
-              </a:rPr>
-              <a:t>Program</a:t>
+              <a:rPr lang="de-DE" dirty="0" err="1" smtClean="0"/>
+              <a:t>Epiphany</a:t>
+            </a:r>
+            <a:r>
+              <a:rPr lang="de-DE" dirty="0" smtClean="0"/>
+              <a:t> </a:t>
+            </a:r>
+            <a:r>
+              <a:rPr lang="de-DE" dirty="0" err="1"/>
+              <a:t>multicore</a:t>
+            </a:r>
+            <a:r>
+              <a:rPr lang="de-DE" dirty="0"/>
+              <a:t> </a:t>
+            </a:r>
+            <a:r>
+              <a:rPr lang="de-DE" dirty="0" err="1"/>
+              <a:t>architecture</a:t>
             </a:r>
             <a:endParaRPr lang="de-DE" altLang="de-DE" dirty="0" smtClean="0">
               <a:latin typeface="Univers Light" pitchFamily="-84" charset="0"/>
@@ -6235,9 +6193,75 @@
       </p:sp>
       <p:pic>
         <p:nvPicPr>
-          <p:cNvPr id="1026" name="Picture 2" descr="http://ecx.images-amazon.com/images/I/81eyz52HDYL._SL1500_.jpg"/>
+          <p:cNvPr id="3" name="Inhaltsplatzhalter 2"/>
           <p:cNvPicPr>
-            <a:picLocks noChangeAspect="1" noChangeArrowheads="1"/>
+            <a:picLocks noGrp="1" noChangeAspect="1"/>
+          </p:cNvPicPr>
+          <p:nvPr>
+            <p:ph idx="1"/>
+          </p:nvPr>
+        </p:nvPicPr>
+        <p:blipFill>
+          <a:blip r:embed="rId2">
+            <a:extLst>
+              <a:ext uri="{28A0092B-C50C-407E-A947-70E740481C1C}">
+                <a14:useLocalDpi xmlns:a14="http://schemas.microsoft.com/office/drawing/2010/main" val="0"/>
+              </a:ext>
+            </a:extLst>
+          </a:blip>
+          <a:stretch>
+            <a:fillRect/>
+          </a:stretch>
+        </p:blipFill>
+        <p:spPr>
+          <a:xfrm>
+            <a:off x="323850" y="764704"/>
+            <a:ext cx="8351838" cy="5108744"/>
+          </a:xfrm>
+        </p:spPr>
+      </p:pic>
+    </p:spTree>
+    <p:extLst>
+      <p:ext uri="{BB962C8B-B14F-4D97-AF65-F5344CB8AC3E}">
+        <p14:creationId xmlns:p14="http://schemas.microsoft.com/office/powerpoint/2010/main" val="828036882"/>
+      </p:ext>
+    </p:extLst>
+  </p:cSld>
+  <p:clrMapOvr>
+    <a:masterClrMapping/>
+  </p:clrMapOvr>
+  <p:timing>
+    <p:tnLst>
+      <p:par>
+        <p:cTn id="1" dur="indefinite" restart="never" nodeType="tmRoot"/>
+      </p:par>
+    </p:tnLst>
+  </p:timing>
+</p:sld>
+</file>
+
+<file path=ppt/slides/slide6.xml><?xml version="1.0" encoding="utf-8"?>
+<p:sld xmlns:a="http://schemas.openxmlformats.org/drawingml/2006/main" xmlns:r="http://schemas.openxmlformats.org/officeDocument/2006/relationships" xmlns:p="http://schemas.openxmlformats.org/presentationml/2006/main">
+  <p:cSld>
+    <p:spTree>
+      <p:nvGrpSpPr>
+        <p:cNvPr id="1" name=""/>
+        <p:cNvGrpSpPr/>
+        <p:nvPr/>
+      </p:nvGrpSpPr>
+      <p:grpSpPr>
+        <a:xfrm>
+          <a:off x="0" y="0"/>
+          <a:ext cx="0" cy="0"/>
+          <a:chOff x="0" y="0"/>
+          <a:chExt cx="0" cy="0"/>
+        </a:xfrm>
+      </p:grpSpPr>
+      <p:pic>
+        <p:nvPicPr>
+          <p:cNvPr id="2" name="Grafik 1"/>
+          <p:cNvPicPr>
+            <a:picLocks noChangeAspect="1"/>
           </p:cNvPicPr>
           <p:nvPr/>
         </p:nvPicPr>
@@ -6249,31 +6273,133 @@
               </a:ext>
             </a:extLst>
           </a:blip>
-          <a:srcRect/>
           <a:stretch>
             <a:fillRect/>
           </a:stretch>
         </p:blipFill>
+        <p:spPr>
+          <a:xfrm>
+            <a:off x="251520" y="763151"/>
+            <a:ext cx="6272265" cy="5114121"/>
+          </a:xfrm>
+          <a:prstGeom prst="rect">
+            <a:avLst/>
+          </a:prstGeom>
+        </p:spPr>
+      </p:pic>
+      <p:sp>
+        <p:nvSpPr>
+          <p:cNvPr id="2055" name="Rectangle 7"/>
+          <p:cNvSpPr>
+            <a:spLocks noGrp="1" noChangeArrowheads="1"/>
+          </p:cNvSpPr>
+          <p:nvPr>
+            <p:ph type="title"/>
+          </p:nvPr>
+        </p:nvSpPr>
+        <p:spPr/>
+        <p:txBody>
+          <a:bodyPr/>
+          <a:lstStyle/>
+          <a:p>
+            <a:pPr eaLnBrk="1" hangingPunct="1"/>
+            <a:r>
+              <a:rPr lang="de-DE" altLang="de-DE" dirty="0" err="1" smtClean="0">
+                <a:latin typeface="Univers Light" pitchFamily="-84" charset="0"/>
+              </a:rPr>
+              <a:t>Parallella</a:t>
+            </a:r>
+            <a:r>
+              <a:rPr lang="de-DE" altLang="de-DE" dirty="0" smtClean="0">
+                <a:latin typeface="Univers Light" pitchFamily="-84" charset="0"/>
+              </a:rPr>
+              <a:t> Board</a:t>
+            </a:r>
+          </a:p>
+        </p:txBody>
+      </p:sp>
+      <p:sp>
+        <p:nvSpPr>
+          <p:cNvPr id="2057" name="Rectangle 9"/>
+          <p:cNvSpPr>
+            <a:spLocks noChangeArrowheads="1"/>
+          </p:cNvSpPr>
+          <p:nvPr/>
+        </p:nvSpPr>
         <p:spPr bwMode="auto">
           <a:xfrm>
-            <a:off x="141676" y="764704"/>
-            <a:ext cx="6269847" cy="5112568"/>
+            <a:off x="3276600" y="6524625"/>
+            <a:ext cx="2879725" cy="268288"/>
           </a:xfrm>
           <a:prstGeom prst="rect">
             <a:avLst/>
           </a:prstGeom>
           <a:noFill/>
+          <a:ln>
+            <a:noFill/>
+          </a:ln>
+          <a:effectLst/>
           <a:extLst>
-            <a:ext uri="{909E8E84-426E-40DD-AFC4-6F175D3DCCD1}">
-              <a14:hiddenFill xmlns:a14="http://schemas.microsoft.com/office/drawing/2010/main">
-                <a:solidFill>
-                  <a:srgbClr val="FFFFFF"/>
+            <a:ext uri="{909E8E84-426E-40dd-AFC4-6F175D3DCCD1}">
+              <a14:hiddenFill xmlns:a14="http://schemas.microsoft.com/office/drawing/2010/main" xmlns="">
+                <a:solidFill>
+                  <a:schemeClr val="accent1"/>
                 </a:solidFill>
               </a14:hiddenFill>
+            </a:ext>
+            <a:ext uri="{91240B29-F687-4f45-9708-019B960494DF}">
+              <a14:hiddenLine xmlns:a14="http://schemas.microsoft.com/office/drawing/2010/main" xmlns="" w="9525">
+                <a:solidFill>
+                  <a:schemeClr val="tx1"/>
+                </a:solidFill>
+                <a:miter lim="800000"/>
+                <a:headEnd/>
+                <a:tailEnd/>
+              </a14:hiddenLine>
+            </a:ext>
+            <a:ext uri="{AF507438-7753-43e0-B8FC-AC1667EBCBE1}">
+              <a14:hiddenEffects xmlns:a14="http://schemas.microsoft.com/office/drawing/2010/main" xmlns="">
+                <a:effectLst>
+                  <a:outerShdw blurRad="63500" dist="38099" dir="2700000" algn="ctr" rotWithShape="0">
+                    <a:schemeClr val="bg2">
+                      <a:alpha val="74998"/>
+                    </a:schemeClr>
+                  </a:outerShdw>
+                </a:effectLst>
+              </a14:hiddenEffects>
             </a:ext>
           </a:extLst>
         </p:spPr>
-      </p:pic>
+        <p:txBody>
+          <a:bodyPr/>
+          <a:lstStyle/>
+          <a:p>
+            <a:pPr algn="ctr">
+              <a:spcBef>
+                <a:spcPct val="0"/>
+              </a:spcBef>
+              <a:defRPr/>
+            </a:pPr>
+            <a:fld id="{6F754304-0817-43E5-BD17-66FA22235D58}" type="slidenum">
+              <a:rPr lang="de-DE" sz="1200" smtClean="0">
+                <a:solidFill>
+                  <a:schemeClr val="tx1"/>
+                </a:solidFill>
+                <a:latin typeface="Univers 45 Light" charset="0"/>
+                <a:ea typeface="ＭＳ Ｐゴシック" charset="0"/>
+              </a:rPr>
+              <a:t>6</a:t>
+            </a:fld>
+            <a:endParaRPr lang="de-DE" sz="1200" dirty="0">
+              <a:solidFill>
+                <a:schemeClr val="tx1"/>
+              </a:solidFill>
+              <a:latin typeface="Univers 45 Light" charset="0"/>
+              <a:ea typeface="ＭＳ Ｐゴシック" charset="0"/>
+            </a:endParaRPr>
+          </a:p>
+        </p:txBody>
+      </p:sp>
       <p:sp>
         <p:nvSpPr>
           <p:cNvPr id="9" name="Rectangle 8"/>
@@ -6514,7 +6640,7 @@
               <a:buNone/>
             </a:pPr>
             <a:r>
-              <a:rPr lang="en-US" altLang="de-DE" kern="0" dirty="0" smtClean="0">
+              <a:rPr lang="en-US" altLang="de-DE" b="1" kern="0" dirty="0" smtClean="0">
                 <a:latin typeface="Univers Light" pitchFamily="-84" charset="0"/>
               </a:rPr>
               <a:t>Tech specs:</a:t>
@@ -6875,6 +7001,997 @@
     <p:extLst>
       <p:ext uri="{BB962C8B-B14F-4D97-AF65-F5344CB8AC3E}">
         <p14:creationId xmlns:p14="http://schemas.microsoft.com/office/powerpoint/2010/main" val="4281829318"/>
+      </p:ext>
+    </p:extLst>
+  </p:cSld>
+  <p:clrMapOvr>
+    <a:masterClrMapping/>
+  </p:clrMapOvr>
+  <p:timing>
+    <p:tnLst>
+      <p:par>
+        <p:cTn id="1" dur="indefinite" restart="never" nodeType="tmRoot"/>
+      </p:par>
+    </p:tnLst>
+  </p:timing>
+</p:sld>
+</file>
+
+<file path=ppt/slides/slide7.xml><?xml version="1.0" encoding="utf-8"?>
+<p:sld xmlns:a="http://schemas.openxmlformats.org/drawingml/2006/main" xmlns:r="http://schemas.openxmlformats.org/officeDocument/2006/relationships" xmlns:p="http://schemas.openxmlformats.org/presentationml/2006/main">
+  <p:cSld>
+    <p:spTree>
+      <p:nvGrpSpPr>
+        <p:cNvPr id="1" name=""/>
+        <p:cNvGrpSpPr/>
+        <p:nvPr/>
+      </p:nvGrpSpPr>
+      <p:grpSpPr>
+        <a:xfrm>
+          <a:off x="0" y="0"/>
+          <a:ext cx="0" cy="0"/>
+          <a:chOff x="0" y="0"/>
+          <a:chExt cx="0" cy="0"/>
+        </a:xfrm>
+      </p:grpSpPr>
+      <p:sp>
+        <p:nvSpPr>
+          <p:cNvPr id="2055" name="Rectangle 7"/>
+          <p:cNvSpPr>
+            <a:spLocks noGrp="1" noChangeArrowheads="1"/>
+          </p:cNvSpPr>
+          <p:nvPr>
+            <p:ph type="title"/>
+          </p:nvPr>
+        </p:nvSpPr>
+        <p:spPr/>
+        <p:txBody>
+          <a:bodyPr/>
+          <a:lstStyle/>
+          <a:p>
+            <a:pPr eaLnBrk="1" hangingPunct="1"/>
+            <a:r>
+              <a:rPr lang="de-DE" altLang="de-DE" dirty="0" smtClean="0">
+                <a:latin typeface="Univers Light" pitchFamily="-84" charset="0"/>
+              </a:rPr>
+              <a:t>System </a:t>
+            </a:r>
+            <a:r>
+              <a:rPr lang="de-DE" altLang="de-DE" dirty="0" err="1" smtClean="0">
+                <a:latin typeface="Univers Light" pitchFamily="-84" charset="0"/>
+              </a:rPr>
+              <a:t>overview</a:t>
+            </a:r>
+            <a:r>
+              <a:rPr lang="de-DE" altLang="de-DE" dirty="0" smtClean="0">
+                <a:latin typeface="Univers Light" pitchFamily="-84" charset="0"/>
+              </a:rPr>
+              <a:t> </a:t>
+            </a:r>
+            <a:r>
+              <a:rPr lang="de-DE" altLang="de-DE" dirty="0" err="1" smtClean="0">
+                <a:latin typeface="Univers Light" pitchFamily="-84" charset="0"/>
+              </a:rPr>
+              <a:t>of</a:t>
+            </a:r>
+            <a:r>
+              <a:rPr lang="de-DE" altLang="de-DE" dirty="0" smtClean="0">
+                <a:latin typeface="Univers Light" pitchFamily="-84" charset="0"/>
+              </a:rPr>
+              <a:t> </a:t>
+            </a:r>
+            <a:r>
+              <a:rPr lang="de-DE" altLang="de-DE" dirty="0" err="1" smtClean="0">
+                <a:latin typeface="Univers Light" pitchFamily="-84" charset="0"/>
+              </a:rPr>
+              <a:t>Parallella</a:t>
+            </a:r>
+            <a:r>
+              <a:rPr lang="de-DE" altLang="de-DE" dirty="0">
+                <a:latin typeface="Univers Light" pitchFamily="-84" charset="0"/>
+              </a:rPr>
+              <a:t> </a:t>
+            </a:r>
+            <a:r>
+              <a:rPr lang="de-DE" altLang="de-DE" dirty="0" err="1" smtClean="0">
+                <a:latin typeface="Univers Light" pitchFamily="-84" charset="0"/>
+              </a:rPr>
+              <a:t>board</a:t>
+            </a:r>
+            <a:endParaRPr lang="de-DE" altLang="de-DE" dirty="0" smtClean="0">
+              <a:latin typeface="Univers Light" pitchFamily="-84" charset="0"/>
+            </a:endParaRPr>
+          </a:p>
+        </p:txBody>
+      </p:sp>
+      <p:sp>
+        <p:nvSpPr>
+          <p:cNvPr id="2057" name="Rectangle 9"/>
+          <p:cNvSpPr>
+            <a:spLocks noChangeArrowheads="1"/>
+          </p:cNvSpPr>
+          <p:nvPr/>
+        </p:nvSpPr>
+        <p:spPr bwMode="auto">
+          <a:xfrm>
+            <a:off x="3276600" y="6524625"/>
+            <a:ext cx="2879725" cy="268288"/>
+          </a:xfrm>
+          <a:prstGeom prst="rect">
+            <a:avLst/>
+          </a:prstGeom>
+          <a:noFill/>
+          <a:ln>
+            <a:noFill/>
+          </a:ln>
+          <a:effectLst/>
+          <a:extLst>
+            <a:ext uri="{909E8E84-426E-40dd-AFC4-6F175D3DCCD1}">
+              <a14:hiddenFill xmlns:a14="http://schemas.microsoft.com/office/drawing/2010/main" xmlns="">
+                <a:solidFill>
+                  <a:schemeClr val="accent1"/>
+                </a:solidFill>
+              </a14:hiddenFill>
+            </a:ext>
+            <a:ext uri="{91240B29-F687-4f45-9708-019B960494DF}">
+              <a14:hiddenLine xmlns:a14="http://schemas.microsoft.com/office/drawing/2010/main" xmlns="" w="9525">
+                <a:solidFill>
+                  <a:schemeClr val="tx1"/>
+                </a:solidFill>
+                <a:miter lim="800000"/>
+                <a:headEnd/>
+                <a:tailEnd/>
+              </a14:hiddenLine>
+            </a:ext>
+            <a:ext uri="{AF507438-7753-43e0-B8FC-AC1667EBCBE1}">
+              <a14:hiddenEffects xmlns:a14="http://schemas.microsoft.com/office/drawing/2010/main" xmlns="">
+                <a:effectLst>
+                  <a:outerShdw blurRad="63500" dist="38099" dir="2700000" algn="ctr" rotWithShape="0">
+                    <a:schemeClr val="bg2">
+                      <a:alpha val="74998"/>
+                    </a:schemeClr>
+                  </a:outerShdw>
+                </a:effectLst>
+              </a14:hiddenEffects>
+            </a:ext>
+          </a:extLst>
+        </p:spPr>
+        <p:txBody>
+          <a:bodyPr/>
+          <a:lstStyle/>
+          <a:p>
+            <a:pPr algn="ctr">
+              <a:spcBef>
+                <a:spcPct val="0"/>
+              </a:spcBef>
+              <a:defRPr/>
+            </a:pPr>
+            <a:fld id="{6F754304-0817-43E5-BD17-66FA22235D58}" type="slidenum">
+              <a:rPr lang="de-DE" sz="1200" smtClean="0">
+                <a:solidFill>
+                  <a:schemeClr val="tx1"/>
+                </a:solidFill>
+                <a:latin typeface="Univers 45 Light" charset="0"/>
+                <a:ea typeface="ＭＳ Ｐゴシック" charset="0"/>
+              </a:rPr>
+              <a:t>7</a:t>
+            </a:fld>
+            <a:endParaRPr lang="de-DE" sz="1200" dirty="0">
+              <a:solidFill>
+                <a:schemeClr val="tx1"/>
+              </a:solidFill>
+              <a:latin typeface="Univers 45 Light" charset="0"/>
+              <a:ea typeface="ＭＳ Ｐゴシック" charset="0"/>
+            </a:endParaRPr>
+          </a:p>
+        </p:txBody>
+      </p:sp>
+      <p:pic>
+        <p:nvPicPr>
+          <p:cNvPr id="4" name="Grafik 3"/>
+          <p:cNvPicPr>
+            <a:picLocks noChangeAspect="1"/>
+          </p:cNvPicPr>
+          <p:nvPr/>
+        </p:nvPicPr>
+        <p:blipFill>
+          <a:blip r:embed="rId2">
+            <a:extLst>
+              <a:ext uri="{28A0092B-C50C-407E-A947-70E740481C1C}">
+                <a14:useLocalDpi xmlns:a14="http://schemas.microsoft.com/office/drawing/2010/main" val="0"/>
+              </a:ext>
+            </a:extLst>
+          </a:blip>
+          <a:stretch>
+            <a:fillRect/>
+          </a:stretch>
+        </p:blipFill>
+        <p:spPr>
+          <a:xfrm>
+            <a:off x="1403648" y="669813"/>
+            <a:ext cx="5987012" cy="5661248"/>
+          </a:xfrm>
+          <a:prstGeom prst="rect">
+            <a:avLst/>
+          </a:prstGeom>
+        </p:spPr>
+      </p:pic>
+    </p:spTree>
+    <p:extLst>
+      <p:ext uri="{BB962C8B-B14F-4D97-AF65-F5344CB8AC3E}">
+        <p14:creationId xmlns:p14="http://schemas.microsoft.com/office/powerpoint/2010/main" val="181211207"/>
+      </p:ext>
+    </p:extLst>
+  </p:cSld>
+  <p:clrMapOvr>
+    <a:masterClrMapping/>
+  </p:clrMapOvr>
+  <p:timing>
+    <p:tnLst>
+      <p:par>
+        <p:cTn id="1" dur="indefinite" restart="never" nodeType="tmRoot"/>
+      </p:par>
+    </p:tnLst>
+  </p:timing>
+</p:sld>
+</file>
+
+<file path=ppt/slides/slide8.xml><?xml version="1.0" encoding="utf-8"?>
+<p:sld xmlns:a="http://schemas.openxmlformats.org/drawingml/2006/main" xmlns:r="http://schemas.openxmlformats.org/officeDocument/2006/relationships" xmlns:p="http://schemas.openxmlformats.org/presentationml/2006/main">
+  <p:cSld>
+    <p:spTree>
+      <p:nvGrpSpPr>
+        <p:cNvPr id="1" name=""/>
+        <p:cNvGrpSpPr/>
+        <p:nvPr/>
+      </p:nvGrpSpPr>
+      <p:grpSpPr>
+        <a:xfrm>
+          <a:off x="0" y="0"/>
+          <a:ext cx="0" cy="0"/>
+          <a:chOff x="0" y="0"/>
+          <a:chExt cx="0" cy="0"/>
+        </a:xfrm>
+      </p:grpSpPr>
+      <p:sp>
+        <p:nvSpPr>
+          <p:cNvPr id="2055" name="Rectangle 7"/>
+          <p:cNvSpPr>
+            <a:spLocks noGrp="1" noChangeArrowheads="1"/>
+          </p:cNvSpPr>
+          <p:nvPr>
+            <p:ph type="title"/>
+          </p:nvPr>
+        </p:nvSpPr>
+        <p:spPr/>
+        <p:txBody>
+          <a:bodyPr/>
+          <a:lstStyle/>
+          <a:p>
+            <a:pPr eaLnBrk="1" hangingPunct="1"/>
+            <a:r>
+              <a:rPr lang="de-DE" altLang="de-DE" dirty="0" smtClean="0">
+                <a:latin typeface="Univers Light" pitchFamily="-84" charset="0"/>
+              </a:rPr>
+              <a:t>High </a:t>
+            </a:r>
+            <a:r>
+              <a:rPr lang="de-DE" altLang="de-DE" dirty="0" err="1" smtClean="0">
+                <a:latin typeface="Univers Light" pitchFamily="-84" charset="0"/>
+              </a:rPr>
+              <a:t>level</a:t>
+            </a:r>
+            <a:r>
+              <a:rPr lang="de-DE" altLang="de-DE" dirty="0" smtClean="0">
+                <a:latin typeface="Univers Light" pitchFamily="-84" charset="0"/>
+              </a:rPr>
+              <a:t> </a:t>
+            </a:r>
+            <a:r>
+              <a:rPr lang="de-DE" altLang="de-DE" dirty="0" err="1" smtClean="0">
+                <a:latin typeface="Univers Light" pitchFamily="-84" charset="0"/>
+              </a:rPr>
+              <a:t>overview</a:t>
+            </a:r>
+            <a:r>
+              <a:rPr lang="de-DE" altLang="de-DE" dirty="0" smtClean="0">
+                <a:latin typeface="Univers Light" pitchFamily="-84" charset="0"/>
+              </a:rPr>
+              <a:t> </a:t>
+            </a:r>
+            <a:r>
+              <a:rPr lang="de-DE" altLang="de-DE" dirty="0" err="1" smtClean="0">
+                <a:latin typeface="Univers Light" pitchFamily="-84" charset="0"/>
+              </a:rPr>
+              <a:t>of</a:t>
+            </a:r>
+            <a:r>
+              <a:rPr lang="de-DE" altLang="de-DE" dirty="0" smtClean="0">
+                <a:latin typeface="Univers Light" pitchFamily="-84" charset="0"/>
+              </a:rPr>
+              <a:t> </a:t>
+            </a:r>
+            <a:r>
+              <a:rPr lang="de-DE" altLang="de-DE" dirty="0" err="1" smtClean="0">
+                <a:latin typeface="Univers Light" pitchFamily="-84" charset="0"/>
+              </a:rPr>
+              <a:t>the</a:t>
+            </a:r>
+            <a:r>
+              <a:rPr lang="de-DE" altLang="de-DE" dirty="0" smtClean="0">
+                <a:latin typeface="Univers Light" pitchFamily="-84" charset="0"/>
+              </a:rPr>
+              <a:t> </a:t>
+            </a:r>
+            <a:r>
+              <a:rPr lang="de-DE" altLang="de-DE" dirty="0" err="1" smtClean="0">
+                <a:latin typeface="Univers Light" pitchFamily="-84" charset="0"/>
+              </a:rPr>
+              <a:t>Epiphany</a:t>
+            </a:r>
+            <a:r>
+              <a:rPr lang="de-DE" altLang="de-DE" dirty="0">
+                <a:latin typeface="Univers Light" pitchFamily="-84" charset="0"/>
+              </a:rPr>
+              <a:t> </a:t>
+            </a:r>
+            <a:r>
+              <a:rPr lang="de-DE" altLang="de-DE" dirty="0" err="1" smtClean="0">
+                <a:latin typeface="Univers Light" pitchFamily="-84" charset="0"/>
+              </a:rPr>
+              <a:t>architecture</a:t>
+            </a:r>
+            <a:endParaRPr lang="de-DE" altLang="de-DE" dirty="0" smtClean="0">
+              <a:latin typeface="Univers Light" pitchFamily="-84" charset="0"/>
+            </a:endParaRPr>
+          </a:p>
+        </p:txBody>
+      </p:sp>
+      <p:sp>
+        <p:nvSpPr>
+          <p:cNvPr id="2057" name="Rectangle 9"/>
+          <p:cNvSpPr>
+            <a:spLocks noChangeArrowheads="1"/>
+          </p:cNvSpPr>
+          <p:nvPr/>
+        </p:nvSpPr>
+        <p:spPr bwMode="auto">
+          <a:xfrm>
+            <a:off x="3276600" y="6524625"/>
+            <a:ext cx="2879725" cy="268288"/>
+          </a:xfrm>
+          <a:prstGeom prst="rect">
+            <a:avLst/>
+          </a:prstGeom>
+          <a:noFill/>
+          <a:ln>
+            <a:noFill/>
+          </a:ln>
+          <a:effectLst/>
+          <a:extLst>
+            <a:ext uri="{909E8E84-426E-40dd-AFC4-6F175D3DCCD1}">
+              <a14:hiddenFill xmlns:a14="http://schemas.microsoft.com/office/drawing/2010/main" xmlns="">
+                <a:solidFill>
+                  <a:schemeClr val="accent1"/>
+                </a:solidFill>
+              </a14:hiddenFill>
+            </a:ext>
+            <a:ext uri="{91240B29-F687-4f45-9708-019B960494DF}">
+              <a14:hiddenLine xmlns:a14="http://schemas.microsoft.com/office/drawing/2010/main" xmlns="" w="9525">
+                <a:solidFill>
+                  <a:schemeClr val="tx1"/>
+                </a:solidFill>
+                <a:miter lim="800000"/>
+                <a:headEnd/>
+                <a:tailEnd/>
+              </a14:hiddenLine>
+            </a:ext>
+            <a:ext uri="{AF507438-7753-43e0-B8FC-AC1667EBCBE1}">
+              <a14:hiddenEffects xmlns:a14="http://schemas.microsoft.com/office/drawing/2010/main" xmlns="">
+                <a:effectLst>
+                  <a:outerShdw blurRad="63500" dist="38099" dir="2700000" algn="ctr" rotWithShape="0">
+                    <a:schemeClr val="bg2">
+                      <a:alpha val="74998"/>
+                    </a:schemeClr>
+                  </a:outerShdw>
+                </a:effectLst>
+              </a14:hiddenEffects>
+            </a:ext>
+          </a:extLst>
+        </p:spPr>
+        <p:txBody>
+          <a:bodyPr/>
+          <a:lstStyle/>
+          <a:p>
+            <a:pPr algn="ctr">
+              <a:spcBef>
+                <a:spcPct val="0"/>
+              </a:spcBef>
+              <a:defRPr/>
+            </a:pPr>
+            <a:fld id="{6F754304-0817-43E5-BD17-66FA22235D58}" type="slidenum">
+              <a:rPr lang="de-DE" sz="1200" smtClean="0">
+                <a:solidFill>
+                  <a:schemeClr val="tx1"/>
+                </a:solidFill>
+                <a:latin typeface="Univers 45 Light" charset="0"/>
+                <a:ea typeface="ＭＳ Ｐゴシック" charset="0"/>
+              </a:rPr>
+              <a:t>8</a:t>
+            </a:fld>
+            <a:endParaRPr lang="de-DE" sz="1200" dirty="0">
+              <a:solidFill>
+                <a:schemeClr val="tx1"/>
+              </a:solidFill>
+              <a:latin typeface="Univers 45 Light" charset="0"/>
+              <a:ea typeface="ＭＳ Ｐゴシック" charset="0"/>
+            </a:endParaRPr>
+          </a:p>
+        </p:txBody>
+      </p:sp>
+      <p:pic>
+        <p:nvPicPr>
+          <p:cNvPr id="3" name="Grafik 2"/>
+          <p:cNvPicPr>
+            <a:picLocks noChangeAspect="1"/>
+          </p:cNvPicPr>
+          <p:nvPr/>
+        </p:nvPicPr>
+        <p:blipFill>
+          <a:blip r:embed="rId2">
+            <a:extLst>
+              <a:ext uri="{28A0092B-C50C-407E-A947-70E740481C1C}">
+                <a14:useLocalDpi xmlns:a14="http://schemas.microsoft.com/office/drawing/2010/main" val="0"/>
+              </a:ext>
+            </a:extLst>
+          </a:blip>
+          <a:stretch>
+            <a:fillRect/>
+          </a:stretch>
+        </p:blipFill>
+        <p:spPr>
+          <a:xfrm>
+            <a:off x="180195" y="764704"/>
+            <a:ext cx="8783610" cy="5162885"/>
+          </a:xfrm>
+          <a:prstGeom prst="rect">
+            <a:avLst/>
+          </a:prstGeom>
+        </p:spPr>
+      </p:pic>
+    </p:spTree>
+    <p:extLst>
+      <p:ext uri="{BB962C8B-B14F-4D97-AF65-F5344CB8AC3E}">
+        <p14:creationId xmlns:p14="http://schemas.microsoft.com/office/powerpoint/2010/main" val="2044640734"/>
+      </p:ext>
+    </p:extLst>
+  </p:cSld>
+  <p:clrMapOvr>
+    <a:masterClrMapping/>
+  </p:clrMapOvr>
+  <p:timing>
+    <p:tnLst>
+      <p:par>
+        <p:cTn id="1" dur="indefinite" restart="never" nodeType="tmRoot"/>
+      </p:par>
+    </p:tnLst>
+  </p:timing>
+</p:sld>
+</file>
+
+<file path=ppt/slides/slide9.xml><?xml version="1.0" encoding="utf-8"?>
+<p:sld xmlns:a="http://schemas.openxmlformats.org/drawingml/2006/main" xmlns:r="http://schemas.openxmlformats.org/officeDocument/2006/relationships" xmlns:p="http://schemas.openxmlformats.org/presentationml/2006/main">
+  <p:cSld>
+    <p:spTree>
+      <p:nvGrpSpPr>
+        <p:cNvPr id="1" name=""/>
+        <p:cNvGrpSpPr/>
+        <p:nvPr/>
+      </p:nvGrpSpPr>
+      <p:grpSpPr>
+        <a:xfrm>
+          <a:off x="0" y="0"/>
+          <a:ext cx="0" cy="0"/>
+          <a:chOff x="0" y="0"/>
+          <a:chExt cx="0" cy="0"/>
+        </a:xfrm>
+      </p:grpSpPr>
+      <p:sp>
+        <p:nvSpPr>
+          <p:cNvPr id="2055" name="Rectangle 7"/>
+          <p:cNvSpPr>
+            <a:spLocks noGrp="1" noChangeArrowheads="1"/>
+          </p:cNvSpPr>
+          <p:nvPr>
+            <p:ph type="title"/>
+          </p:nvPr>
+        </p:nvSpPr>
+        <p:spPr/>
+        <p:txBody>
+          <a:bodyPr/>
+          <a:lstStyle/>
+          <a:p>
+            <a:pPr eaLnBrk="1" hangingPunct="1"/>
+            <a:r>
+              <a:rPr lang="de-DE" altLang="de-DE" dirty="0" smtClean="0">
+                <a:latin typeface="Univers Light" pitchFamily="-84" charset="0"/>
+              </a:rPr>
+              <a:t>Memory </a:t>
+            </a:r>
+            <a:r>
+              <a:rPr lang="de-DE" altLang="de-DE" dirty="0" err="1" smtClean="0">
+                <a:latin typeface="Univers Light" pitchFamily="-84" charset="0"/>
+              </a:rPr>
+              <a:t>scheme</a:t>
+            </a:r>
+            <a:r>
+              <a:rPr lang="de-DE" altLang="de-DE" dirty="0" smtClean="0">
+                <a:latin typeface="Univers Light" pitchFamily="-84" charset="0"/>
+              </a:rPr>
+              <a:t> </a:t>
+            </a:r>
+            <a:r>
+              <a:rPr lang="de-DE" altLang="de-DE" dirty="0" err="1" smtClean="0">
+                <a:latin typeface="Univers Light" pitchFamily="-84" charset="0"/>
+              </a:rPr>
+              <a:t>of</a:t>
+            </a:r>
+            <a:r>
+              <a:rPr lang="de-DE" altLang="de-DE" dirty="0" smtClean="0">
+                <a:latin typeface="Univers Light" pitchFamily="-84" charset="0"/>
+              </a:rPr>
+              <a:t> </a:t>
+            </a:r>
+            <a:r>
+              <a:rPr lang="de-DE" altLang="de-DE" dirty="0" err="1" smtClean="0">
+                <a:latin typeface="Univers Light" pitchFamily="-84" charset="0"/>
+              </a:rPr>
+              <a:t>the</a:t>
+            </a:r>
+            <a:r>
+              <a:rPr lang="de-DE" altLang="de-DE" dirty="0" smtClean="0">
+                <a:latin typeface="Univers Light" pitchFamily="-84" charset="0"/>
+              </a:rPr>
+              <a:t> </a:t>
+            </a:r>
+            <a:r>
+              <a:rPr lang="de-DE" altLang="de-DE" dirty="0" err="1" smtClean="0">
+                <a:latin typeface="Univers Light" pitchFamily="-84" charset="0"/>
+              </a:rPr>
+              <a:t>Epiphany</a:t>
+            </a:r>
+            <a:r>
+              <a:rPr lang="de-DE" altLang="de-DE" dirty="0" smtClean="0">
+                <a:latin typeface="Univers Light" pitchFamily="-84" charset="0"/>
+              </a:rPr>
+              <a:t> </a:t>
+            </a:r>
+            <a:r>
+              <a:rPr lang="de-DE" altLang="de-DE" dirty="0" err="1" smtClean="0">
+                <a:latin typeface="Univers Light" pitchFamily="-84" charset="0"/>
+              </a:rPr>
+              <a:t>architecture</a:t>
+            </a:r>
+            <a:endParaRPr lang="de-DE" altLang="de-DE" dirty="0" smtClean="0">
+              <a:latin typeface="Univers Light" pitchFamily="-84" charset="0"/>
+            </a:endParaRPr>
+          </a:p>
+        </p:txBody>
+      </p:sp>
+      <p:sp>
+        <p:nvSpPr>
+          <p:cNvPr id="2057" name="Rectangle 9"/>
+          <p:cNvSpPr>
+            <a:spLocks noChangeArrowheads="1"/>
+          </p:cNvSpPr>
+          <p:nvPr/>
+        </p:nvSpPr>
+        <p:spPr bwMode="auto">
+          <a:xfrm>
+            <a:off x="3276600" y="6524625"/>
+            <a:ext cx="2879725" cy="268288"/>
+          </a:xfrm>
+          <a:prstGeom prst="rect">
+            <a:avLst/>
+          </a:prstGeom>
+          <a:noFill/>
+          <a:ln>
+            <a:noFill/>
+          </a:ln>
+          <a:effectLst/>
+          <a:extLst>
+            <a:ext uri="{909E8E84-426E-40dd-AFC4-6F175D3DCCD1}">
+              <a14:hiddenFill xmlns:a14="http://schemas.microsoft.com/office/drawing/2010/main" xmlns="">
+                <a:solidFill>
+                  <a:schemeClr val="accent1"/>
+                </a:solidFill>
+              </a14:hiddenFill>
+            </a:ext>
+            <a:ext uri="{91240B29-F687-4f45-9708-019B960494DF}">
+              <a14:hiddenLine xmlns:a14="http://schemas.microsoft.com/office/drawing/2010/main" xmlns="" w="9525">
+                <a:solidFill>
+                  <a:schemeClr val="tx1"/>
+                </a:solidFill>
+                <a:miter lim="800000"/>
+                <a:headEnd/>
+                <a:tailEnd/>
+              </a14:hiddenLine>
+            </a:ext>
+            <a:ext uri="{AF507438-7753-43e0-B8FC-AC1667EBCBE1}">
+              <a14:hiddenEffects xmlns:a14="http://schemas.microsoft.com/office/drawing/2010/main" xmlns="">
+                <a:effectLst>
+                  <a:outerShdw blurRad="63500" dist="38099" dir="2700000" algn="ctr" rotWithShape="0">
+                    <a:schemeClr val="bg2">
+                      <a:alpha val="74998"/>
+                    </a:schemeClr>
+                  </a:outerShdw>
+                </a:effectLst>
+              </a14:hiddenEffects>
+            </a:ext>
+          </a:extLst>
+        </p:spPr>
+        <p:txBody>
+          <a:bodyPr/>
+          <a:lstStyle/>
+          <a:p>
+            <a:pPr algn="ctr">
+              <a:spcBef>
+                <a:spcPct val="0"/>
+              </a:spcBef>
+              <a:defRPr/>
+            </a:pPr>
+            <a:fld id="{6F754304-0817-43E5-BD17-66FA22235D58}" type="slidenum">
+              <a:rPr lang="de-DE" sz="1200" smtClean="0">
+                <a:solidFill>
+                  <a:schemeClr val="tx1"/>
+                </a:solidFill>
+                <a:latin typeface="Univers 45 Light" charset="0"/>
+                <a:ea typeface="ＭＳ Ｐゴシック" charset="0"/>
+              </a:rPr>
+              <a:t>9</a:t>
+            </a:fld>
+            <a:endParaRPr lang="de-DE" sz="1200" dirty="0">
+              <a:solidFill>
+                <a:schemeClr val="tx1"/>
+              </a:solidFill>
+              <a:latin typeface="Univers 45 Light" charset="0"/>
+              <a:ea typeface="ＭＳ Ｐゴシック" charset="0"/>
+            </a:endParaRPr>
+          </a:p>
+        </p:txBody>
+      </p:sp>
+      <p:pic>
+        <p:nvPicPr>
+          <p:cNvPr id="2" name="Grafik 1"/>
+          <p:cNvPicPr>
+            <a:picLocks noChangeAspect="1"/>
+          </p:cNvPicPr>
+          <p:nvPr/>
+        </p:nvPicPr>
+        <p:blipFill>
+          <a:blip r:embed="rId2">
+            <a:extLst>
+              <a:ext uri="{28A0092B-C50C-407E-A947-70E740481C1C}">
+                <a14:useLocalDpi xmlns:a14="http://schemas.microsoft.com/office/drawing/2010/main" val="0"/>
+              </a:ext>
+            </a:extLst>
+          </a:blip>
+          <a:stretch>
+            <a:fillRect/>
+          </a:stretch>
+        </p:blipFill>
+        <p:spPr>
+          <a:xfrm>
+            <a:off x="2771800" y="1673907"/>
+            <a:ext cx="6048672" cy="4131357"/>
+          </a:xfrm>
+          <a:prstGeom prst="rect">
+            <a:avLst/>
+          </a:prstGeom>
+        </p:spPr>
+      </p:pic>
+      <p:sp>
+        <p:nvSpPr>
+          <p:cNvPr id="5" name="Rectangle 8"/>
+          <p:cNvSpPr txBox="1">
+            <a:spLocks noChangeArrowheads="1"/>
+          </p:cNvSpPr>
+          <p:nvPr/>
+        </p:nvSpPr>
+        <p:spPr bwMode="auto">
+          <a:xfrm>
+            <a:off x="323850" y="692696"/>
+            <a:ext cx="6624414" cy="5256213"/>
+          </a:xfrm>
+          <a:prstGeom prst="rect">
+            <a:avLst/>
+          </a:prstGeom>
+          <a:noFill/>
+          <a:ln>
+            <a:noFill/>
+          </a:ln>
+          <a:effectLst/>
+          <a:extLst>
+            <a:ext uri="{909E8E84-426E-40dd-AFC4-6F175D3DCCD1}">
+              <a14:hiddenFill xmlns:a14="http://schemas.microsoft.com/office/drawing/2010/main" xmlns="">
+                <a:solidFill>
+                  <a:schemeClr val="accent1"/>
+                </a:solidFill>
+              </a14:hiddenFill>
+            </a:ext>
+            <a:ext uri="{91240B29-F687-4f45-9708-019B960494DF}">
+              <a14:hiddenLine xmlns:a14="http://schemas.microsoft.com/office/drawing/2010/main" xmlns="" w="9525">
+                <a:solidFill>
+                  <a:schemeClr val="tx1"/>
+                </a:solidFill>
+                <a:miter lim="800000"/>
+                <a:headEnd/>
+                <a:tailEnd/>
+              </a14:hiddenLine>
+            </a:ext>
+            <a:ext uri="{AF507438-7753-43e0-B8FC-AC1667EBCBE1}">
+              <a14:hiddenEffects xmlns:a14="http://schemas.microsoft.com/office/drawing/2010/main" xmlns="">
+                <a:effectLst>
+                  <a:outerShdw blurRad="63500" dist="38099" dir="2700000" algn="ctr" rotWithShape="0">
+                    <a:schemeClr val="bg2">
+                      <a:alpha val="74998"/>
+                    </a:schemeClr>
+                  </a:outerShdw>
+                </a:effectLst>
+              </a14:hiddenEffects>
+            </a:ext>
+            <a:ext uri="{FAA26D3D-D897-4be2-8F04-BA451C77F1D7}">
+              <ma14:placeholderFlag xmlns:ma14="http://schemas.microsoft.com/office/mac/drawingml/2011/main" xmlns="" val="1"/>
+            </a:ext>
+          </a:extLst>
+        </p:spPr>
+        <p:txBody>
+          <a:bodyPr vert="horz" wrap="square" lIns="91440" tIns="45720" rIns="91440" bIns="45720" numCol="1" anchor="t" anchorCtr="0" compatLnSpc="1">
+            <a:prstTxWarp prst="textNoShape">
+              <a:avLst/>
+            </a:prstTxWarp>
+          </a:bodyPr>
+          <a:lstStyle>
+            <a:lvl1pPr marL="342900" indent="-342900" algn="l" defTabSz="361950" rtl="0" eaLnBrk="1" fontAlgn="base" hangingPunct="1">
+              <a:spcBef>
+                <a:spcPct val="50000"/>
+              </a:spcBef>
+              <a:spcAft>
+                <a:spcPct val="0"/>
+              </a:spcAft>
+              <a:defRPr>
+                <a:solidFill>
+                  <a:schemeClr val="tx1"/>
+                </a:solidFill>
+                <a:latin typeface="Univers Light"/>
+                <a:ea typeface="+mn-ea"/>
+                <a:cs typeface="Univers Light"/>
+              </a:defRPr>
+            </a:lvl1pPr>
+            <a:lvl2pPr marL="263525" indent="-261938" algn="l" defTabSz="361950" rtl="0" eaLnBrk="1" fontAlgn="base" hangingPunct="1">
+              <a:spcBef>
+                <a:spcPct val="50000"/>
+              </a:spcBef>
+              <a:spcAft>
+                <a:spcPct val="0"/>
+              </a:spcAft>
+              <a:buBlip>
+                <a:blip r:embed="rId3"/>
+              </a:buBlip>
+              <a:defRPr>
+                <a:solidFill>
+                  <a:schemeClr val="tx1"/>
+                </a:solidFill>
+                <a:latin typeface="Univers Light"/>
+                <a:ea typeface="+mn-ea"/>
+                <a:cs typeface="Univers Light"/>
+              </a:defRPr>
+            </a:lvl2pPr>
+            <a:lvl3pPr marL="712788" indent="-269875" algn="l" defTabSz="361950" rtl="0" eaLnBrk="1" fontAlgn="base" hangingPunct="1">
+              <a:spcBef>
+                <a:spcPct val="50000"/>
+              </a:spcBef>
+              <a:spcAft>
+                <a:spcPct val="0"/>
+              </a:spcAft>
+              <a:buClr>
+                <a:srgbClr val="C0C0C0"/>
+              </a:buClr>
+              <a:buFont typeface="Arial" panose="020B0604020202020204" pitchFamily="34" charset="0"/>
+              <a:buChar char="–"/>
+              <a:defRPr>
+                <a:solidFill>
+                  <a:schemeClr val="tx1"/>
+                </a:solidFill>
+                <a:latin typeface="Univers Light"/>
+                <a:ea typeface="+mn-ea"/>
+                <a:cs typeface="Univers Light"/>
+              </a:defRPr>
+            </a:lvl3pPr>
+            <a:lvl4pPr marL="1073150" indent="-179388" algn="l" defTabSz="361950" rtl="0" eaLnBrk="1" fontAlgn="base" hangingPunct="1">
+              <a:spcBef>
+                <a:spcPct val="20000"/>
+              </a:spcBef>
+              <a:spcAft>
+                <a:spcPct val="0"/>
+              </a:spcAft>
+              <a:buClr>
+                <a:srgbClr val="C0C0C0"/>
+              </a:buClr>
+              <a:buChar char="•"/>
+              <a:defRPr>
+                <a:solidFill>
+                  <a:schemeClr val="tx1"/>
+                </a:solidFill>
+                <a:latin typeface="Univers Light"/>
+                <a:ea typeface="+mn-ea"/>
+                <a:cs typeface="Univers Light"/>
+              </a:defRPr>
+            </a:lvl4pPr>
+            <a:lvl5pPr marL="1520825" indent="-180975" algn="l" defTabSz="361950" rtl="0" eaLnBrk="1" fontAlgn="base" hangingPunct="1">
+              <a:spcBef>
+                <a:spcPct val="20000"/>
+              </a:spcBef>
+              <a:spcAft>
+                <a:spcPct val="0"/>
+              </a:spcAft>
+              <a:buClr>
+                <a:srgbClr val="C0C0C0"/>
+              </a:buClr>
+              <a:buChar char="-"/>
+              <a:defRPr sz="1600">
+                <a:solidFill>
+                  <a:schemeClr val="tx1"/>
+                </a:solidFill>
+                <a:latin typeface="Univers Light"/>
+                <a:ea typeface="+mn-ea"/>
+                <a:cs typeface="Univers Light"/>
+              </a:defRPr>
+            </a:lvl5pPr>
+            <a:lvl6pPr marL="1978025" indent="-180975" algn="l" defTabSz="361950" rtl="0" eaLnBrk="1" fontAlgn="base" hangingPunct="1">
+              <a:spcBef>
+                <a:spcPct val="20000"/>
+              </a:spcBef>
+              <a:spcAft>
+                <a:spcPct val="0"/>
+              </a:spcAft>
+              <a:buClr>
+                <a:srgbClr val="C0C0C0"/>
+              </a:buClr>
+              <a:buChar char="-"/>
+              <a:defRPr sz="1600">
+                <a:solidFill>
+                  <a:schemeClr val="tx1"/>
+                </a:solidFill>
+                <a:latin typeface="+mn-lt"/>
+                <a:ea typeface="+mn-ea"/>
+              </a:defRPr>
+            </a:lvl6pPr>
+            <a:lvl7pPr marL="2435225" indent="-180975" algn="l" defTabSz="361950" rtl="0" eaLnBrk="1" fontAlgn="base" hangingPunct="1">
+              <a:spcBef>
+                <a:spcPct val="20000"/>
+              </a:spcBef>
+              <a:spcAft>
+                <a:spcPct val="0"/>
+              </a:spcAft>
+              <a:buClr>
+                <a:srgbClr val="C0C0C0"/>
+              </a:buClr>
+              <a:buChar char="-"/>
+              <a:defRPr sz="1600">
+                <a:solidFill>
+                  <a:schemeClr val="tx1"/>
+                </a:solidFill>
+                <a:latin typeface="+mn-lt"/>
+                <a:ea typeface="+mn-ea"/>
+              </a:defRPr>
+            </a:lvl7pPr>
+            <a:lvl8pPr marL="2892425" indent="-180975" algn="l" defTabSz="361950" rtl="0" eaLnBrk="1" fontAlgn="base" hangingPunct="1">
+              <a:spcBef>
+                <a:spcPct val="20000"/>
+              </a:spcBef>
+              <a:spcAft>
+                <a:spcPct val="0"/>
+              </a:spcAft>
+              <a:buClr>
+                <a:srgbClr val="C0C0C0"/>
+              </a:buClr>
+              <a:buChar char="-"/>
+              <a:defRPr sz="1600">
+                <a:solidFill>
+                  <a:schemeClr val="tx1"/>
+                </a:solidFill>
+                <a:latin typeface="+mn-lt"/>
+                <a:ea typeface="+mn-ea"/>
+              </a:defRPr>
+            </a:lvl8pPr>
+            <a:lvl9pPr marL="3349625" indent="-180975" algn="l" defTabSz="361950" rtl="0" eaLnBrk="1" fontAlgn="base" hangingPunct="1">
+              <a:spcBef>
+                <a:spcPct val="20000"/>
+              </a:spcBef>
+              <a:spcAft>
+                <a:spcPct val="0"/>
+              </a:spcAft>
+              <a:buClr>
+                <a:srgbClr val="C0C0C0"/>
+              </a:buClr>
+              <a:buChar char="-"/>
+              <a:defRPr sz="1600">
+                <a:solidFill>
+                  <a:schemeClr val="tx1"/>
+                </a:solidFill>
+                <a:latin typeface="+mn-lt"/>
+                <a:ea typeface="+mn-ea"/>
+              </a:defRPr>
+            </a:lvl9pPr>
+          </a:lstStyle>
+          <a:p>
+            <a:pPr marL="1587" lvl="1" indent="0">
+              <a:buNone/>
+            </a:pPr>
+            <a:r>
+              <a:rPr lang="en-US" altLang="de-DE" b="1" kern="0" dirty="0" smtClean="0">
+                <a:latin typeface="Univers Light" pitchFamily="-84" charset="0"/>
+              </a:rPr>
+              <a:t>Attributes:</a:t>
+            </a:r>
+            <a:endParaRPr lang="en-US" altLang="de-DE" b="1" kern="0" dirty="0" smtClean="0">
+              <a:latin typeface="Univers Light" pitchFamily="-84" charset="0"/>
+            </a:endParaRPr>
+          </a:p>
+          <a:p>
+            <a:pPr lvl="1"/>
+            <a:r>
+              <a:rPr lang="en-US" dirty="0"/>
+              <a:t>flat 32 bit address space split into 4096 1-MiB </a:t>
+            </a:r>
+            <a:r>
+              <a:rPr lang="en-US" dirty="0" smtClean="0"/>
+              <a:t>chunks</a:t>
+            </a:r>
+          </a:p>
+          <a:p>
+            <a:pPr lvl="1"/>
+            <a:r>
+              <a:rPr lang="en-US" altLang="de-DE" kern="0" dirty="0" smtClean="0">
+                <a:latin typeface="Univers Light" pitchFamily="-84" charset="0"/>
+              </a:rPr>
+              <a:t>Each core is assigned his </a:t>
+            </a:r>
+            <a:r>
+              <a:rPr lang="en-US" altLang="de-DE" kern="0" dirty="0" smtClean="0">
+                <a:latin typeface="Univers Light" pitchFamily="-84" charset="0"/>
+              </a:rPr>
+              <a:t>own 1-MiB chunk</a:t>
+            </a:r>
+          </a:p>
+          <a:p>
+            <a:pPr lvl="2"/>
+            <a:r>
+              <a:rPr lang="en-US" altLang="de-DE" kern="0" dirty="0" smtClean="0">
+                <a:latin typeface="Univers Light" pitchFamily="-84" charset="0"/>
+              </a:rPr>
+              <a:t>But has transparent access to memory of any other core</a:t>
+            </a:r>
+          </a:p>
+          <a:p>
+            <a:pPr lvl="1"/>
+            <a:r>
+              <a:rPr lang="en-US" altLang="de-DE" kern="0" dirty="0" smtClean="0">
+                <a:latin typeface="Univers Light" pitchFamily="-84" charset="0"/>
+              </a:rPr>
+              <a:t>Optimal performance only if data is placed in local memory banks</a:t>
+            </a:r>
+            <a:endParaRPr lang="en-US" altLang="de-DE" kern="0" dirty="0" smtClean="0">
+              <a:latin typeface="Univers Light" pitchFamily="-84" charset="0"/>
+            </a:endParaRPr>
+          </a:p>
+        </p:txBody>
+      </p:sp>
+    </p:spTree>
+    <p:extLst>
+      <p:ext uri="{BB962C8B-B14F-4D97-AF65-F5344CB8AC3E}">
+        <p14:creationId xmlns:p14="http://schemas.microsoft.com/office/powerpoint/2010/main" val="3101319135"/>
       </p:ext>
     </p:extLst>
   </p:cSld>

</xml_diff>

<commit_message>
new speedup diagram in presentation
</commit_message>
<xml_diff>
--- a/presentation/praesentation.pptx
+++ b/presentation/praesentation.pptx
@@ -660,6 +660,1126 @@
 </c:chartSpace>
 </file>
 
+<file path=ppt/charts/chart2.xml><?xml version="1.0" encoding="utf-8"?>
+<c:chartSpace xmlns:c="http://schemas.openxmlformats.org/drawingml/2006/chart" xmlns:a="http://schemas.openxmlformats.org/drawingml/2006/main" xmlns:r="http://schemas.openxmlformats.org/officeDocument/2006/relationships">
+  <c:date1904 val="0"/>
+  <c:lang val="de-DE"/>
+  <c:roundedCorners val="0"/>
+  <mc:AlternateContent xmlns:mc="http://schemas.openxmlformats.org/markup-compatibility/2006">
+    <mc:Choice xmlns:c14="http://schemas.microsoft.com/office/drawing/2007/8/2/chart" Requires="c14">
+      <c14:style val="102"/>
+    </mc:Choice>
+    <mc:Fallback>
+      <c:style val="2"/>
+    </mc:Fallback>
+  </mc:AlternateContent>
+  <c:chart>
+    <c:autoTitleDeleted val="1"/>
+    <c:plotArea>
+      <c:layout>
+        <c:manualLayout>
+          <c:layoutTarget val="inner"/>
+          <c:xMode val="edge"/>
+          <c:yMode val="edge"/>
+          <c:x val="5.7632493372368206E-2"/>
+          <c:y val="1.1927828953086203E-2"/>
+          <c:w val="0.92511158818207317"/>
+          <c:h val="0.86961495006396783"/>
+        </c:manualLayout>
+      </c:layout>
+      <c:scatterChart>
+        <c:scatterStyle val="smoothMarker"/>
+        <c:varyColors val="0"/>
+        <c:ser>
+          <c:idx val="0"/>
+          <c:order val="0"/>
+          <c:tx>
+            <c:v>Speedup</c:v>
+          </c:tx>
+          <c:spPr>
+            <a:ln w="19050" cap="rnd">
+              <a:noFill/>
+              <a:round/>
+            </a:ln>
+            <a:effectLst/>
+          </c:spPr>
+          <c:marker>
+            <c:symbol val="circle"/>
+            <c:size val="5"/>
+            <c:spPr>
+              <a:solidFill>
+                <a:srgbClr val="E56B20"/>
+              </a:solidFill>
+              <a:ln w="34925">
+                <a:solidFill>
+                  <a:srgbClr val="E56B20"/>
+                </a:solidFill>
+              </a:ln>
+              <a:effectLst/>
+            </c:spPr>
+          </c:marker>
+          <c:xVal>
+            <c:numRef>
+              <c:f>(Tabelle1!$I$3,Tabelle1!$I$4,Tabelle1!$I$5,Tabelle1!$I$6,Tabelle1!$I$8,Tabelle1!$I$10,Tabelle1!$I$11,Tabelle1!$I$14,Tabelle1!$I$18)</c:f>
+              <c:numCache>
+                <c:formatCode>General</c:formatCode>
+                <c:ptCount val="9"/>
+                <c:pt idx="0">
+                  <c:v>1</c:v>
+                </c:pt>
+                <c:pt idx="1">
+                  <c:v>2</c:v>
+                </c:pt>
+                <c:pt idx="2">
+                  <c:v>3</c:v>
+                </c:pt>
+                <c:pt idx="3">
+                  <c:v>4</c:v>
+                </c:pt>
+                <c:pt idx="4">
+                  <c:v>6</c:v>
+                </c:pt>
+                <c:pt idx="5">
+                  <c:v>8</c:v>
+                </c:pt>
+                <c:pt idx="6">
+                  <c:v>9</c:v>
+                </c:pt>
+                <c:pt idx="7">
+                  <c:v>12</c:v>
+                </c:pt>
+                <c:pt idx="8">
+                  <c:v>16</c:v>
+                </c:pt>
+              </c:numCache>
+            </c:numRef>
+          </c:xVal>
+          <c:yVal>
+            <c:numRef>
+              <c:f>(Tabelle1!$N$3,Tabelle1!$N$4,Tabelle1!$N$5,Tabelle1!$N$6,Tabelle1!$N$8,Tabelle1!$N$10,Tabelle1!$N$11,Tabelle1!$N$14,Tabelle1!$N$18)</c:f>
+              <c:numCache>
+                <c:formatCode>0.00</c:formatCode>
+                <c:ptCount val="9"/>
+                <c:pt idx="0">
+                  <c:v>1</c:v>
+                </c:pt>
+                <c:pt idx="1">
+                  <c:v>1.4858687041006275</c:v>
+                </c:pt>
+                <c:pt idx="2">
+                  <c:v>1.7547597591564736</c:v>
+                </c:pt>
+                <c:pt idx="3">
+                  <c:v>1.8894976745623384</c:v>
+                </c:pt>
+                <c:pt idx="4">
+                  <c:v>2.1585158773586572</c:v>
+                </c:pt>
+                <c:pt idx="5">
+                  <c:v>2.269572834850262</c:v>
+                </c:pt>
+                <c:pt idx="6">
+                  <c:v>2.0898371010411041</c:v>
+                </c:pt>
+                <c:pt idx="7">
+                  <c:v>2.1480284421460891</c:v>
+                </c:pt>
+                <c:pt idx="8">
+                  <c:v>2.5063824554211926</c:v>
+                </c:pt>
+              </c:numCache>
+            </c:numRef>
+          </c:yVal>
+          <c:smooth val="0"/>
+        </c:ser>
+        <c:ser>
+          <c:idx val="1"/>
+          <c:order val="1"/>
+          <c:tx>
+            <c:v>Optimal speedup according to Amdahl</c:v>
+          </c:tx>
+          <c:spPr>
+            <a:ln w="3175" cap="rnd">
+              <a:solidFill>
+                <a:schemeClr val="bg2">
+                  <a:lumMod val="75000"/>
+                </a:schemeClr>
+              </a:solidFill>
+              <a:prstDash val="dash"/>
+              <a:round/>
+            </a:ln>
+            <a:effectLst/>
+          </c:spPr>
+          <c:marker>
+            <c:symbol val="circle"/>
+            <c:size val="5"/>
+            <c:spPr>
+              <a:noFill/>
+              <a:ln w="9525">
+                <a:noFill/>
+              </a:ln>
+              <a:effectLst/>
+            </c:spPr>
+          </c:marker>
+          <c:yVal>
+            <c:numRef>
+              <c:f>Tabelle1!$O$3:$O$18</c:f>
+              <c:numCache>
+                <c:formatCode>0.00</c:formatCode>
+                <c:ptCount val="16"/>
+                <c:pt idx="0">
+                  <c:v>1</c:v>
+                </c:pt>
+                <c:pt idx="1">
+                  <c:v>1.480101137371808</c:v>
+                </c:pt>
+                <c:pt idx="2">
+                  <c:v>1.7620958832785452</c:v>
+                </c:pt>
+                <c:pt idx="3">
+                  <c:v>1.94763108752175</c:v>
+                </c:pt>
+                <c:pt idx="4">
+                  <c:v>2.0789709190515437</c:v>
+                </c:pt>
+                <c:pt idx="5">
+                  <c:v>2.1768351622008599</c:v>
+                </c:pt>
+                <c:pt idx="6">
+                  <c:v>2.2525754476968598</c:v>
+                </c:pt>
+                <c:pt idx="7">
+                  <c:v>2.3129321566897372</c:v>
+                </c:pt>
+                <c:pt idx="8">
+                  <c:v>2.3621600274725276</c:v>
+                </c:pt>
+                <c:pt idx="9">
+                  <c:v>2.4030772241941132</c:v>
+                </c:pt>
+                <c:pt idx="10">
+                  <c:v>2.4376244499195763</c:v>
+                </c:pt>
+                <c:pt idx="11">
+                  <c:v>2.4671817904558742</c:v>
+                </c:pt>
+                <c:pt idx="12">
+                  <c:v>2.4927575137580269</c:v>
+                </c:pt>
+                <c:pt idx="13">
+                  <c:v>2.515105385556736</c:v>
+                </c:pt>
+                <c:pt idx="14">
+                  <c:v>2.5348002031934986</c:v>
+                </c:pt>
+                <c:pt idx="15">
+                  <c:v>2.552287935524082</c:v>
+                </c:pt>
+              </c:numCache>
+            </c:numRef>
+          </c:yVal>
+          <c:smooth val="1"/>
+        </c:ser>
+        <c:dLbls>
+          <c:showLegendKey val="0"/>
+          <c:showVal val="0"/>
+          <c:showCatName val="0"/>
+          <c:showSerName val="0"/>
+          <c:showPercent val="0"/>
+          <c:showBubbleSize val="0"/>
+        </c:dLbls>
+        <c:axId val="424765424"/>
+        <c:axId val="427248536"/>
+      </c:scatterChart>
+      <c:valAx>
+        <c:axId val="424765424"/>
+        <c:scaling>
+          <c:orientation val="minMax"/>
+          <c:max val="16"/>
+          <c:min val="1"/>
+        </c:scaling>
+        <c:delete val="0"/>
+        <c:axPos val="b"/>
+        <c:majorGridlines>
+          <c:spPr>
+            <a:ln w="9525" cap="flat" cmpd="sng" algn="ctr">
+              <a:solidFill>
+                <a:schemeClr val="tx1">
+                  <a:lumMod val="15000"/>
+                  <a:lumOff val="85000"/>
+                </a:schemeClr>
+              </a:solidFill>
+              <a:round/>
+            </a:ln>
+            <a:effectLst/>
+          </c:spPr>
+        </c:majorGridlines>
+        <c:title>
+          <c:tx>
+            <c:rich>
+              <a:bodyPr rot="0" spcFirstLastPara="1" vertOverflow="ellipsis" vert="horz" wrap="square" anchor="ctr" anchorCtr="1"/>
+              <a:lstStyle/>
+              <a:p>
+                <a:pPr>
+                  <a:defRPr sz="1000" b="0" i="0" u="none" strike="noStrike" kern="1200" baseline="0">
+                    <a:solidFill>
+                      <a:schemeClr val="tx1">
+                        <a:lumMod val="65000"/>
+                        <a:lumOff val="35000"/>
+                      </a:schemeClr>
+                    </a:solidFill>
+                    <a:latin typeface="+mn-lt"/>
+                    <a:ea typeface="+mn-ea"/>
+                    <a:cs typeface="+mn-cs"/>
+                  </a:defRPr>
+                </a:pPr>
+                <a:r>
+                  <a:rPr lang="de-DE" dirty="0" err="1" smtClean="0"/>
+                  <a:t>Number</a:t>
+                </a:r>
+                <a:r>
+                  <a:rPr lang="de-DE" dirty="0" smtClean="0"/>
+                  <a:t> </a:t>
+                </a:r>
+                <a:r>
+                  <a:rPr lang="de-DE" dirty="0" err="1" smtClean="0"/>
+                  <a:t>of</a:t>
+                </a:r>
+                <a:r>
+                  <a:rPr lang="de-DE" baseline="0" dirty="0" smtClean="0"/>
+                  <a:t> </a:t>
+                </a:r>
+                <a:r>
+                  <a:rPr lang="de-DE" baseline="0" dirty="0" err="1" smtClean="0"/>
+                  <a:t>cores</a:t>
+                </a:r>
+                <a:endParaRPr lang="de-DE" baseline="0" dirty="0" smtClean="0"/>
+              </a:p>
+            </c:rich>
+          </c:tx>
+          <c:layout>
+            <c:manualLayout>
+              <c:xMode val="edge"/>
+              <c:yMode val="edge"/>
+              <c:x val="0.46194993485572317"/>
+              <c:y val="0.91127356700626339"/>
+            </c:manualLayout>
+          </c:layout>
+          <c:overlay val="0"/>
+          <c:spPr>
+            <a:noFill/>
+            <a:ln>
+              <a:noFill/>
+            </a:ln>
+            <a:effectLst/>
+          </c:spPr>
+          <c:txPr>
+            <a:bodyPr rot="0" spcFirstLastPara="1" vertOverflow="ellipsis" vert="horz" wrap="square" anchor="ctr" anchorCtr="1"/>
+            <a:lstStyle/>
+            <a:p>
+              <a:pPr>
+                <a:defRPr sz="1000" b="0" i="0" u="none" strike="noStrike" kern="1200" baseline="0">
+                  <a:solidFill>
+                    <a:schemeClr val="tx1">
+                      <a:lumMod val="65000"/>
+                      <a:lumOff val="35000"/>
+                    </a:schemeClr>
+                  </a:solidFill>
+                  <a:latin typeface="+mn-lt"/>
+                  <a:ea typeface="+mn-ea"/>
+                  <a:cs typeface="+mn-cs"/>
+                </a:defRPr>
+              </a:pPr>
+              <a:endParaRPr lang="de-DE"/>
+            </a:p>
+          </c:txPr>
+        </c:title>
+        <c:numFmt formatCode="General" sourceLinked="1"/>
+        <c:majorTickMark val="none"/>
+        <c:minorTickMark val="none"/>
+        <c:tickLblPos val="nextTo"/>
+        <c:spPr>
+          <a:noFill/>
+          <a:ln w="9525" cap="flat" cmpd="sng" algn="ctr">
+            <a:solidFill>
+              <a:schemeClr val="tx1">
+                <a:lumMod val="25000"/>
+                <a:lumOff val="75000"/>
+              </a:schemeClr>
+            </a:solidFill>
+            <a:round/>
+          </a:ln>
+          <a:effectLst/>
+        </c:spPr>
+        <c:txPr>
+          <a:bodyPr rot="-60000000" spcFirstLastPara="1" vertOverflow="ellipsis" vert="horz" wrap="square" anchor="ctr" anchorCtr="1"/>
+          <a:lstStyle/>
+          <a:p>
+            <a:pPr>
+              <a:defRPr sz="900" b="0" i="0" u="none" strike="noStrike" kern="1200" baseline="0">
+                <a:solidFill>
+                  <a:schemeClr val="tx1">
+                    <a:lumMod val="65000"/>
+                    <a:lumOff val="35000"/>
+                  </a:schemeClr>
+                </a:solidFill>
+                <a:latin typeface="+mn-lt"/>
+                <a:ea typeface="+mn-ea"/>
+                <a:cs typeface="+mn-cs"/>
+              </a:defRPr>
+            </a:pPr>
+            <a:endParaRPr lang="de-DE"/>
+          </a:p>
+        </c:txPr>
+        <c:crossAx val="427248536"/>
+        <c:crosses val="autoZero"/>
+        <c:crossBetween val="midCat"/>
+        <c:majorUnit val="1"/>
+      </c:valAx>
+      <c:valAx>
+        <c:axId val="427248536"/>
+        <c:scaling>
+          <c:orientation val="minMax"/>
+          <c:max val="2.6"/>
+          <c:min val="1"/>
+        </c:scaling>
+        <c:delete val="0"/>
+        <c:axPos val="l"/>
+        <c:majorGridlines>
+          <c:spPr>
+            <a:ln w="9525" cap="flat" cmpd="sng" algn="ctr">
+              <a:solidFill>
+                <a:schemeClr val="tx1">
+                  <a:lumMod val="15000"/>
+                  <a:lumOff val="85000"/>
+                </a:schemeClr>
+              </a:solidFill>
+              <a:round/>
+            </a:ln>
+            <a:effectLst/>
+          </c:spPr>
+        </c:majorGridlines>
+        <c:title>
+          <c:tx>
+            <c:rich>
+              <a:bodyPr rot="-5400000" spcFirstLastPara="1" vertOverflow="ellipsis" vert="horz" wrap="square" anchor="ctr" anchorCtr="1"/>
+              <a:lstStyle/>
+              <a:p>
+                <a:pPr>
+                  <a:defRPr sz="1000" b="0" i="0" u="none" strike="noStrike" kern="1200" baseline="0">
+                    <a:solidFill>
+                      <a:schemeClr val="tx1">
+                        <a:lumMod val="65000"/>
+                        <a:lumOff val="35000"/>
+                      </a:schemeClr>
+                    </a:solidFill>
+                    <a:latin typeface="+mn-lt"/>
+                    <a:ea typeface="+mn-ea"/>
+                    <a:cs typeface="+mn-cs"/>
+                  </a:defRPr>
+                </a:pPr>
+                <a:r>
+                  <a:rPr lang="de-DE" dirty="0" err="1" smtClean="0"/>
+                  <a:t>Speedup</a:t>
+                </a:r>
+                <a:endParaRPr lang="de-DE" dirty="0" smtClean="0"/>
+              </a:p>
+            </c:rich>
+          </c:tx>
+          <c:layout/>
+          <c:overlay val="0"/>
+          <c:spPr>
+            <a:noFill/>
+            <a:ln>
+              <a:noFill/>
+            </a:ln>
+            <a:effectLst/>
+          </c:spPr>
+          <c:txPr>
+            <a:bodyPr rot="-5400000" spcFirstLastPara="1" vertOverflow="ellipsis" vert="horz" wrap="square" anchor="ctr" anchorCtr="1"/>
+            <a:lstStyle/>
+            <a:p>
+              <a:pPr>
+                <a:defRPr sz="1000" b="0" i="0" u="none" strike="noStrike" kern="1200" baseline="0">
+                  <a:solidFill>
+                    <a:schemeClr val="tx1">
+                      <a:lumMod val="65000"/>
+                      <a:lumOff val="35000"/>
+                    </a:schemeClr>
+                  </a:solidFill>
+                  <a:latin typeface="+mn-lt"/>
+                  <a:ea typeface="+mn-ea"/>
+                  <a:cs typeface="+mn-cs"/>
+                </a:defRPr>
+              </a:pPr>
+              <a:endParaRPr lang="de-DE"/>
+            </a:p>
+          </c:txPr>
+        </c:title>
+        <c:numFmt formatCode="0.00" sourceLinked="1"/>
+        <c:majorTickMark val="none"/>
+        <c:minorTickMark val="none"/>
+        <c:tickLblPos val="nextTo"/>
+        <c:spPr>
+          <a:noFill/>
+          <a:ln w="9525" cap="flat" cmpd="sng" algn="ctr">
+            <a:solidFill>
+              <a:schemeClr val="tx1">
+                <a:lumMod val="25000"/>
+                <a:lumOff val="75000"/>
+              </a:schemeClr>
+            </a:solidFill>
+            <a:round/>
+          </a:ln>
+          <a:effectLst/>
+        </c:spPr>
+        <c:txPr>
+          <a:bodyPr rot="-60000000" spcFirstLastPara="1" vertOverflow="ellipsis" vert="horz" wrap="square" anchor="ctr" anchorCtr="1"/>
+          <a:lstStyle/>
+          <a:p>
+            <a:pPr>
+              <a:defRPr sz="900" b="0" i="0" u="none" strike="noStrike" kern="1200" baseline="0">
+                <a:solidFill>
+                  <a:schemeClr val="tx1">
+                    <a:lumMod val="65000"/>
+                    <a:lumOff val="35000"/>
+                  </a:schemeClr>
+                </a:solidFill>
+                <a:latin typeface="+mn-lt"/>
+                <a:ea typeface="+mn-ea"/>
+                <a:cs typeface="+mn-cs"/>
+              </a:defRPr>
+            </a:pPr>
+            <a:endParaRPr lang="de-DE"/>
+          </a:p>
+        </c:txPr>
+        <c:crossAx val="424765424"/>
+        <c:crosses val="autoZero"/>
+        <c:crossBetween val="midCat"/>
+      </c:valAx>
+      <c:spPr>
+        <a:noFill/>
+        <a:ln>
+          <a:noFill/>
+        </a:ln>
+        <a:effectLst/>
+      </c:spPr>
+    </c:plotArea>
+    <c:legend>
+      <c:legendPos val="b"/>
+      <c:layout/>
+      <c:overlay val="0"/>
+      <c:spPr>
+        <a:noFill/>
+        <a:ln>
+          <a:noFill/>
+        </a:ln>
+        <a:effectLst/>
+      </c:spPr>
+      <c:txPr>
+        <a:bodyPr rot="0" spcFirstLastPara="1" vertOverflow="ellipsis" vert="horz" wrap="square" anchor="ctr" anchorCtr="1"/>
+        <a:lstStyle/>
+        <a:p>
+          <a:pPr>
+            <a:defRPr sz="900" b="0" i="0" u="none" strike="noStrike" kern="1200" baseline="0">
+              <a:solidFill>
+                <a:schemeClr val="tx1">
+                  <a:lumMod val="65000"/>
+                  <a:lumOff val="35000"/>
+                </a:schemeClr>
+              </a:solidFill>
+              <a:latin typeface="+mn-lt"/>
+              <a:ea typeface="+mn-ea"/>
+              <a:cs typeface="+mn-cs"/>
+            </a:defRPr>
+          </a:pPr>
+          <a:endParaRPr lang="de-DE"/>
+        </a:p>
+      </c:txPr>
+    </c:legend>
+    <c:plotVisOnly val="1"/>
+    <c:dispBlanksAs val="gap"/>
+    <c:showDLblsOverMax val="0"/>
+  </c:chart>
+  <c:spPr>
+    <a:noFill/>
+    <a:ln>
+      <a:noFill/>
+    </a:ln>
+    <a:effectLst/>
+  </c:spPr>
+  <c:txPr>
+    <a:bodyPr/>
+    <a:lstStyle/>
+    <a:p>
+      <a:pPr>
+        <a:defRPr/>
+      </a:pPr>
+      <a:endParaRPr lang="de-DE"/>
+    </a:p>
+  </c:txPr>
+  <c:externalData r:id="rId3">
+    <c:autoUpdate val="0"/>
+  </c:externalData>
+</c:chartSpace>
+</file>
+
+<file path=ppt/charts/colors1.xml><?xml version="1.0" encoding="utf-8"?>
+<cs:colorStyle xmlns:cs="http://schemas.microsoft.com/office/drawing/2012/chartStyle" xmlns:a="http://schemas.openxmlformats.org/drawingml/2006/main" meth="cycle" id="10">
+  <a:schemeClr val="accent1"/>
+  <a:schemeClr val="accent2"/>
+  <a:schemeClr val="accent3"/>
+  <a:schemeClr val="accent4"/>
+  <a:schemeClr val="accent5"/>
+  <a:schemeClr val="accent6"/>
+  <cs:variation/>
+  <cs:variation>
+    <a:lumMod val="60000"/>
+  </cs:variation>
+  <cs:variation>
+    <a:lumMod val="80000"/>
+    <a:lumOff val="20000"/>
+  </cs:variation>
+  <cs:variation>
+    <a:lumMod val="80000"/>
+  </cs:variation>
+  <cs:variation>
+    <a:lumMod val="60000"/>
+    <a:lumOff val="40000"/>
+  </cs:variation>
+  <cs:variation>
+    <a:lumMod val="50000"/>
+  </cs:variation>
+  <cs:variation>
+    <a:lumMod val="70000"/>
+    <a:lumOff val="30000"/>
+  </cs:variation>
+  <cs:variation>
+    <a:lumMod val="70000"/>
+  </cs:variation>
+  <cs:variation>
+    <a:lumMod val="50000"/>
+    <a:lumOff val="50000"/>
+  </cs:variation>
+</cs:colorStyle>
+</file>
+
+<file path=ppt/charts/style1.xml><?xml version="1.0" encoding="utf-8"?>
+<cs:chartStyle xmlns:cs="http://schemas.microsoft.com/office/drawing/2012/chartStyle" xmlns:a="http://schemas.openxmlformats.org/drawingml/2006/main" id="240">
+  <cs:axisTitle>
+    <cs:lnRef idx="0"/>
+    <cs:fillRef idx="0"/>
+    <cs:effectRef idx="0"/>
+    <cs:fontRef idx="minor">
+      <a:schemeClr val="tx1">
+        <a:lumMod val="65000"/>
+        <a:lumOff val="35000"/>
+      </a:schemeClr>
+    </cs:fontRef>
+    <cs:defRPr sz="1000" kern="1200"/>
+  </cs:axisTitle>
+  <cs:categoryAxis>
+    <cs:lnRef idx="0"/>
+    <cs:fillRef idx="0"/>
+    <cs:effectRef idx="0"/>
+    <cs:fontRef idx="minor">
+      <a:schemeClr val="tx1">
+        <a:lumMod val="65000"/>
+        <a:lumOff val="35000"/>
+      </a:schemeClr>
+    </cs:fontRef>
+    <cs:spPr>
+      <a:ln w="9525" cap="flat" cmpd="sng" algn="ctr">
+        <a:solidFill>
+          <a:schemeClr val="tx1">
+            <a:lumMod val="25000"/>
+            <a:lumOff val="75000"/>
+          </a:schemeClr>
+        </a:solidFill>
+        <a:round/>
+      </a:ln>
+    </cs:spPr>
+    <cs:defRPr sz="900" kern="1200"/>
+  </cs:categoryAxis>
+  <cs:chartArea mods="allowNoFillOverride allowNoLineOverride">
+    <cs:lnRef idx="0"/>
+    <cs:fillRef idx="0"/>
+    <cs:effectRef idx="0"/>
+    <cs:fontRef idx="minor">
+      <a:schemeClr val="tx1"/>
+    </cs:fontRef>
+    <cs:spPr>
+      <a:solidFill>
+        <a:schemeClr val="bg1"/>
+      </a:solidFill>
+      <a:ln w="9525" cap="flat" cmpd="sng" algn="ctr">
+        <a:solidFill>
+          <a:schemeClr val="tx1">
+            <a:lumMod val="15000"/>
+            <a:lumOff val="85000"/>
+          </a:schemeClr>
+        </a:solidFill>
+        <a:round/>
+      </a:ln>
+    </cs:spPr>
+    <cs:defRPr sz="1000" kern="1200"/>
+  </cs:chartArea>
+  <cs:dataLabel>
+    <cs:lnRef idx="0"/>
+    <cs:fillRef idx="0"/>
+    <cs:effectRef idx="0"/>
+    <cs:fontRef idx="minor">
+      <a:schemeClr val="tx1">
+        <a:lumMod val="75000"/>
+        <a:lumOff val="25000"/>
+      </a:schemeClr>
+    </cs:fontRef>
+    <cs:defRPr sz="900" kern="1200"/>
+  </cs:dataLabel>
+  <cs:dataLabelCallout>
+    <cs:lnRef idx="0"/>
+    <cs:fillRef idx="0"/>
+    <cs:effectRef idx="0"/>
+    <cs:fontRef idx="minor">
+      <a:schemeClr val="dk1">
+        <a:lumMod val="65000"/>
+        <a:lumOff val="35000"/>
+      </a:schemeClr>
+    </cs:fontRef>
+    <cs:spPr>
+      <a:solidFill>
+        <a:schemeClr val="lt1"/>
+      </a:solidFill>
+      <a:ln>
+        <a:solidFill>
+          <a:schemeClr val="dk1">
+            <a:lumMod val="25000"/>
+            <a:lumOff val="75000"/>
+          </a:schemeClr>
+        </a:solidFill>
+      </a:ln>
+    </cs:spPr>
+    <cs:defRPr sz="900" kern="1200"/>
+    <cs:bodyPr rot="0" spcFirstLastPara="1" vertOverflow="clip" horzOverflow="clip" vert="horz" wrap="square" lIns="36576" tIns="18288" rIns="36576" bIns="18288" anchor="ctr" anchorCtr="1">
+      <a:spAutoFit/>
+    </cs:bodyPr>
+  </cs:dataLabelCallout>
+  <cs:dataPoint>
+    <cs:lnRef idx="0"/>
+    <cs:fillRef idx="1">
+      <cs:styleClr val="auto"/>
+    </cs:fillRef>
+    <cs:effectRef idx="0"/>
+    <cs:fontRef idx="minor">
+      <a:schemeClr val="tx1"/>
+    </cs:fontRef>
+  </cs:dataPoint>
+  <cs:dataPoint3D>
+    <cs:lnRef idx="0"/>
+    <cs:fillRef idx="1">
+      <cs:styleClr val="auto"/>
+    </cs:fillRef>
+    <cs:effectRef idx="0"/>
+    <cs:fontRef idx="minor">
+      <a:schemeClr val="tx1"/>
+    </cs:fontRef>
+  </cs:dataPoint3D>
+  <cs:dataPointLine>
+    <cs:lnRef idx="0">
+      <cs:styleClr val="auto"/>
+    </cs:lnRef>
+    <cs:fillRef idx="1"/>
+    <cs:effectRef idx="0"/>
+    <cs:fontRef idx="minor">
+      <a:schemeClr val="tx1"/>
+    </cs:fontRef>
+    <cs:spPr>
+      <a:ln w="19050" cap="rnd">
+        <a:solidFill>
+          <a:schemeClr val="phClr"/>
+        </a:solidFill>
+        <a:round/>
+      </a:ln>
+    </cs:spPr>
+  </cs:dataPointLine>
+  <cs:dataPointMarker>
+    <cs:lnRef idx="0">
+      <cs:styleClr val="auto"/>
+    </cs:lnRef>
+    <cs:fillRef idx="1">
+      <cs:styleClr val="auto"/>
+    </cs:fillRef>
+    <cs:effectRef idx="0"/>
+    <cs:fontRef idx="minor">
+      <a:schemeClr val="tx1"/>
+    </cs:fontRef>
+    <cs:spPr>
+      <a:ln w="9525">
+        <a:solidFill>
+          <a:schemeClr val="phClr"/>
+        </a:solidFill>
+      </a:ln>
+    </cs:spPr>
+  </cs:dataPointMarker>
+  <cs:dataPointMarkerLayout symbol="circle" size="5"/>
+  <cs:dataPointWireframe>
+    <cs:lnRef idx="0">
+      <cs:styleClr val="auto"/>
+    </cs:lnRef>
+    <cs:fillRef idx="0"/>
+    <cs:effectRef idx="0"/>
+    <cs:fontRef idx="minor">
+      <a:schemeClr val="dk1"/>
+    </cs:fontRef>
+    <cs:spPr>
+      <a:ln w="9525" cap="rnd">
+        <a:solidFill>
+          <a:schemeClr val="phClr"/>
+        </a:solidFill>
+        <a:round/>
+      </a:ln>
+    </cs:spPr>
+  </cs:dataPointWireframe>
+  <cs:dataTable>
+    <cs:lnRef idx="0"/>
+    <cs:fillRef idx="0"/>
+    <cs:effectRef idx="0"/>
+    <cs:fontRef idx="minor">
+      <a:schemeClr val="tx1">
+        <a:lumMod val="65000"/>
+        <a:lumOff val="35000"/>
+      </a:schemeClr>
+    </cs:fontRef>
+    <cs:spPr>
+      <a:noFill/>
+      <a:ln w="9525" cap="flat" cmpd="sng" algn="ctr">
+        <a:solidFill>
+          <a:schemeClr val="tx1">
+            <a:lumMod val="15000"/>
+            <a:lumOff val="85000"/>
+          </a:schemeClr>
+        </a:solidFill>
+        <a:round/>
+      </a:ln>
+    </cs:spPr>
+    <cs:defRPr sz="900" kern="1200"/>
+  </cs:dataTable>
+  <cs:downBar>
+    <cs:lnRef idx="0"/>
+    <cs:fillRef idx="0"/>
+    <cs:effectRef idx="0"/>
+    <cs:fontRef idx="minor">
+      <a:schemeClr val="tx1"/>
+    </cs:fontRef>
+    <cs:spPr>
+      <a:solidFill>
+        <a:schemeClr val="dk1">
+          <a:lumMod val="75000"/>
+          <a:lumOff val="25000"/>
+        </a:schemeClr>
+      </a:solidFill>
+      <a:ln w="9525" cap="flat" cmpd="sng" algn="ctr">
+        <a:solidFill>
+          <a:schemeClr val="tx1">
+            <a:lumMod val="65000"/>
+            <a:lumOff val="35000"/>
+          </a:schemeClr>
+        </a:solidFill>
+        <a:round/>
+      </a:ln>
+    </cs:spPr>
+  </cs:downBar>
+  <cs:dropLine>
+    <cs:lnRef idx="0"/>
+    <cs:fillRef idx="0"/>
+    <cs:effectRef idx="0"/>
+    <cs:fontRef idx="minor">
+      <a:schemeClr val="tx1"/>
+    </cs:fontRef>
+    <cs:spPr>
+      <a:ln w="9525" cap="flat" cmpd="sng" algn="ctr">
+        <a:solidFill>
+          <a:schemeClr val="tx1">
+            <a:lumMod val="35000"/>
+            <a:lumOff val="65000"/>
+          </a:schemeClr>
+        </a:solidFill>
+        <a:round/>
+      </a:ln>
+    </cs:spPr>
+  </cs:dropLine>
+  <cs:errorBar>
+    <cs:lnRef idx="0"/>
+    <cs:fillRef idx="0"/>
+    <cs:effectRef idx="0"/>
+    <cs:fontRef idx="minor">
+      <a:schemeClr val="tx1"/>
+    </cs:fontRef>
+    <cs:spPr>
+      <a:ln w="9525" cap="flat" cmpd="sng" algn="ctr">
+        <a:solidFill>
+          <a:schemeClr val="tx1">
+            <a:lumMod val="65000"/>
+            <a:lumOff val="35000"/>
+          </a:schemeClr>
+        </a:solidFill>
+        <a:round/>
+      </a:ln>
+    </cs:spPr>
+  </cs:errorBar>
+  <cs:floor>
+    <cs:lnRef idx="0"/>
+    <cs:fillRef idx="0"/>
+    <cs:effectRef idx="0"/>
+    <cs:fontRef idx="minor">
+      <a:schemeClr val="tx1"/>
+    </cs:fontRef>
+    <cs:spPr>
+      <a:noFill/>
+      <a:ln>
+        <a:noFill/>
+      </a:ln>
+    </cs:spPr>
+  </cs:floor>
+  <cs:gridlineMajor>
+    <cs:lnRef idx="0"/>
+    <cs:fillRef idx="0"/>
+    <cs:effectRef idx="0"/>
+    <cs:fontRef idx="minor">
+      <a:schemeClr val="tx1"/>
+    </cs:fontRef>
+    <cs:spPr>
+      <a:ln w="9525" cap="flat" cmpd="sng" algn="ctr">
+        <a:solidFill>
+          <a:schemeClr val="tx1">
+            <a:lumMod val="15000"/>
+            <a:lumOff val="85000"/>
+          </a:schemeClr>
+        </a:solidFill>
+        <a:round/>
+      </a:ln>
+    </cs:spPr>
+  </cs:gridlineMajor>
+  <cs:gridlineMinor>
+    <cs:lnRef idx="0"/>
+    <cs:fillRef idx="0"/>
+    <cs:effectRef idx="0"/>
+    <cs:fontRef idx="minor">
+      <a:schemeClr val="tx1"/>
+    </cs:fontRef>
+    <cs:spPr>
+      <a:ln w="9525" cap="flat" cmpd="sng" algn="ctr">
+        <a:solidFill>
+          <a:schemeClr val="tx1">
+            <a:lumMod val="5000"/>
+            <a:lumOff val="95000"/>
+          </a:schemeClr>
+        </a:solidFill>
+        <a:round/>
+      </a:ln>
+    </cs:spPr>
+  </cs:gridlineMinor>
+  <cs:hiLoLine>
+    <cs:lnRef idx="0"/>
+    <cs:fillRef idx="0"/>
+    <cs:effectRef idx="0"/>
+    <cs:fontRef idx="minor">
+      <a:schemeClr val="tx1"/>
+    </cs:fontRef>
+    <cs:spPr>
+      <a:ln w="9525" cap="flat" cmpd="sng" algn="ctr">
+        <a:solidFill>
+          <a:schemeClr val="tx1">
+            <a:lumMod val="50000"/>
+            <a:lumOff val="50000"/>
+          </a:schemeClr>
+        </a:solidFill>
+        <a:round/>
+      </a:ln>
+    </cs:spPr>
+  </cs:hiLoLine>
+  <cs:leaderLine>
+    <cs:lnRef idx="0"/>
+    <cs:fillRef idx="0"/>
+    <cs:effectRef idx="0"/>
+    <cs:fontRef idx="minor">
+      <a:schemeClr val="tx1"/>
+    </cs:fontRef>
+    <cs:spPr>
+      <a:ln w="9525" cap="flat" cmpd="sng" algn="ctr">
+        <a:solidFill>
+          <a:schemeClr val="tx1">
+            <a:lumMod val="35000"/>
+            <a:lumOff val="65000"/>
+          </a:schemeClr>
+        </a:solidFill>
+        <a:round/>
+      </a:ln>
+    </cs:spPr>
+  </cs:leaderLine>
+  <cs:legend>
+    <cs:lnRef idx="0"/>
+    <cs:fillRef idx="0"/>
+    <cs:effectRef idx="0"/>
+    <cs:fontRef idx="minor">
+      <a:schemeClr val="tx1">
+        <a:lumMod val="65000"/>
+        <a:lumOff val="35000"/>
+      </a:schemeClr>
+    </cs:fontRef>
+    <cs:defRPr sz="900" kern="1200"/>
+  </cs:legend>
+  <cs:plotArea mods="allowNoFillOverride allowNoLineOverride">
+    <cs:lnRef idx="0"/>
+    <cs:fillRef idx="0"/>
+    <cs:effectRef idx="0"/>
+    <cs:fontRef idx="minor">
+      <a:schemeClr val="tx1"/>
+    </cs:fontRef>
+  </cs:plotArea>
+  <cs:plotArea3D mods="allowNoFillOverride allowNoLineOverride">
+    <cs:lnRef idx="0"/>
+    <cs:fillRef idx="0"/>
+    <cs:effectRef idx="0"/>
+    <cs:fontRef idx="minor">
+      <a:schemeClr val="tx1"/>
+    </cs:fontRef>
+  </cs:plotArea3D>
+  <cs:seriesAxis>
+    <cs:lnRef idx="0"/>
+    <cs:fillRef idx="0"/>
+    <cs:effectRef idx="0"/>
+    <cs:fontRef idx="minor">
+      <a:schemeClr val="tx1">
+        <a:lumMod val="65000"/>
+        <a:lumOff val="35000"/>
+      </a:schemeClr>
+    </cs:fontRef>
+    <cs:defRPr sz="900" kern="1200"/>
+  </cs:seriesAxis>
+  <cs:seriesLine>
+    <cs:lnRef idx="0"/>
+    <cs:fillRef idx="0"/>
+    <cs:effectRef idx="0"/>
+    <cs:fontRef idx="minor">
+      <a:schemeClr val="tx1"/>
+    </cs:fontRef>
+    <cs:spPr>
+      <a:ln w="9525" cap="flat" cmpd="sng" algn="ctr">
+        <a:solidFill>
+          <a:schemeClr val="tx1">
+            <a:lumMod val="35000"/>
+            <a:lumOff val="65000"/>
+          </a:schemeClr>
+        </a:solidFill>
+        <a:round/>
+      </a:ln>
+    </cs:spPr>
+  </cs:seriesLine>
+  <cs:title>
+    <cs:lnRef idx="0"/>
+    <cs:fillRef idx="0"/>
+    <cs:effectRef idx="0"/>
+    <cs:fontRef idx="minor">
+      <a:schemeClr val="tx1">
+        <a:lumMod val="65000"/>
+        <a:lumOff val="35000"/>
+      </a:schemeClr>
+    </cs:fontRef>
+    <cs:defRPr sz="1400" b="0" kern="1200" spc="0" baseline="0"/>
+  </cs:title>
+  <cs:trendline>
+    <cs:lnRef idx="0">
+      <cs:styleClr val="auto"/>
+    </cs:lnRef>
+    <cs:fillRef idx="0"/>
+    <cs:effectRef idx="0"/>
+    <cs:fontRef idx="minor">
+      <a:schemeClr val="tx1"/>
+    </cs:fontRef>
+    <cs:spPr>
+      <a:ln w="19050" cap="rnd">
+        <a:solidFill>
+          <a:schemeClr val="phClr"/>
+        </a:solidFill>
+        <a:prstDash val="sysDot"/>
+      </a:ln>
+    </cs:spPr>
+  </cs:trendline>
+  <cs:trendlineLabel>
+    <cs:lnRef idx="0"/>
+    <cs:fillRef idx="0"/>
+    <cs:effectRef idx="0"/>
+    <cs:fontRef idx="minor">
+      <a:schemeClr val="tx1">
+        <a:lumMod val="65000"/>
+        <a:lumOff val="35000"/>
+      </a:schemeClr>
+    </cs:fontRef>
+    <cs:defRPr sz="900" kern="1200"/>
+  </cs:trendlineLabel>
+  <cs:upBar>
+    <cs:lnRef idx="0"/>
+    <cs:fillRef idx="0"/>
+    <cs:effectRef idx="0"/>
+    <cs:fontRef idx="minor">
+      <a:schemeClr val="tx1"/>
+    </cs:fontRef>
+    <cs:spPr>
+      <a:solidFill>
+        <a:schemeClr val="lt1"/>
+      </a:solidFill>
+      <a:ln w="9525" cap="flat" cmpd="sng" algn="ctr">
+        <a:solidFill>
+          <a:schemeClr val="tx1">
+            <a:lumMod val="65000"/>
+            <a:lumOff val="35000"/>
+          </a:schemeClr>
+        </a:solidFill>
+        <a:round/>
+      </a:ln>
+    </cs:spPr>
+  </cs:upBar>
+  <cs:valueAxis>
+    <cs:lnRef idx="0"/>
+    <cs:fillRef idx="0"/>
+    <cs:effectRef idx="0"/>
+    <cs:fontRef idx="minor">
+      <a:schemeClr val="tx1">
+        <a:lumMod val="65000"/>
+        <a:lumOff val="35000"/>
+      </a:schemeClr>
+    </cs:fontRef>
+    <cs:spPr>
+      <a:ln w="9525" cap="flat" cmpd="sng" algn="ctr">
+        <a:solidFill>
+          <a:schemeClr val="tx1">
+            <a:lumMod val="25000"/>
+            <a:lumOff val="75000"/>
+          </a:schemeClr>
+        </a:solidFill>
+        <a:round/>
+      </a:ln>
+    </cs:spPr>
+    <cs:defRPr sz="900" kern="1200"/>
+  </cs:valueAxis>
+  <cs:wall>
+    <cs:lnRef idx="0"/>
+    <cs:fillRef idx="0"/>
+    <cs:effectRef idx="0"/>
+    <cs:fontRef idx="minor">
+      <a:schemeClr val="tx1"/>
+    </cs:fontRef>
+    <cs:spPr>
+      <a:noFill/>
+      <a:ln>
+        <a:noFill/>
+      </a:ln>
+    </cs:spPr>
+  </cs:wall>
+</cs:chartStyle>
+</file>
+
 <file path=ppt/handoutMasters/handoutMaster1.xml><?xml version="1.0" encoding="utf-8"?>
 <p:handoutMaster xmlns:a="http://schemas.openxmlformats.org/drawingml/2006/main" xmlns:r="http://schemas.openxmlformats.org/officeDocument/2006/relationships" xmlns:p="http://schemas.openxmlformats.org/presentationml/2006/main">
   <p:cSld>
@@ -710,14 +1830,14 @@
           <a:effectLst/>
           <a:extLst>
             <a:ext uri="{909E8E84-426E-40dd-AFC4-6F175D3DCCD1}">
-              <a14:hiddenFill xmlns:a14="http://schemas.microsoft.com/office/drawing/2010/main" xmlns="">
+              <a14:hiddenFill xmlns="" xmlns:a14="http://schemas.microsoft.com/office/drawing/2010/main">
                 <a:solidFill>
                   <a:schemeClr val="accent1"/>
                 </a:solidFill>
               </a14:hiddenFill>
             </a:ext>
             <a:ext uri="{91240B29-F687-4f45-9708-019B960494DF}">
-              <a14:hiddenLine xmlns:a14="http://schemas.microsoft.com/office/drawing/2010/main" xmlns="" w="9525">
+              <a14:hiddenLine xmlns="" xmlns:a14="http://schemas.microsoft.com/office/drawing/2010/main" w="9525">
                 <a:solidFill>
                   <a:schemeClr val="tx1"/>
                 </a:solidFill>
@@ -727,7 +1847,7 @@
               </a14:hiddenLine>
             </a:ext>
             <a:ext uri="{AF507438-7753-43e0-B8FC-AC1667EBCBE1}">
-              <a14:hiddenEffects xmlns:a14="http://schemas.microsoft.com/office/drawing/2010/main" xmlns="">
+              <a14:hiddenEffects xmlns="" xmlns:a14="http://schemas.microsoft.com/office/drawing/2010/main">
                 <a:effectLst>
                   <a:outerShdw blurRad="63500" dist="38099" dir="2700000" algn="ctr" rotWithShape="0">
                     <a:schemeClr val="bg2">
@@ -738,7 +1858,7 @@
               </a14:hiddenEffects>
             </a:ext>
             <a:ext uri="{FAA26D3D-D897-4be2-8F04-BA451C77F1D7}">
-              <ma14:placeholderFlag xmlns:ma14="http://schemas.microsoft.com/office/mac/drawingml/2011/main" xmlns="" val="1"/>
+              <ma14:placeholderFlag xmlns="" xmlns:ma14="http://schemas.microsoft.com/office/mac/drawingml/2011/main" val="1"/>
             </a:ext>
           </a:extLst>
         </p:spPr>
@@ -795,14 +1915,14 @@
           <a:effectLst/>
           <a:extLst>
             <a:ext uri="{909E8E84-426E-40dd-AFC4-6F175D3DCCD1}">
-              <a14:hiddenFill xmlns:a14="http://schemas.microsoft.com/office/drawing/2010/main" xmlns="">
+              <a14:hiddenFill xmlns="" xmlns:a14="http://schemas.microsoft.com/office/drawing/2010/main">
                 <a:solidFill>
                   <a:schemeClr val="accent1"/>
                 </a:solidFill>
               </a14:hiddenFill>
             </a:ext>
             <a:ext uri="{91240B29-F687-4f45-9708-019B960494DF}">
-              <a14:hiddenLine xmlns:a14="http://schemas.microsoft.com/office/drawing/2010/main" xmlns="" w="9525">
+              <a14:hiddenLine xmlns="" xmlns:a14="http://schemas.microsoft.com/office/drawing/2010/main" w="9525">
                 <a:solidFill>
                   <a:schemeClr val="tx1"/>
                 </a:solidFill>
@@ -812,7 +1932,7 @@
               </a14:hiddenLine>
             </a:ext>
             <a:ext uri="{AF507438-7753-43e0-B8FC-AC1667EBCBE1}">
-              <a14:hiddenEffects xmlns:a14="http://schemas.microsoft.com/office/drawing/2010/main" xmlns="">
+              <a14:hiddenEffects xmlns="" xmlns:a14="http://schemas.microsoft.com/office/drawing/2010/main">
                 <a:effectLst>
                   <a:outerShdw blurRad="63500" dist="38099" dir="2700000" algn="ctr" rotWithShape="0">
                     <a:schemeClr val="bg2">
@@ -823,7 +1943,7 @@
               </a14:hiddenEffects>
             </a:ext>
             <a:ext uri="{FAA26D3D-D897-4be2-8F04-BA451C77F1D7}">
-              <ma14:placeholderFlag xmlns:ma14="http://schemas.microsoft.com/office/mac/drawingml/2011/main" xmlns="" val="1"/>
+              <ma14:placeholderFlag xmlns="" xmlns:ma14="http://schemas.microsoft.com/office/mac/drawingml/2011/main" val="1"/>
             </a:ext>
           </a:extLst>
         </p:spPr>
@@ -880,14 +2000,14 @@
           <a:effectLst/>
           <a:extLst>
             <a:ext uri="{909E8E84-426E-40dd-AFC4-6F175D3DCCD1}">
-              <a14:hiddenFill xmlns:a14="http://schemas.microsoft.com/office/drawing/2010/main" xmlns="">
+              <a14:hiddenFill xmlns="" xmlns:a14="http://schemas.microsoft.com/office/drawing/2010/main">
                 <a:solidFill>
                   <a:schemeClr val="accent1"/>
                 </a:solidFill>
               </a14:hiddenFill>
             </a:ext>
             <a:ext uri="{91240B29-F687-4f45-9708-019B960494DF}">
-              <a14:hiddenLine xmlns:a14="http://schemas.microsoft.com/office/drawing/2010/main" xmlns="" w="9525">
+              <a14:hiddenLine xmlns="" xmlns:a14="http://schemas.microsoft.com/office/drawing/2010/main" w="9525">
                 <a:solidFill>
                   <a:schemeClr val="tx1"/>
                 </a:solidFill>
@@ -897,7 +2017,7 @@
               </a14:hiddenLine>
             </a:ext>
             <a:ext uri="{AF507438-7753-43e0-B8FC-AC1667EBCBE1}">
-              <a14:hiddenEffects xmlns:a14="http://schemas.microsoft.com/office/drawing/2010/main" xmlns="">
+              <a14:hiddenEffects xmlns="" xmlns:a14="http://schemas.microsoft.com/office/drawing/2010/main">
                 <a:effectLst>
                   <a:outerShdw blurRad="63500" dist="38099" dir="2700000" algn="ctr" rotWithShape="0">
                     <a:schemeClr val="bg2">
@@ -908,7 +2028,7 @@
               </a14:hiddenEffects>
             </a:ext>
             <a:ext uri="{FAA26D3D-D897-4be2-8F04-BA451C77F1D7}">
-              <ma14:placeholderFlag xmlns:ma14="http://schemas.microsoft.com/office/mac/drawingml/2011/main" xmlns="" val="1"/>
+              <ma14:placeholderFlag xmlns="" xmlns:ma14="http://schemas.microsoft.com/office/mac/drawingml/2011/main" val="1"/>
             </a:ext>
           </a:extLst>
         </p:spPr>
@@ -965,14 +2085,14 @@
           <a:effectLst/>
           <a:extLst>
             <a:ext uri="{909E8E84-426E-40dd-AFC4-6F175D3DCCD1}">
-              <a14:hiddenFill xmlns:a14="http://schemas.microsoft.com/office/drawing/2010/main" xmlns="">
+              <a14:hiddenFill xmlns="" xmlns:a14="http://schemas.microsoft.com/office/drawing/2010/main">
                 <a:solidFill>
                   <a:schemeClr val="accent1"/>
                 </a:solidFill>
               </a14:hiddenFill>
             </a:ext>
             <a:ext uri="{91240B29-F687-4f45-9708-019B960494DF}">
-              <a14:hiddenLine xmlns:a14="http://schemas.microsoft.com/office/drawing/2010/main" xmlns="" w="9525">
+              <a14:hiddenLine xmlns="" xmlns:a14="http://schemas.microsoft.com/office/drawing/2010/main" w="9525">
                 <a:solidFill>
                   <a:schemeClr val="tx1"/>
                 </a:solidFill>
@@ -982,7 +2102,7 @@
               </a14:hiddenLine>
             </a:ext>
             <a:ext uri="{AF507438-7753-43e0-B8FC-AC1667EBCBE1}">
-              <a14:hiddenEffects xmlns:a14="http://schemas.microsoft.com/office/drawing/2010/main" xmlns="">
+              <a14:hiddenEffects xmlns="" xmlns:a14="http://schemas.microsoft.com/office/drawing/2010/main">
                 <a:effectLst>
                   <a:outerShdw blurRad="63500" dist="38099" dir="2700000" algn="ctr" rotWithShape="0">
                     <a:schemeClr val="bg2">
@@ -993,7 +2113,7 @@
               </a14:hiddenEffects>
             </a:ext>
             <a:ext uri="{FAA26D3D-D897-4be2-8F04-BA451C77F1D7}">
-              <ma14:placeholderFlag xmlns:ma14="http://schemas.microsoft.com/office/mac/drawingml/2011/main" xmlns="" val="1"/>
+              <ma14:placeholderFlag xmlns="" xmlns:ma14="http://schemas.microsoft.com/office/mac/drawingml/2011/main" val="1"/>
             </a:ext>
           </a:extLst>
         </p:spPr>
@@ -1087,14 +2207,14 @@
           <a:effectLst/>
           <a:extLst>
             <a:ext uri="{909E8E84-426E-40dd-AFC4-6F175D3DCCD1}">
-              <a14:hiddenFill xmlns:a14="http://schemas.microsoft.com/office/drawing/2010/main" xmlns="">
+              <a14:hiddenFill xmlns="" xmlns:a14="http://schemas.microsoft.com/office/drawing/2010/main">
                 <a:solidFill>
                   <a:schemeClr val="accent1"/>
                 </a:solidFill>
               </a14:hiddenFill>
             </a:ext>
             <a:ext uri="{91240B29-F687-4f45-9708-019B960494DF}">
-              <a14:hiddenLine xmlns:a14="http://schemas.microsoft.com/office/drawing/2010/main" xmlns="" w="9525">
+              <a14:hiddenLine xmlns="" xmlns:a14="http://schemas.microsoft.com/office/drawing/2010/main" w="9525">
                 <a:solidFill>
                   <a:schemeClr val="tx1"/>
                 </a:solidFill>
@@ -1104,7 +2224,7 @@
               </a14:hiddenLine>
             </a:ext>
             <a:ext uri="{AF507438-7753-43e0-B8FC-AC1667EBCBE1}">
-              <a14:hiddenEffects xmlns:a14="http://schemas.microsoft.com/office/drawing/2010/main" xmlns="">
+              <a14:hiddenEffects xmlns="" xmlns:a14="http://schemas.microsoft.com/office/drawing/2010/main">
                 <a:effectLst>
                   <a:outerShdw blurRad="63500" dist="38099" dir="2700000" algn="ctr" rotWithShape="0">
                     <a:schemeClr val="bg2">
@@ -1115,7 +2235,7 @@
               </a14:hiddenEffects>
             </a:ext>
             <a:ext uri="{FAA26D3D-D897-4be2-8F04-BA451C77F1D7}">
-              <ma14:placeholderFlag xmlns:ma14="http://schemas.microsoft.com/office/mac/drawingml/2011/main" xmlns="" val="1"/>
+              <ma14:placeholderFlag xmlns="" xmlns:ma14="http://schemas.microsoft.com/office/mac/drawingml/2011/main" val="1"/>
             </a:ext>
           </a:extLst>
         </p:spPr>
@@ -1172,14 +2292,14 @@
           <a:effectLst/>
           <a:extLst>
             <a:ext uri="{909E8E84-426E-40dd-AFC4-6F175D3DCCD1}">
-              <a14:hiddenFill xmlns:a14="http://schemas.microsoft.com/office/drawing/2010/main" xmlns="">
+              <a14:hiddenFill xmlns="" xmlns:a14="http://schemas.microsoft.com/office/drawing/2010/main">
                 <a:solidFill>
                   <a:schemeClr val="accent1"/>
                 </a:solidFill>
               </a14:hiddenFill>
             </a:ext>
             <a:ext uri="{91240B29-F687-4f45-9708-019B960494DF}">
-              <a14:hiddenLine xmlns:a14="http://schemas.microsoft.com/office/drawing/2010/main" xmlns="" w="9525">
+              <a14:hiddenLine xmlns="" xmlns:a14="http://schemas.microsoft.com/office/drawing/2010/main" w="9525">
                 <a:solidFill>
                   <a:schemeClr val="tx1"/>
                 </a:solidFill>
@@ -1189,7 +2309,7 @@
               </a14:hiddenLine>
             </a:ext>
             <a:ext uri="{AF507438-7753-43e0-B8FC-AC1667EBCBE1}">
-              <a14:hiddenEffects xmlns:a14="http://schemas.microsoft.com/office/drawing/2010/main" xmlns="">
+              <a14:hiddenEffects xmlns="" xmlns:a14="http://schemas.microsoft.com/office/drawing/2010/main">
                 <a:effectLst>
                   <a:outerShdw blurRad="63500" dist="38099" dir="2700000" algn="ctr" rotWithShape="0">
                     <a:schemeClr val="bg2">
@@ -1200,7 +2320,7 @@
               </a14:hiddenEffects>
             </a:ext>
             <a:ext uri="{FAA26D3D-D897-4be2-8F04-BA451C77F1D7}">
-              <ma14:placeholderFlag xmlns:ma14="http://schemas.microsoft.com/office/mac/drawingml/2011/main" xmlns="" val="1"/>
+              <ma14:placeholderFlag xmlns="" xmlns:ma14="http://schemas.microsoft.com/office/mac/drawingml/2011/main" val="1"/>
             </a:ext>
           </a:extLst>
         </p:spPr>
@@ -1262,7 +2382,7 @@
           <a:effectLst/>
           <a:extLst>
             <a:ext uri="{AF507438-7753-43e0-B8FC-AC1667EBCBE1}">
-              <a14:hiddenEffects xmlns:a14="http://schemas.microsoft.com/office/drawing/2010/main" xmlns="">
+              <a14:hiddenEffects xmlns="" xmlns:a14="http://schemas.microsoft.com/office/drawing/2010/main">
                 <a:effectLst>
                   <a:outerShdw blurRad="63500" dist="38099" dir="2700000" algn="ctr" rotWithShape="0">
                     <a:srgbClr val="000000">
@@ -1273,7 +2393,7 @@
               </a14:hiddenEffects>
             </a:ext>
             <a:ext uri="{53640926-AAD7-44d8-BBD7-CCE9431645EC}">
-              <a14:shadowObscured xmlns:a14="http://schemas.microsoft.com/office/drawing/2010/main" xmlns="" val="1"/>
+              <a14:shadowObscured xmlns="" xmlns:a14="http://schemas.microsoft.com/office/drawing/2010/main" val="1"/>
             </a:ext>
           </a:extLst>
         </p:spPr>
@@ -1303,14 +2423,14 @@
           <a:effectLst/>
           <a:extLst>
             <a:ext uri="{909E8E84-426E-40dd-AFC4-6F175D3DCCD1}">
-              <a14:hiddenFill xmlns:a14="http://schemas.microsoft.com/office/drawing/2010/main" xmlns="">
+              <a14:hiddenFill xmlns="" xmlns:a14="http://schemas.microsoft.com/office/drawing/2010/main">
                 <a:solidFill>
                   <a:schemeClr val="accent1"/>
                 </a:solidFill>
               </a14:hiddenFill>
             </a:ext>
             <a:ext uri="{91240B29-F687-4f45-9708-019B960494DF}">
-              <a14:hiddenLine xmlns:a14="http://schemas.microsoft.com/office/drawing/2010/main" xmlns="" w="9525">
+              <a14:hiddenLine xmlns="" xmlns:a14="http://schemas.microsoft.com/office/drawing/2010/main" w="9525">
                 <a:solidFill>
                   <a:schemeClr val="tx1"/>
                 </a:solidFill>
@@ -1320,7 +2440,7 @@
               </a14:hiddenLine>
             </a:ext>
             <a:ext uri="{AF507438-7753-43e0-B8FC-AC1667EBCBE1}">
-              <a14:hiddenEffects xmlns:a14="http://schemas.microsoft.com/office/drawing/2010/main" xmlns="">
+              <a14:hiddenEffects xmlns="" xmlns:a14="http://schemas.microsoft.com/office/drawing/2010/main">
                 <a:effectLst>
                   <a:outerShdw blurRad="63500" dist="38099" dir="2700000" algn="ctr" rotWithShape="0">
                     <a:schemeClr val="bg2">
@@ -1331,7 +2451,7 @@
               </a14:hiddenEffects>
             </a:ext>
             <a:ext uri="{FAA26D3D-D897-4be2-8F04-BA451C77F1D7}">
-              <ma14:placeholderFlag xmlns:ma14="http://schemas.microsoft.com/office/mac/drawingml/2011/main" xmlns="" val="1"/>
+              <ma14:placeholderFlag xmlns="" xmlns:ma14="http://schemas.microsoft.com/office/mac/drawingml/2011/main" val="1"/>
             </a:ext>
           </a:extLst>
         </p:spPr>
@@ -1404,14 +2524,14 @@
           <a:effectLst/>
           <a:extLst>
             <a:ext uri="{909E8E84-426E-40dd-AFC4-6F175D3DCCD1}">
-              <a14:hiddenFill xmlns:a14="http://schemas.microsoft.com/office/drawing/2010/main" xmlns="">
+              <a14:hiddenFill xmlns="" xmlns:a14="http://schemas.microsoft.com/office/drawing/2010/main">
                 <a:solidFill>
                   <a:schemeClr val="accent1"/>
                 </a:solidFill>
               </a14:hiddenFill>
             </a:ext>
             <a:ext uri="{91240B29-F687-4f45-9708-019B960494DF}">
-              <a14:hiddenLine xmlns:a14="http://schemas.microsoft.com/office/drawing/2010/main" xmlns="" w="9525">
+              <a14:hiddenLine xmlns="" xmlns:a14="http://schemas.microsoft.com/office/drawing/2010/main" w="9525">
                 <a:solidFill>
                   <a:schemeClr val="tx1"/>
                 </a:solidFill>
@@ -1421,7 +2541,7 @@
               </a14:hiddenLine>
             </a:ext>
             <a:ext uri="{AF507438-7753-43e0-B8FC-AC1667EBCBE1}">
-              <a14:hiddenEffects xmlns:a14="http://schemas.microsoft.com/office/drawing/2010/main" xmlns="">
+              <a14:hiddenEffects xmlns="" xmlns:a14="http://schemas.microsoft.com/office/drawing/2010/main">
                 <a:effectLst>
                   <a:outerShdw blurRad="63500" dist="38099" dir="2700000" algn="ctr" rotWithShape="0">
                     <a:schemeClr val="bg2">
@@ -1432,7 +2552,7 @@
               </a14:hiddenEffects>
             </a:ext>
             <a:ext uri="{FAA26D3D-D897-4be2-8F04-BA451C77F1D7}">
-              <ma14:placeholderFlag xmlns:ma14="http://schemas.microsoft.com/office/mac/drawingml/2011/main" xmlns="" val="1"/>
+              <ma14:placeholderFlag xmlns="" xmlns:ma14="http://schemas.microsoft.com/office/mac/drawingml/2011/main" val="1"/>
             </a:ext>
           </a:extLst>
         </p:spPr>
@@ -1489,14 +2609,14 @@
           <a:effectLst/>
           <a:extLst>
             <a:ext uri="{909E8E84-426E-40dd-AFC4-6F175D3DCCD1}">
-              <a14:hiddenFill xmlns:a14="http://schemas.microsoft.com/office/drawing/2010/main" xmlns="">
+              <a14:hiddenFill xmlns="" xmlns:a14="http://schemas.microsoft.com/office/drawing/2010/main">
                 <a:solidFill>
                   <a:schemeClr val="accent1"/>
                 </a:solidFill>
               </a14:hiddenFill>
             </a:ext>
             <a:ext uri="{91240B29-F687-4f45-9708-019B960494DF}">
-              <a14:hiddenLine xmlns:a14="http://schemas.microsoft.com/office/drawing/2010/main" xmlns="" w="9525">
+              <a14:hiddenLine xmlns="" xmlns:a14="http://schemas.microsoft.com/office/drawing/2010/main" w="9525">
                 <a:solidFill>
                   <a:schemeClr val="tx1"/>
                 </a:solidFill>
@@ -1506,7 +2626,7 @@
               </a14:hiddenLine>
             </a:ext>
             <a:ext uri="{AF507438-7753-43e0-B8FC-AC1667EBCBE1}">
-              <a14:hiddenEffects xmlns:a14="http://schemas.microsoft.com/office/drawing/2010/main" xmlns="">
+              <a14:hiddenEffects xmlns="" xmlns:a14="http://schemas.microsoft.com/office/drawing/2010/main">
                 <a:effectLst>
                   <a:outerShdw blurRad="63500" dist="38099" dir="2700000" algn="ctr" rotWithShape="0">
                     <a:schemeClr val="bg2">
@@ -1517,7 +2637,7 @@
               </a14:hiddenEffects>
             </a:ext>
             <a:ext uri="{FAA26D3D-D897-4be2-8F04-BA451C77F1D7}">
-              <ma14:placeholderFlag xmlns:ma14="http://schemas.microsoft.com/office/mac/drawingml/2011/main" xmlns="" val="1"/>
+              <ma14:placeholderFlag xmlns="" xmlns:ma14="http://schemas.microsoft.com/office/mac/drawingml/2011/main" val="1"/>
             </a:ext>
           </a:extLst>
         </p:spPr>
@@ -1740,12 +2860,12 @@
           <a:effectLst/>
           <a:extLst>
             <a:ext uri="{909E8E84-426E-40dd-AFC4-6F175D3DCCD1}">
-              <a14:hiddenFill xmlns:a14="http://schemas.microsoft.com/office/drawing/2010/main" xmlns="">
+              <a14:hiddenFill xmlns="" xmlns:a14="http://schemas.microsoft.com/office/drawing/2010/main">
                 <a:noFill/>
               </a14:hiddenFill>
             </a:ext>
             <a:ext uri="{AF507438-7753-43e0-B8FC-AC1667EBCBE1}">
-              <a14:hiddenEffects xmlns:a14="http://schemas.microsoft.com/office/drawing/2010/main" xmlns="">
+              <a14:hiddenEffects xmlns="" xmlns:a14="http://schemas.microsoft.com/office/drawing/2010/main">
                 <a:effectLst>
                   <a:outerShdw blurRad="63500" dist="38099" dir="2700000" algn="ctr" rotWithShape="0">
                     <a:schemeClr val="bg2">
@@ -1799,12 +2919,12 @@
           <a:effectLst/>
           <a:extLst>
             <a:ext uri="{909E8E84-426E-40dd-AFC4-6F175D3DCCD1}">
-              <a14:hiddenFill xmlns:a14="http://schemas.microsoft.com/office/drawing/2010/main" xmlns="">
+              <a14:hiddenFill xmlns="" xmlns:a14="http://schemas.microsoft.com/office/drawing/2010/main">
                 <a:noFill/>
               </a14:hiddenFill>
             </a:ext>
             <a:ext uri="{AF507438-7753-43e0-B8FC-AC1667EBCBE1}">
-              <a14:hiddenEffects xmlns:a14="http://schemas.microsoft.com/office/drawing/2010/main" xmlns="">
+              <a14:hiddenEffects xmlns="" xmlns:a14="http://schemas.microsoft.com/office/drawing/2010/main">
                 <a:effectLst>
                   <a:outerShdw blurRad="63500" dist="38099" dir="2700000" algn="ctr" rotWithShape="0">
                     <a:schemeClr val="bg2">
@@ -1907,14 +3027,14 @@
           <a:effectLst/>
           <a:extLst>
             <a:ext uri="{909E8E84-426E-40dd-AFC4-6F175D3DCCD1}">
-              <a14:hiddenFill xmlns:a14="http://schemas.microsoft.com/office/drawing/2010/main" xmlns="">
+              <a14:hiddenFill xmlns="" xmlns:a14="http://schemas.microsoft.com/office/drawing/2010/main">
                 <a:solidFill>
                   <a:schemeClr val="accent1"/>
                 </a:solidFill>
               </a14:hiddenFill>
             </a:ext>
             <a:ext uri="{91240B29-F687-4f45-9708-019B960494DF}">
-              <a14:hiddenLine xmlns:a14="http://schemas.microsoft.com/office/drawing/2010/main" xmlns="" w="9525">
+              <a14:hiddenLine xmlns="" xmlns:a14="http://schemas.microsoft.com/office/drawing/2010/main" w="9525">
                 <a:solidFill>
                   <a:schemeClr val="tx1"/>
                 </a:solidFill>
@@ -1924,7 +3044,7 @@
               </a14:hiddenLine>
             </a:ext>
             <a:ext uri="{AF507438-7753-43e0-B8FC-AC1667EBCBE1}">
-              <a14:hiddenEffects xmlns:a14="http://schemas.microsoft.com/office/drawing/2010/main" xmlns="">
+              <a14:hiddenEffects xmlns="" xmlns:a14="http://schemas.microsoft.com/office/drawing/2010/main">
                 <a:effectLst>
                   <a:outerShdw blurRad="63500" dist="38099" dir="2700000" algn="ctr" rotWithShape="0">
                     <a:schemeClr val="bg2">
@@ -2289,14 +3409,14 @@
           </a:xfrm>
           <a:extLst>
             <a:ext uri="{909E8E84-426E-40dd-AFC4-6F175D3DCCD1}">
-              <a14:hiddenFill xmlns:a14="http://schemas.microsoft.com/office/drawing/2010/main" xmlns="">
+              <a14:hiddenFill xmlns="" xmlns:a14="http://schemas.microsoft.com/office/drawing/2010/main">
                 <a:solidFill>
                   <a:schemeClr val="accent1"/>
                 </a:solidFill>
               </a14:hiddenFill>
             </a:ext>
             <a:ext uri="{91240B29-F687-4f45-9708-019B960494DF}">
-              <a14:hiddenLine xmlns:a14="http://schemas.microsoft.com/office/drawing/2010/main" xmlns="" w="9525">
+              <a14:hiddenLine xmlns="" xmlns:a14="http://schemas.microsoft.com/office/drawing/2010/main" w="9525">
                 <a:solidFill>
                   <a:schemeClr val="tx1"/>
                 </a:solidFill>
@@ -2306,7 +3426,7 @@
               </a14:hiddenLine>
             </a:ext>
             <a:ext uri="{AF507438-7753-43e0-B8FC-AC1667EBCBE1}">
-              <a14:hiddenEffects xmlns:a14="http://schemas.microsoft.com/office/drawing/2010/main" xmlns="">
+              <a14:hiddenEffects xmlns="" xmlns:a14="http://schemas.microsoft.com/office/drawing/2010/main">
                 <a:effectLst>
                   <a:outerShdw blurRad="63500" dist="38099" dir="2700000" algn="ctr" rotWithShape="0">
                     <a:schemeClr val="bg2">
@@ -2317,7 +3437,7 @@
               </a14:hiddenEffects>
             </a:ext>
             <a:ext uri="{FAA26D3D-D897-4be2-8F04-BA451C77F1D7}">
-              <ma14:placeholderFlag xmlns:ma14="http://schemas.microsoft.com/office/mac/drawingml/2011/main" xmlns="" val="1"/>
+              <ma14:placeholderFlag xmlns="" xmlns:ma14="http://schemas.microsoft.com/office/mac/drawingml/2011/main" val="1"/>
             </a:ext>
           </a:extLst>
         </p:spPr>
@@ -4359,14 +5479,14 @@
           <a:effectLst/>
           <a:extLst>
             <a:ext uri="{909E8E84-426E-40dd-AFC4-6F175D3DCCD1}">
-              <a14:hiddenFill xmlns:a14="http://schemas.microsoft.com/office/drawing/2010/main" xmlns="">
+              <a14:hiddenFill xmlns="" xmlns:a14="http://schemas.microsoft.com/office/drawing/2010/main">
                 <a:solidFill>
                   <a:schemeClr val="accent1"/>
                 </a:solidFill>
               </a14:hiddenFill>
             </a:ext>
             <a:ext uri="{91240B29-F687-4f45-9708-019B960494DF}">
-              <a14:hiddenLine xmlns:a14="http://schemas.microsoft.com/office/drawing/2010/main" xmlns="" w="9525">
+              <a14:hiddenLine xmlns="" xmlns:a14="http://schemas.microsoft.com/office/drawing/2010/main" w="9525">
                 <a:solidFill>
                   <a:schemeClr val="tx1"/>
                 </a:solidFill>
@@ -4376,7 +5496,7 @@
               </a14:hiddenLine>
             </a:ext>
             <a:ext uri="{AF507438-7753-43e0-B8FC-AC1667EBCBE1}">
-              <a14:hiddenEffects xmlns:a14="http://schemas.microsoft.com/office/drawing/2010/main" xmlns="">
+              <a14:hiddenEffects xmlns="" xmlns:a14="http://schemas.microsoft.com/office/drawing/2010/main">
                 <a:effectLst>
                   <a:outerShdw blurRad="63500" dist="38099" dir="2700000" algn="ctr" rotWithShape="0">
                     <a:schemeClr val="bg2">
@@ -4387,7 +5507,7 @@
               </a14:hiddenEffects>
             </a:ext>
             <a:ext uri="{FAA26D3D-D897-4be2-8F04-BA451C77F1D7}">
-              <ma14:placeholderFlag xmlns:ma14="http://schemas.microsoft.com/office/mac/drawingml/2011/main" xmlns="" val="1"/>
+              <ma14:placeholderFlag xmlns="" xmlns:ma14="http://schemas.microsoft.com/office/mac/drawingml/2011/main" val="1"/>
             </a:ext>
           </a:extLst>
         </p:spPr>
@@ -4502,14 +5622,14 @@
           <a:effectLst/>
           <a:extLst>
             <a:ext uri="{909E8E84-426E-40dd-AFC4-6F175D3DCCD1}">
-              <a14:hiddenFill xmlns:a14="http://schemas.microsoft.com/office/drawing/2010/main" xmlns="">
+              <a14:hiddenFill xmlns="" xmlns:a14="http://schemas.microsoft.com/office/drawing/2010/main">
                 <a:solidFill>
                   <a:schemeClr val="accent1"/>
                 </a:solidFill>
               </a14:hiddenFill>
             </a:ext>
             <a:ext uri="{91240B29-F687-4f45-9708-019B960494DF}">
-              <a14:hiddenLine xmlns:a14="http://schemas.microsoft.com/office/drawing/2010/main" xmlns="" w="9525">
+              <a14:hiddenLine xmlns="" xmlns:a14="http://schemas.microsoft.com/office/drawing/2010/main" w="9525">
                 <a:solidFill>
                   <a:schemeClr val="tx1"/>
                 </a:solidFill>
@@ -4519,7 +5639,7 @@
               </a14:hiddenLine>
             </a:ext>
             <a:ext uri="{AF507438-7753-43e0-B8FC-AC1667EBCBE1}">
-              <a14:hiddenEffects xmlns:a14="http://schemas.microsoft.com/office/drawing/2010/main" xmlns="">
+              <a14:hiddenEffects xmlns="" xmlns:a14="http://schemas.microsoft.com/office/drawing/2010/main">
                 <a:effectLst>
                   <a:outerShdw blurRad="63500" dist="38099" dir="2700000" algn="ctr" rotWithShape="0">
                     <a:schemeClr val="bg2">
@@ -4530,7 +5650,7 @@
               </a14:hiddenEffects>
             </a:ext>
             <a:ext uri="{FAA26D3D-D897-4be2-8F04-BA451C77F1D7}">
-              <ma14:placeholderFlag xmlns:ma14="http://schemas.microsoft.com/office/mac/drawingml/2011/main" xmlns="" val="1"/>
+              <ma14:placeholderFlag xmlns="" xmlns:ma14="http://schemas.microsoft.com/office/mac/drawingml/2011/main" val="1"/>
             </a:ext>
           </a:extLst>
         </p:spPr>
@@ -4575,14 +5695,14 @@
           <a:effectLst/>
           <a:extLst>
             <a:ext uri="{909E8E84-426E-40dd-AFC4-6F175D3DCCD1}">
-              <a14:hiddenFill xmlns:a14="http://schemas.microsoft.com/office/drawing/2010/main" xmlns="">
+              <a14:hiddenFill xmlns="" xmlns:a14="http://schemas.microsoft.com/office/drawing/2010/main">
                 <a:solidFill>
                   <a:schemeClr val="accent1"/>
                 </a:solidFill>
               </a14:hiddenFill>
             </a:ext>
             <a:ext uri="{91240B29-F687-4f45-9708-019B960494DF}">
-              <a14:hiddenLine xmlns:a14="http://schemas.microsoft.com/office/drawing/2010/main" xmlns="" w="9525">
+              <a14:hiddenLine xmlns="" xmlns:a14="http://schemas.microsoft.com/office/drawing/2010/main" w="9525">
                 <a:solidFill>
                   <a:schemeClr val="tx1"/>
                 </a:solidFill>
@@ -4592,7 +5712,7 @@
               </a14:hiddenLine>
             </a:ext>
             <a:ext uri="{AF507438-7753-43e0-B8FC-AC1667EBCBE1}">
-              <a14:hiddenEffects xmlns:a14="http://schemas.microsoft.com/office/drawing/2010/main" xmlns="">
+              <a14:hiddenEffects xmlns="" xmlns:a14="http://schemas.microsoft.com/office/drawing/2010/main">
                 <a:effectLst>
                   <a:outerShdw blurRad="63500" dist="38099" dir="2700000" algn="ctr" rotWithShape="0">
                     <a:schemeClr val="bg2">
@@ -4603,7 +5723,7 @@
               </a14:hiddenEffects>
             </a:ext>
             <a:ext uri="{FAA26D3D-D897-4be2-8F04-BA451C77F1D7}">
-              <ma14:placeholderFlag xmlns:ma14="http://schemas.microsoft.com/office/mac/drawingml/2011/main" xmlns="" val="1"/>
+              <ma14:placeholderFlag xmlns="" xmlns:ma14="http://schemas.microsoft.com/office/mac/drawingml/2011/main" val="1"/>
             </a:ext>
           </a:extLst>
         </p:spPr>
@@ -5118,14 +6238,14 @@
           <a:effectLst/>
           <a:extLst>
             <a:ext uri="{909E8E84-426E-40dd-AFC4-6F175D3DCCD1}">
-              <a14:hiddenFill xmlns:a14="http://schemas.microsoft.com/office/drawing/2010/main" xmlns="">
+              <a14:hiddenFill xmlns="" xmlns:a14="http://schemas.microsoft.com/office/drawing/2010/main">
                 <a:solidFill>
                   <a:schemeClr val="accent1"/>
                 </a:solidFill>
               </a14:hiddenFill>
             </a:ext>
             <a:ext uri="{91240B29-F687-4f45-9708-019B960494DF}">
-              <a14:hiddenLine xmlns:a14="http://schemas.microsoft.com/office/drawing/2010/main" xmlns="" w="9525">
+              <a14:hiddenLine xmlns="" xmlns:a14="http://schemas.microsoft.com/office/drawing/2010/main" w="9525">
                 <a:solidFill>
                   <a:schemeClr val="tx1"/>
                 </a:solidFill>
@@ -5135,7 +6255,7 @@
               </a14:hiddenLine>
             </a:ext>
             <a:ext uri="{AF507438-7753-43e0-B8FC-AC1667EBCBE1}">
-              <a14:hiddenEffects xmlns:a14="http://schemas.microsoft.com/office/drawing/2010/main" xmlns="">
+              <a14:hiddenEffects xmlns="" xmlns:a14="http://schemas.microsoft.com/office/drawing/2010/main">
                 <a:effectLst>
                   <a:outerShdw blurRad="63500" dist="38099" dir="2700000" algn="ctr" rotWithShape="0">
                     <a:schemeClr val="bg2">
@@ -5286,14 +6406,14 @@
         <p:spPr>
           <a:extLst>
             <a:ext uri="{909E8E84-426E-40dd-AFC4-6F175D3DCCD1}">
-              <a14:hiddenFill xmlns:a14="http://schemas.microsoft.com/office/drawing/2010/main" xmlns="">
+              <a14:hiddenFill xmlns="" xmlns:a14="http://schemas.microsoft.com/office/drawing/2010/main">
                 <a:solidFill>
                   <a:schemeClr val="accent1"/>
                 </a:solidFill>
               </a14:hiddenFill>
             </a:ext>
             <a:ext uri="{91240B29-F687-4f45-9708-019B960494DF}">
-              <a14:hiddenLine xmlns:a14="http://schemas.microsoft.com/office/drawing/2010/main" xmlns="" w="9525">
+              <a14:hiddenLine xmlns="" xmlns:a14="http://schemas.microsoft.com/office/drawing/2010/main" w="9525">
                 <a:solidFill>
                   <a:schemeClr val="tx1"/>
                 </a:solidFill>
@@ -5303,7 +6423,7 @@
               </a14:hiddenLine>
             </a:ext>
             <a:ext uri="{AF507438-7753-43e0-B8FC-AC1667EBCBE1}">
-              <a14:hiddenEffects xmlns:a14="http://schemas.microsoft.com/office/drawing/2010/main" xmlns="">
+              <a14:hiddenEffects xmlns="" xmlns:a14="http://schemas.microsoft.com/office/drawing/2010/main">
                 <a:effectLst>
                   <a:outerShdw blurRad="63500" dist="38099" dir="2700000" algn="ctr" rotWithShape="0">
                     <a:schemeClr val="bg2">
@@ -5314,7 +6434,7 @@
               </a14:hiddenEffects>
             </a:ext>
             <a:ext uri="{FAA26D3D-D897-4be2-8F04-BA451C77F1D7}">
-              <ma14:placeholderFlag xmlns:ma14="http://schemas.microsoft.com/office/mac/drawingml/2011/main" xmlns="" val="1"/>
+              <ma14:placeholderFlag xmlns="" xmlns:ma14="http://schemas.microsoft.com/office/mac/drawingml/2011/main" val="1"/>
             </a:ext>
           </a:extLst>
         </p:spPr>
@@ -5369,14 +6489,14 @@
           </a:xfrm>
           <a:extLst>
             <a:ext uri="{909E8E84-426E-40dd-AFC4-6F175D3DCCD1}">
-              <a14:hiddenFill xmlns:a14="http://schemas.microsoft.com/office/drawing/2010/main" xmlns="">
+              <a14:hiddenFill xmlns="" xmlns:a14="http://schemas.microsoft.com/office/drawing/2010/main">
                 <a:solidFill>
                   <a:schemeClr val="accent1"/>
                 </a:solidFill>
               </a14:hiddenFill>
             </a:ext>
             <a:ext uri="{91240B29-F687-4f45-9708-019B960494DF}">
-              <a14:hiddenLine xmlns:a14="http://schemas.microsoft.com/office/drawing/2010/main" xmlns="" w="9525">
+              <a14:hiddenLine xmlns="" xmlns:a14="http://schemas.microsoft.com/office/drawing/2010/main" w="9525">
                 <a:solidFill>
                   <a:schemeClr val="tx1"/>
                 </a:solidFill>
@@ -5386,7 +6506,7 @@
               </a14:hiddenLine>
             </a:ext>
             <a:ext uri="{AF507438-7753-43e0-B8FC-AC1667EBCBE1}">
-              <a14:hiddenEffects xmlns:a14="http://schemas.microsoft.com/office/drawing/2010/main" xmlns="">
+              <a14:hiddenEffects xmlns="" xmlns:a14="http://schemas.microsoft.com/office/drawing/2010/main">
                 <a:effectLst>
                   <a:outerShdw blurRad="63500" dist="38099" dir="2700000" algn="ctr" rotWithShape="0">
                     <a:schemeClr val="bg2">
@@ -5397,7 +6517,7 @@
               </a14:hiddenEffects>
             </a:ext>
             <a:ext uri="{FAA26D3D-D897-4be2-8F04-BA451C77F1D7}">
-              <ma14:placeholderFlag xmlns:ma14="http://schemas.microsoft.com/office/mac/drawingml/2011/main" xmlns="" val="1"/>
+              <ma14:placeholderFlag xmlns="" xmlns:ma14="http://schemas.microsoft.com/office/mac/drawingml/2011/main" val="1"/>
             </a:ext>
           </a:extLst>
         </p:spPr>
@@ -5522,6 +6642,13 @@
   <p:clrMapOvr>
     <a:masterClrMapping/>
   </p:clrMapOvr>
+  <p:timing>
+    <p:tnLst>
+      <p:par>
+        <p:cTn id="1" dur="indefinite" restart="never" nodeType="tmRoot"/>
+      </p:par>
+    </p:tnLst>
+  </p:timing>
 </p:sld>
 </file>
 
@@ -5600,14 +6727,14 @@
           <a:effectLst/>
           <a:extLst>
             <a:ext uri="{909E8E84-426E-40dd-AFC4-6F175D3DCCD1}">
-              <a14:hiddenFill xmlns:a14="http://schemas.microsoft.com/office/drawing/2010/main" xmlns="">
+              <a14:hiddenFill xmlns="" xmlns:a14="http://schemas.microsoft.com/office/drawing/2010/main">
                 <a:solidFill>
                   <a:schemeClr val="accent1"/>
                 </a:solidFill>
               </a14:hiddenFill>
             </a:ext>
             <a:ext uri="{91240B29-F687-4f45-9708-019B960494DF}">
-              <a14:hiddenLine xmlns:a14="http://schemas.microsoft.com/office/drawing/2010/main" xmlns="" w="9525">
+              <a14:hiddenLine xmlns="" xmlns:a14="http://schemas.microsoft.com/office/drawing/2010/main" w="9525">
                 <a:solidFill>
                   <a:schemeClr val="tx1"/>
                 </a:solidFill>
@@ -5617,7 +6744,7 @@
               </a14:hiddenLine>
             </a:ext>
             <a:ext uri="{AF507438-7753-43e0-B8FC-AC1667EBCBE1}">
-              <a14:hiddenEffects xmlns:a14="http://schemas.microsoft.com/office/drawing/2010/main" xmlns="">
+              <a14:hiddenEffects xmlns="" xmlns:a14="http://schemas.microsoft.com/office/drawing/2010/main">
                 <a:effectLst>
                   <a:outerShdw blurRad="63500" dist="38099" dir="2700000" algn="ctr" rotWithShape="0">
                     <a:schemeClr val="bg2">
@@ -5628,7 +6755,7 @@
               </a14:hiddenEffects>
             </a:ext>
             <a:ext uri="{FAA26D3D-D897-4be2-8F04-BA451C77F1D7}">
-              <ma14:placeholderFlag xmlns:ma14="http://schemas.microsoft.com/office/mac/drawingml/2011/main" xmlns="" val="1"/>
+              <ma14:placeholderFlag xmlns="" xmlns:ma14="http://schemas.microsoft.com/office/mac/drawingml/2011/main" val="1"/>
             </a:ext>
           </a:extLst>
         </p:spPr>
@@ -5862,9 +6989,6 @@
               </a:rPr>
               <a:t> as CT-Reconstruction algorithm</a:t>
             </a:r>
-            <a:endParaRPr lang="en-US" altLang="de-DE" kern="0" dirty="0" smtClean="0">
-              <a:latin typeface="Univers Light" pitchFamily="-84" charset="0"/>
-            </a:endParaRPr>
           </a:p>
         </p:txBody>
       </p:sp>
@@ -5889,14 +7013,14 @@
           <a:effectLst/>
           <a:extLst>
             <a:ext uri="{909E8E84-426E-40dd-AFC4-6F175D3DCCD1}">
-              <a14:hiddenFill xmlns:a14="http://schemas.microsoft.com/office/drawing/2010/main" xmlns="">
+              <a14:hiddenFill xmlns="" xmlns:a14="http://schemas.microsoft.com/office/drawing/2010/main">
                 <a:solidFill>
                   <a:schemeClr val="accent1"/>
                 </a:solidFill>
               </a14:hiddenFill>
             </a:ext>
             <a:ext uri="{91240B29-F687-4f45-9708-019B960494DF}">
-              <a14:hiddenLine xmlns:a14="http://schemas.microsoft.com/office/drawing/2010/main" xmlns="" w="9525" cap="flat" cmpd="sng" algn="ctr">
+              <a14:hiddenLine xmlns="" xmlns:a14="http://schemas.microsoft.com/office/drawing/2010/main" w="9525" cap="flat" cmpd="sng" algn="ctr">
                 <a:solidFill>
                   <a:schemeClr val="tx1"/>
                 </a:solidFill>
@@ -5907,7 +7031,7 @@
               </a14:hiddenLine>
             </a:ext>
             <a:ext uri="{AF507438-7753-43e0-B8FC-AC1667EBCBE1}">
-              <a14:hiddenEffects xmlns:a14="http://schemas.microsoft.com/office/drawing/2010/main" xmlns="">
+              <a14:hiddenEffects xmlns="" xmlns:a14="http://schemas.microsoft.com/office/drawing/2010/main">
                 <a:effectLst>
                   <a:outerShdw blurRad="63500" dist="35921" dir="2700000" algn="ctr" rotWithShape="0">
                     <a:schemeClr val="bg2"/>
@@ -5979,14 +7103,14 @@
           </a:ln>
           <a:extLst>
             <a:ext uri="{909E8E84-426E-40dd-AFC4-6F175D3DCCD1}">
-              <a14:hiddenFill xmlns:a14="http://schemas.microsoft.com/office/drawing/2010/main" xmlns="">
+              <a14:hiddenFill xmlns="" xmlns:a14="http://schemas.microsoft.com/office/drawing/2010/main">
                 <a:solidFill>
                   <a:schemeClr val="accent1"/>
                 </a:solidFill>
               </a14:hiddenFill>
             </a:ext>
             <a:ext uri="{91240B29-F687-4f45-9708-019B960494DF}">
-              <a14:hiddenLine xmlns:a14="http://schemas.microsoft.com/office/drawing/2010/main" xmlns="" w="9525" cap="flat" cmpd="sng" algn="ctr">
+              <a14:hiddenLine xmlns="" xmlns:a14="http://schemas.microsoft.com/office/drawing/2010/main" w="9525" cap="flat" cmpd="sng" algn="ctr">
                 <a:solidFill>
                   <a:schemeClr val="tx1"/>
                 </a:solidFill>
@@ -5997,7 +7121,7 @@
               </a14:hiddenLine>
             </a:ext>
             <a:ext uri="{AF507438-7753-43e0-B8FC-AC1667EBCBE1}">
-              <a14:hiddenEffects xmlns:a14="http://schemas.microsoft.com/office/drawing/2010/main" xmlns="">
+              <a14:hiddenEffects xmlns="" xmlns:a14="http://schemas.microsoft.com/office/drawing/2010/main">
                 <a:effectLst>
                   <a:outerShdw blurRad="63500" dist="35921" dir="2700000" algn="ctr" rotWithShape="0">
                     <a:schemeClr val="bg2"/>
@@ -6211,14 +7335,14 @@
           </a:ln>
           <a:extLst>
             <a:ext uri="{909E8E84-426E-40dd-AFC4-6F175D3DCCD1}">
-              <a14:hiddenFill xmlns:a14="http://schemas.microsoft.com/office/drawing/2010/main" xmlns="">
+              <a14:hiddenFill xmlns="" xmlns:a14="http://schemas.microsoft.com/office/drawing/2010/main">
                 <a:solidFill>
                   <a:schemeClr val="accent1"/>
                 </a:solidFill>
               </a14:hiddenFill>
             </a:ext>
             <a:ext uri="{91240B29-F687-4f45-9708-019B960494DF}">
-              <a14:hiddenLine xmlns:a14="http://schemas.microsoft.com/office/drawing/2010/main" xmlns="" w="9525" cap="flat" cmpd="sng" algn="ctr">
+              <a14:hiddenLine xmlns="" xmlns:a14="http://schemas.microsoft.com/office/drawing/2010/main" w="9525" cap="flat" cmpd="sng" algn="ctr">
                 <a:solidFill>
                   <a:schemeClr val="tx1"/>
                 </a:solidFill>
@@ -6229,7 +7353,7 @@
               </a14:hiddenLine>
             </a:ext>
             <a:ext uri="{AF507438-7753-43e0-B8FC-AC1667EBCBE1}">
-              <a14:hiddenEffects xmlns:a14="http://schemas.microsoft.com/office/drawing/2010/main" xmlns="">
+              <a14:hiddenEffects xmlns="" xmlns:a14="http://schemas.microsoft.com/office/drawing/2010/main">
                 <a:effectLst>
                   <a:outerShdw blurRad="63500" dist="35921" dir="2700000" algn="ctr" rotWithShape="0">
                     <a:schemeClr val="bg2"/>
@@ -6386,14 +7510,14 @@
           <a:effectLst/>
           <a:extLst>
             <a:ext uri="{909E8E84-426E-40dd-AFC4-6F175D3DCCD1}">
-              <a14:hiddenFill xmlns:a14="http://schemas.microsoft.com/office/drawing/2010/main" xmlns="">
+              <a14:hiddenFill xmlns="" xmlns:a14="http://schemas.microsoft.com/office/drawing/2010/main">
                 <a:solidFill>
                   <a:schemeClr val="accent1"/>
                 </a:solidFill>
               </a14:hiddenFill>
             </a:ext>
             <a:ext uri="{91240B29-F687-4f45-9708-019B960494DF}">
-              <a14:hiddenLine xmlns:a14="http://schemas.microsoft.com/office/drawing/2010/main" xmlns="" w="9525" cap="flat" cmpd="sng" algn="ctr">
+              <a14:hiddenLine xmlns="" xmlns:a14="http://schemas.microsoft.com/office/drawing/2010/main" w="9525" cap="flat" cmpd="sng" algn="ctr">
                 <a:solidFill>
                   <a:schemeClr val="tx1"/>
                 </a:solidFill>
@@ -6404,7 +7528,7 @@
               </a14:hiddenLine>
             </a:ext>
             <a:ext uri="{AF507438-7753-43e0-B8FC-AC1667EBCBE1}">
-              <a14:hiddenEffects xmlns:a14="http://schemas.microsoft.com/office/drawing/2010/main" xmlns="">
+              <a14:hiddenEffects xmlns="" xmlns:a14="http://schemas.microsoft.com/office/drawing/2010/main">
                 <a:effectLst>
                   <a:outerShdw blurRad="63500" dist="35921" dir="2700000" algn="ctr" rotWithShape="0">
                     <a:schemeClr val="bg2"/>
@@ -6508,6 +7632,13 @@
   <p:clrMapOvr>
     <a:masterClrMapping/>
   </p:clrMapOvr>
+  <p:timing>
+    <p:tnLst>
+      <p:par>
+        <p:cTn id="1" dur="indefinite" restart="never" nodeType="tmRoot"/>
+      </p:par>
+    </p:tnLst>
+  </p:timing>
 </p:sld>
 </file>
 
@@ -6573,6 +7704,13 @@
   <p:clrMapOvr>
     <a:masterClrMapping/>
   </p:clrMapOvr>
+  <p:timing>
+    <p:tnLst>
+      <p:par>
+        <p:cTn id="1" dur="indefinite" restart="never" nodeType="tmRoot"/>
+      </p:par>
+    </p:tnLst>
+  </p:timing>
 </p:sld>
 </file>
 
@@ -6634,7 +7772,19 @@
             </a:r>
             <a:r>
               <a:rPr lang="de-DE" dirty="0" smtClean="0"/>
-              <a:t> time</a:t>
+              <a:t> </a:t>
+            </a:r>
+            <a:r>
+              <a:rPr lang="de-DE" dirty="0" smtClean="0"/>
+              <a:t>time (16 </a:t>
+            </a:r>
+            <a:r>
+              <a:rPr lang="de-DE" dirty="0" err="1" smtClean="0"/>
+              <a:t>cores</a:t>
+            </a:r>
+            <a:r>
+              <a:rPr lang="de-DE" dirty="0" smtClean="0"/>
+              <a:t>)</a:t>
             </a:r>
             <a:endParaRPr lang="de-DE" dirty="0"/>
           </a:p>
@@ -6688,14 +7838,14 @@
           <a:effectLst/>
           <a:extLst>
             <a:ext uri="{909E8E84-426E-40dd-AFC4-6F175D3DCCD1}">
-              <a14:hiddenFill xmlns:a14="http://schemas.microsoft.com/office/drawing/2010/main" xmlns="">
+              <a14:hiddenFill xmlns="" xmlns:a14="http://schemas.microsoft.com/office/drawing/2010/main">
                 <a:solidFill>
                   <a:schemeClr val="accent1"/>
                 </a:solidFill>
               </a14:hiddenFill>
             </a:ext>
             <a:ext uri="{91240B29-F687-4f45-9708-019B960494DF}">
-              <a14:hiddenLine xmlns:a14="http://schemas.microsoft.com/office/drawing/2010/main" xmlns="" w="9525">
+              <a14:hiddenLine xmlns="" xmlns:a14="http://schemas.microsoft.com/office/drawing/2010/main" w="9525">
                 <a:solidFill>
                   <a:schemeClr val="tx1"/>
                 </a:solidFill>
@@ -6705,7 +7855,7 @@
               </a14:hiddenLine>
             </a:ext>
             <a:ext uri="{AF507438-7753-43e0-B8FC-AC1667EBCBE1}">
-              <a14:hiddenEffects xmlns:a14="http://schemas.microsoft.com/office/drawing/2010/main" xmlns="">
+              <a14:hiddenEffects xmlns="" xmlns:a14="http://schemas.microsoft.com/office/drawing/2010/main">
                 <a:effectLst>
                   <a:outerShdw blurRad="63500" dist="38099" dir="2700000" algn="ctr" rotWithShape="0">
                     <a:schemeClr val="bg2">
@@ -6716,7 +7866,7 @@
               </a14:hiddenEffects>
             </a:ext>
             <a:ext uri="{FAA26D3D-D897-4be2-8F04-BA451C77F1D7}">
-              <ma14:placeholderFlag xmlns:ma14="http://schemas.microsoft.com/office/mac/drawingml/2011/main" xmlns="" val="1"/>
+              <ma14:placeholderFlag xmlns="" xmlns:ma14="http://schemas.microsoft.com/office/mac/drawingml/2011/main" val="1"/>
             </a:ext>
           </a:extLst>
         </p:spPr>
@@ -6930,6 +8080,13 @@
   <p:clrMapOvr>
     <a:masterClrMapping/>
   </p:clrMapOvr>
+  <p:timing>
+    <p:tnLst>
+      <p:par>
+        <p:cTn id="1" dur="indefinite" restart="never" nodeType="tmRoot"/>
+      </p:par>
+    </p:tnLst>
+  </p:timing>
 </p:sld>
 </file>
 
@@ -6973,25 +8130,30 @@
           </a:p>
         </p:txBody>
       </p:sp>
-      <p:sp>
-        <p:nvSpPr>
-          <p:cNvPr id="3" name="Inhaltsplatzhalter 2"/>
-          <p:cNvSpPr>
-            <a:spLocks noGrp="1"/>
-          </p:cNvSpPr>
+      <p:graphicFrame>
+        <p:nvGraphicFramePr>
+          <p:cNvPr id="5" name="Diagramm 4"/>
+          <p:cNvGraphicFramePr>
+            <a:graphicFrameLocks/>
+          </p:cNvGraphicFramePr>
           <p:nvPr>
-            <p:ph idx="1"/>
+            <p:extLst>
+              <p:ext uri="{D42A27DB-BD31-4B8C-83A1-F6EECF244321}">
+                <p14:modId xmlns:p14="http://schemas.microsoft.com/office/powerpoint/2010/main" val="3553514911"/>
+              </p:ext>
+            </p:extLst>
           </p:nvPr>
-        </p:nvSpPr>
-        <p:spPr/>
-        <p:txBody>
-          <a:bodyPr/>
-          <a:lstStyle/>
-          <a:p>
-            <a:endParaRPr lang="de-DE"/>
-          </a:p>
-        </p:txBody>
-      </p:sp>
+        </p:nvGraphicFramePr>
+        <p:xfrm>
+          <a:off x="251520" y="692696"/>
+          <a:ext cx="8712968" cy="5544616"/>
+        </p:xfrm>
+        <a:graphic>
+          <a:graphicData uri="http://schemas.openxmlformats.org/drawingml/2006/chart">
+            <c:chart xmlns:c="http://schemas.openxmlformats.org/drawingml/2006/chart" xmlns:r="http://schemas.openxmlformats.org/officeDocument/2006/relationships" r:id="rId2"/>
+          </a:graphicData>
+        </a:graphic>
+      </p:graphicFrame>
     </p:spTree>
     <p:extLst>
       <p:ext uri="{BB962C8B-B14F-4D97-AF65-F5344CB8AC3E}">
@@ -7002,6 +8164,13 @@
   <p:clrMapOvr>
     <a:masterClrMapping/>
   </p:clrMapOvr>
+  <p:timing>
+    <p:tnLst>
+      <p:par>
+        <p:cTn id="1" dur="indefinite" restart="never" nodeType="tmRoot"/>
+      </p:par>
+    </p:tnLst>
+  </p:timing>
 </p:sld>
 </file>
 
@@ -7235,14 +8404,14 @@
           <a:effectLst/>
           <a:extLst>
             <a:ext uri="{909E8E84-426E-40dd-AFC4-6F175D3DCCD1}">
-              <a14:hiddenFill xmlns:a14="http://schemas.microsoft.com/office/drawing/2010/main" xmlns="">
+              <a14:hiddenFill xmlns="" xmlns:a14="http://schemas.microsoft.com/office/drawing/2010/main">
                 <a:solidFill>
                   <a:schemeClr val="accent1"/>
                 </a:solidFill>
               </a14:hiddenFill>
             </a:ext>
             <a:ext uri="{91240B29-F687-4f45-9708-019B960494DF}">
-              <a14:hiddenLine xmlns:a14="http://schemas.microsoft.com/office/drawing/2010/main" xmlns="" w="9525">
+              <a14:hiddenLine xmlns="" xmlns:a14="http://schemas.microsoft.com/office/drawing/2010/main" w="9525">
                 <a:solidFill>
                   <a:schemeClr val="tx1"/>
                 </a:solidFill>
@@ -7252,7 +8421,7 @@
               </a14:hiddenLine>
             </a:ext>
             <a:ext uri="{AF507438-7753-43e0-B8FC-AC1667EBCBE1}">
-              <a14:hiddenEffects xmlns:a14="http://schemas.microsoft.com/office/drawing/2010/main" xmlns="">
+              <a14:hiddenEffects xmlns="" xmlns:a14="http://schemas.microsoft.com/office/drawing/2010/main">
                 <a:effectLst>
                   <a:outerShdw blurRad="63500" dist="38099" dir="2700000" algn="ctr" rotWithShape="0">
                     <a:schemeClr val="bg2">
@@ -7673,14 +8842,14 @@
           <a:effectLst/>
           <a:extLst>
             <a:ext uri="{909E8E84-426E-40dd-AFC4-6F175D3DCCD1}">
-              <a14:hiddenFill xmlns:a14="http://schemas.microsoft.com/office/drawing/2010/main" xmlns="">
+              <a14:hiddenFill xmlns="" xmlns:a14="http://schemas.microsoft.com/office/drawing/2010/main">
                 <a:solidFill>
                   <a:schemeClr val="accent1"/>
                 </a:solidFill>
               </a14:hiddenFill>
             </a:ext>
             <a:ext uri="{91240B29-F687-4f45-9708-019B960494DF}">
-              <a14:hiddenLine xmlns:a14="http://schemas.microsoft.com/office/drawing/2010/main" xmlns="" w="9525">
+              <a14:hiddenLine xmlns="" xmlns:a14="http://schemas.microsoft.com/office/drawing/2010/main" w="9525">
                 <a:solidFill>
                   <a:schemeClr val="tx1"/>
                 </a:solidFill>
@@ -7690,7 +8859,7 @@
               </a14:hiddenLine>
             </a:ext>
             <a:ext uri="{AF507438-7753-43e0-B8FC-AC1667EBCBE1}">
-              <a14:hiddenEffects xmlns:a14="http://schemas.microsoft.com/office/drawing/2010/main" xmlns="">
+              <a14:hiddenEffects xmlns="" xmlns:a14="http://schemas.microsoft.com/office/drawing/2010/main">
                 <a:effectLst>
                   <a:outerShdw blurRad="63500" dist="38099" dir="2700000" algn="ctr" rotWithShape="0">
                     <a:schemeClr val="bg2">
@@ -7986,14 +9155,14 @@
           <a:effectLst/>
           <a:extLst>
             <a:ext uri="{909E8E84-426E-40dd-AFC4-6F175D3DCCD1}">
-              <a14:hiddenFill xmlns:a14="http://schemas.microsoft.com/office/drawing/2010/main" xmlns="">
+              <a14:hiddenFill xmlns="" xmlns:a14="http://schemas.microsoft.com/office/drawing/2010/main">
                 <a:solidFill>
                   <a:schemeClr val="accent1"/>
                 </a:solidFill>
               </a14:hiddenFill>
             </a:ext>
             <a:ext uri="{91240B29-F687-4f45-9708-019B960494DF}">
-              <a14:hiddenLine xmlns:a14="http://schemas.microsoft.com/office/drawing/2010/main" xmlns="" w="9525">
+              <a14:hiddenLine xmlns="" xmlns:a14="http://schemas.microsoft.com/office/drawing/2010/main" w="9525">
                 <a:solidFill>
                   <a:schemeClr val="tx1"/>
                 </a:solidFill>
@@ -8003,7 +9172,7 @@
               </a14:hiddenLine>
             </a:ext>
             <a:ext uri="{AF507438-7753-43e0-B8FC-AC1667EBCBE1}">
-              <a14:hiddenEffects xmlns:a14="http://schemas.microsoft.com/office/drawing/2010/main" xmlns="">
+              <a14:hiddenEffects xmlns="" xmlns:a14="http://schemas.microsoft.com/office/drawing/2010/main">
                 <a:effectLst>
                   <a:outerShdw blurRad="63500" dist="38099" dir="2700000" algn="ctr" rotWithShape="0">
                     <a:schemeClr val="bg2">
@@ -8164,14 +9333,14 @@
           <a:effectLst/>
           <a:extLst>
             <a:ext uri="{909E8E84-426E-40dd-AFC4-6F175D3DCCD1}">
-              <a14:hiddenFill xmlns:a14="http://schemas.microsoft.com/office/drawing/2010/main" xmlns="">
+              <a14:hiddenFill xmlns="" xmlns:a14="http://schemas.microsoft.com/office/drawing/2010/main">
                 <a:solidFill>
                   <a:schemeClr val="accent1"/>
                 </a:solidFill>
               </a14:hiddenFill>
             </a:ext>
             <a:ext uri="{91240B29-F687-4f45-9708-019B960494DF}">
-              <a14:hiddenLine xmlns:a14="http://schemas.microsoft.com/office/drawing/2010/main" xmlns="" w="9525">
+              <a14:hiddenLine xmlns="" xmlns:a14="http://schemas.microsoft.com/office/drawing/2010/main" w="9525">
                 <a:solidFill>
                   <a:schemeClr val="tx1"/>
                 </a:solidFill>
@@ -8181,7 +9350,7 @@
               </a14:hiddenLine>
             </a:ext>
             <a:ext uri="{AF507438-7753-43e0-B8FC-AC1667EBCBE1}">
-              <a14:hiddenEffects xmlns:a14="http://schemas.microsoft.com/office/drawing/2010/main" xmlns="">
+              <a14:hiddenEffects xmlns="" xmlns:a14="http://schemas.microsoft.com/office/drawing/2010/main">
                 <a:effectLst>
                   <a:outerShdw blurRad="63500" dist="38099" dir="2700000" algn="ctr" rotWithShape="0">
                     <a:schemeClr val="bg2">
@@ -8373,14 +9542,14 @@
           <a:effectLst/>
           <a:extLst>
             <a:ext uri="{909E8E84-426E-40dd-AFC4-6F175D3DCCD1}">
-              <a14:hiddenFill xmlns:a14="http://schemas.microsoft.com/office/drawing/2010/main" xmlns="">
+              <a14:hiddenFill xmlns="" xmlns:a14="http://schemas.microsoft.com/office/drawing/2010/main">
                 <a:solidFill>
                   <a:schemeClr val="accent1"/>
                 </a:solidFill>
               </a14:hiddenFill>
             </a:ext>
             <a:ext uri="{91240B29-F687-4f45-9708-019B960494DF}">
-              <a14:hiddenLine xmlns:a14="http://schemas.microsoft.com/office/drawing/2010/main" xmlns="" w="9525">
+              <a14:hiddenLine xmlns="" xmlns:a14="http://schemas.microsoft.com/office/drawing/2010/main" w="9525">
                 <a:solidFill>
                   <a:schemeClr val="tx1"/>
                 </a:solidFill>
@@ -8390,7 +9559,7 @@
               </a14:hiddenLine>
             </a:ext>
             <a:ext uri="{AF507438-7753-43e0-B8FC-AC1667EBCBE1}">
-              <a14:hiddenEffects xmlns:a14="http://schemas.microsoft.com/office/drawing/2010/main" xmlns="">
+              <a14:hiddenEffects xmlns="" xmlns:a14="http://schemas.microsoft.com/office/drawing/2010/main">
                 <a:effectLst>
                   <a:outerShdw blurRad="63500" dist="38099" dir="2700000" algn="ctr" rotWithShape="0">
                     <a:schemeClr val="bg2">
@@ -8455,14 +9624,14 @@
           <a:effectLst/>
           <a:extLst>
             <a:ext uri="{909E8E84-426E-40dd-AFC4-6F175D3DCCD1}">
-              <a14:hiddenFill xmlns:a14="http://schemas.microsoft.com/office/drawing/2010/main" xmlns="">
+              <a14:hiddenFill xmlns="" xmlns:a14="http://schemas.microsoft.com/office/drawing/2010/main">
                 <a:solidFill>
                   <a:schemeClr val="accent1"/>
                 </a:solidFill>
               </a14:hiddenFill>
             </a:ext>
             <a:ext uri="{91240B29-F687-4f45-9708-019B960494DF}">
-              <a14:hiddenLine xmlns:a14="http://schemas.microsoft.com/office/drawing/2010/main" xmlns="" w="9525">
+              <a14:hiddenLine xmlns="" xmlns:a14="http://schemas.microsoft.com/office/drawing/2010/main" w="9525">
                 <a:solidFill>
                   <a:schemeClr val="tx1"/>
                 </a:solidFill>
@@ -8472,7 +9641,7 @@
               </a14:hiddenLine>
             </a:ext>
             <a:ext uri="{AF507438-7753-43e0-B8FC-AC1667EBCBE1}">
-              <a14:hiddenEffects xmlns:a14="http://schemas.microsoft.com/office/drawing/2010/main" xmlns="">
+              <a14:hiddenEffects xmlns="" xmlns:a14="http://schemas.microsoft.com/office/drawing/2010/main">
                 <a:effectLst>
                   <a:outerShdw blurRad="63500" dist="38099" dir="2700000" algn="ctr" rotWithShape="0">
                     <a:schemeClr val="bg2">
@@ -8483,7 +9652,7 @@
               </a14:hiddenEffects>
             </a:ext>
             <a:ext uri="{FAA26D3D-D897-4be2-8F04-BA451C77F1D7}">
-              <ma14:placeholderFlag xmlns:ma14="http://schemas.microsoft.com/office/mac/drawingml/2011/main" xmlns="" val="1"/>
+              <ma14:placeholderFlag xmlns="" xmlns:ma14="http://schemas.microsoft.com/office/mac/drawingml/2011/main" val="1"/>
             </a:ext>
           </a:extLst>
         </p:spPr>
@@ -8794,14 +9963,14 @@
           </a:ln>
           <a:extLst>
             <a:ext uri="{909E8E84-426E-40dd-AFC4-6F175D3DCCD1}">
-              <a14:hiddenFill xmlns:a14="http://schemas.microsoft.com/office/drawing/2010/main" xmlns="">
+              <a14:hiddenFill xmlns="" xmlns:a14="http://schemas.microsoft.com/office/drawing/2010/main">
                 <a:solidFill>
                   <a:schemeClr val="accent1"/>
                 </a:solidFill>
               </a14:hiddenFill>
             </a:ext>
             <a:ext uri="{91240B29-F687-4f45-9708-019B960494DF}">
-              <a14:hiddenLine xmlns:a14="http://schemas.microsoft.com/office/drawing/2010/main" xmlns="" w="9525" cap="flat" cmpd="sng" algn="ctr">
+              <a14:hiddenLine xmlns="" xmlns:a14="http://schemas.microsoft.com/office/drawing/2010/main" w="9525" cap="flat" cmpd="sng" algn="ctr">
                 <a:solidFill>
                   <a:schemeClr val="tx1"/>
                 </a:solidFill>
@@ -8812,7 +9981,7 @@
               </a14:hiddenLine>
             </a:ext>
             <a:ext uri="{AF507438-7753-43e0-B8FC-AC1667EBCBE1}">
-              <a14:hiddenEffects xmlns:a14="http://schemas.microsoft.com/office/drawing/2010/main" xmlns="">
+              <a14:hiddenEffects xmlns="" xmlns:a14="http://schemas.microsoft.com/office/drawing/2010/main">
                 <a:effectLst>
                   <a:outerShdw blurRad="63500" dist="35921" dir="2700000" algn="ctr" rotWithShape="0">
                     <a:schemeClr val="bg2"/>
@@ -8858,14 +10027,14 @@
           </a:ln>
           <a:extLst>
             <a:ext uri="{909E8E84-426E-40dd-AFC4-6F175D3DCCD1}">
-              <a14:hiddenFill xmlns:a14="http://schemas.microsoft.com/office/drawing/2010/main" xmlns="">
+              <a14:hiddenFill xmlns="" xmlns:a14="http://schemas.microsoft.com/office/drawing/2010/main">
                 <a:solidFill>
                   <a:schemeClr val="accent1"/>
                 </a:solidFill>
               </a14:hiddenFill>
             </a:ext>
             <a:ext uri="{91240B29-F687-4f45-9708-019B960494DF}">
-              <a14:hiddenLine xmlns:a14="http://schemas.microsoft.com/office/drawing/2010/main" xmlns="" w="9525" cap="flat" cmpd="sng" algn="ctr">
+              <a14:hiddenLine xmlns="" xmlns:a14="http://schemas.microsoft.com/office/drawing/2010/main" w="9525" cap="flat" cmpd="sng" algn="ctr">
                 <a:solidFill>
                   <a:schemeClr val="tx1"/>
                 </a:solidFill>
@@ -8876,7 +10045,7 @@
               </a14:hiddenLine>
             </a:ext>
             <a:ext uri="{AF507438-7753-43e0-B8FC-AC1667EBCBE1}">
-              <a14:hiddenEffects xmlns:a14="http://schemas.microsoft.com/office/drawing/2010/main" xmlns="">
+              <a14:hiddenEffects xmlns="" xmlns:a14="http://schemas.microsoft.com/office/drawing/2010/main">
                 <a:effectLst>
                   <a:outerShdw blurRad="63500" dist="35921" dir="2700000" algn="ctr" rotWithShape="0">
                     <a:schemeClr val="bg2"/>
@@ -8922,14 +10091,14 @@
           </a:ln>
           <a:extLst>
             <a:ext uri="{909E8E84-426E-40dd-AFC4-6F175D3DCCD1}">
-              <a14:hiddenFill xmlns:a14="http://schemas.microsoft.com/office/drawing/2010/main" xmlns="">
+              <a14:hiddenFill xmlns="" xmlns:a14="http://schemas.microsoft.com/office/drawing/2010/main">
                 <a:solidFill>
                   <a:schemeClr val="accent1"/>
                 </a:solidFill>
               </a14:hiddenFill>
             </a:ext>
             <a:ext uri="{91240B29-F687-4f45-9708-019B960494DF}">
-              <a14:hiddenLine xmlns:a14="http://schemas.microsoft.com/office/drawing/2010/main" xmlns="" w="9525" cap="flat" cmpd="sng" algn="ctr">
+              <a14:hiddenLine xmlns="" xmlns:a14="http://schemas.microsoft.com/office/drawing/2010/main" w="9525" cap="flat" cmpd="sng" algn="ctr">
                 <a:solidFill>
                   <a:schemeClr val="tx1"/>
                 </a:solidFill>
@@ -8940,7 +10109,7 @@
               </a14:hiddenLine>
             </a:ext>
             <a:ext uri="{AF507438-7753-43e0-B8FC-AC1667EBCBE1}">
-              <a14:hiddenEffects xmlns:a14="http://schemas.microsoft.com/office/drawing/2010/main" xmlns="">
+              <a14:hiddenEffects xmlns="" xmlns:a14="http://schemas.microsoft.com/office/drawing/2010/main">
                 <a:effectLst>
                   <a:outerShdw blurRad="63500" dist="35921" dir="2700000" algn="ctr" rotWithShape="0">
                     <a:schemeClr val="bg2"/>
@@ -8986,14 +10155,14 @@
           </a:ln>
           <a:extLst>
             <a:ext uri="{909E8E84-426E-40dd-AFC4-6F175D3DCCD1}">
-              <a14:hiddenFill xmlns:a14="http://schemas.microsoft.com/office/drawing/2010/main" xmlns="">
+              <a14:hiddenFill xmlns="" xmlns:a14="http://schemas.microsoft.com/office/drawing/2010/main">
                 <a:solidFill>
                   <a:schemeClr val="accent1"/>
                 </a:solidFill>
               </a14:hiddenFill>
             </a:ext>
             <a:ext uri="{91240B29-F687-4f45-9708-019B960494DF}">
-              <a14:hiddenLine xmlns:a14="http://schemas.microsoft.com/office/drawing/2010/main" xmlns="" w="9525" cap="flat" cmpd="sng" algn="ctr">
+              <a14:hiddenLine xmlns="" xmlns:a14="http://schemas.microsoft.com/office/drawing/2010/main" w="9525" cap="flat" cmpd="sng" algn="ctr">
                 <a:solidFill>
                   <a:schemeClr val="tx1"/>
                 </a:solidFill>
@@ -9004,7 +10173,7 @@
               </a14:hiddenLine>
             </a:ext>
             <a:ext uri="{AF507438-7753-43e0-B8FC-AC1667EBCBE1}">
-              <a14:hiddenEffects xmlns:a14="http://schemas.microsoft.com/office/drawing/2010/main" xmlns="">
+              <a14:hiddenEffects xmlns="" xmlns:a14="http://schemas.microsoft.com/office/drawing/2010/main">
                 <a:effectLst>
                   <a:outerShdw blurRad="63500" dist="35921" dir="2700000" algn="ctr" rotWithShape="0">
                     <a:schemeClr val="bg2"/>
@@ -9159,14 +10328,14 @@
           <a:effectLst/>
           <a:extLst>
             <a:ext uri="{909E8E84-426E-40dd-AFC4-6F175D3DCCD1}">
-              <a14:hiddenFill xmlns:a14="http://schemas.microsoft.com/office/drawing/2010/main" xmlns="">
+              <a14:hiddenFill xmlns="" xmlns:a14="http://schemas.microsoft.com/office/drawing/2010/main">
                 <a:solidFill>
                   <a:schemeClr val="accent1"/>
                 </a:solidFill>
               </a14:hiddenFill>
             </a:ext>
             <a:ext uri="{91240B29-F687-4f45-9708-019B960494DF}">
-              <a14:hiddenLine xmlns:a14="http://schemas.microsoft.com/office/drawing/2010/main" xmlns="" w="9525">
+              <a14:hiddenLine xmlns="" xmlns:a14="http://schemas.microsoft.com/office/drawing/2010/main" w="9525">
                 <a:solidFill>
                   <a:schemeClr val="tx1"/>
                 </a:solidFill>
@@ -9176,7 +10345,7 @@
               </a14:hiddenLine>
             </a:ext>
             <a:ext uri="{AF507438-7753-43e0-B8FC-AC1667EBCBE1}">
-              <a14:hiddenEffects xmlns:a14="http://schemas.microsoft.com/office/drawing/2010/main" xmlns="">
+              <a14:hiddenEffects xmlns="" xmlns:a14="http://schemas.microsoft.com/office/drawing/2010/main">
                 <a:effectLst>
                   <a:outerShdw blurRad="63500" dist="38099" dir="2700000" algn="ctr" rotWithShape="0">
                     <a:schemeClr val="bg2">
@@ -9402,14 +10571,14 @@
           <a:effectLst/>
           <a:extLst>
             <a:ext uri="{909E8E84-426E-40dd-AFC4-6F175D3DCCD1}">
-              <a14:hiddenFill xmlns:a14="http://schemas.microsoft.com/office/drawing/2010/main" xmlns="">
+              <a14:hiddenFill xmlns="" xmlns:a14="http://schemas.microsoft.com/office/drawing/2010/main">
                 <a:solidFill>
                   <a:schemeClr val="accent1"/>
                 </a:solidFill>
               </a14:hiddenFill>
             </a:ext>
             <a:ext uri="{91240B29-F687-4f45-9708-019B960494DF}">
-              <a14:hiddenLine xmlns:a14="http://schemas.microsoft.com/office/drawing/2010/main" xmlns="" w="9525">
+              <a14:hiddenLine xmlns="" xmlns:a14="http://schemas.microsoft.com/office/drawing/2010/main" w="9525">
                 <a:solidFill>
                   <a:schemeClr val="tx1"/>
                 </a:solidFill>
@@ -9419,7 +10588,7 @@
               </a14:hiddenLine>
             </a:ext>
             <a:ext uri="{AF507438-7753-43e0-B8FC-AC1667EBCBE1}">
-              <a14:hiddenEffects xmlns:a14="http://schemas.microsoft.com/office/drawing/2010/main" xmlns="">
+              <a14:hiddenEffects xmlns="" xmlns:a14="http://schemas.microsoft.com/office/drawing/2010/main">
                 <a:effectLst>
                   <a:outerShdw blurRad="63500" dist="38099" dir="2700000" algn="ctr" rotWithShape="0">
                     <a:schemeClr val="bg2">
@@ -9633,14 +10802,14 @@
           <a:effectLst/>
           <a:extLst>
             <a:ext uri="{909E8E84-426E-40dd-AFC4-6F175D3DCCD1}">
-              <a14:hiddenFill xmlns:a14="http://schemas.microsoft.com/office/drawing/2010/main" xmlns="">
+              <a14:hiddenFill xmlns="" xmlns:a14="http://schemas.microsoft.com/office/drawing/2010/main">
                 <a:solidFill>
                   <a:schemeClr val="accent1"/>
                 </a:solidFill>
               </a14:hiddenFill>
             </a:ext>
             <a:ext uri="{91240B29-F687-4f45-9708-019B960494DF}">
-              <a14:hiddenLine xmlns:a14="http://schemas.microsoft.com/office/drawing/2010/main" xmlns="" w="9525">
+              <a14:hiddenLine xmlns="" xmlns:a14="http://schemas.microsoft.com/office/drawing/2010/main" w="9525">
                 <a:solidFill>
                   <a:schemeClr val="tx1"/>
                 </a:solidFill>
@@ -9650,7 +10819,7 @@
               </a14:hiddenLine>
             </a:ext>
             <a:ext uri="{AF507438-7753-43e0-B8FC-AC1667EBCBE1}">
-              <a14:hiddenEffects xmlns:a14="http://schemas.microsoft.com/office/drawing/2010/main" xmlns="">
+              <a14:hiddenEffects xmlns="" xmlns:a14="http://schemas.microsoft.com/office/drawing/2010/main">
                 <a:effectLst>
                   <a:outerShdw blurRad="63500" dist="38099" dir="2700000" algn="ctr" rotWithShape="0">
                     <a:schemeClr val="bg2">
@@ -9745,14 +10914,14 @@
           <a:effectLst/>
           <a:extLst>
             <a:ext uri="{909E8E84-426E-40dd-AFC4-6F175D3DCCD1}">
-              <a14:hiddenFill xmlns:a14="http://schemas.microsoft.com/office/drawing/2010/main" xmlns="">
+              <a14:hiddenFill xmlns="" xmlns:a14="http://schemas.microsoft.com/office/drawing/2010/main">
                 <a:solidFill>
                   <a:schemeClr val="accent1"/>
                 </a:solidFill>
               </a14:hiddenFill>
             </a:ext>
             <a:ext uri="{91240B29-F687-4f45-9708-019B960494DF}">
-              <a14:hiddenLine xmlns:a14="http://schemas.microsoft.com/office/drawing/2010/main" xmlns="" w="9525">
+              <a14:hiddenLine xmlns="" xmlns:a14="http://schemas.microsoft.com/office/drawing/2010/main" w="9525">
                 <a:solidFill>
                   <a:schemeClr val="tx1"/>
                 </a:solidFill>
@@ -9762,7 +10931,7 @@
               </a14:hiddenLine>
             </a:ext>
             <a:ext uri="{AF507438-7753-43e0-B8FC-AC1667EBCBE1}">
-              <a14:hiddenEffects xmlns:a14="http://schemas.microsoft.com/office/drawing/2010/main" xmlns="">
+              <a14:hiddenEffects xmlns="" xmlns:a14="http://schemas.microsoft.com/office/drawing/2010/main">
                 <a:effectLst>
                   <a:outerShdw blurRad="63500" dist="38099" dir="2700000" algn="ctr" rotWithShape="0">
                     <a:schemeClr val="bg2">
@@ -9773,7 +10942,7 @@
               </a14:hiddenEffects>
             </a:ext>
             <a:ext uri="{FAA26D3D-D897-4be2-8F04-BA451C77F1D7}">
-              <ma14:placeholderFlag xmlns:ma14="http://schemas.microsoft.com/office/mac/drawingml/2011/main" xmlns="" val="1"/>
+              <ma14:placeholderFlag xmlns="" xmlns:ma14="http://schemas.microsoft.com/office/mac/drawingml/2011/main" val="1"/>
             </a:ext>
           </a:extLst>
         </p:spPr>
@@ -10266,14 +11435,14 @@
         <a:effectLst/>
         <a:extLst>
           <a:ext uri="{909E8E84-426E-40dd-AFC4-6F175D3DCCD1}">
-            <a14:hiddenFill xmlns:a14="http://schemas.microsoft.com/office/drawing/2010/main" xmlns="">
+            <a14:hiddenFill xmlns="" xmlns:a14="http://schemas.microsoft.com/office/drawing/2010/main">
               <a:solidFill>
                 <a:schemeClr val="accent1"/>
               </a:solidFill>
             </a14:hiddenFill>
           </a:ext>
           <a:ext uri="{91240B29-F687-4f45-9708-019B960494DF}">
-            <a14:hiddenLine xmlns:a14="http://schemas.microsoft.com/office/drawing/2010/main" xmlns="" w="9525" cap="flat" cmpd="sng" algn="ctr">
+            <a14:hiddenLine xmlns="" xmlns:a14="http://schemas.microsoft.com/office/drawing/2010/main" w="9525" cap="flat" cmpd="sng" algn="ctr">
               <a:solidFill>
                 <a:schemeClr val="tx1"/>
               </a:solidFill>
@@ -10284,7 +11453,7 @@
             </a14:hiddenLine>
           </a:ext>
           <a:ext uri="{AF507438-7753-43e0-B8FC-AC1667EBCBE1}">
-            <a14:hiddenEffects xmlns:a14="http://schemas.microsoft.com/office/drawing/2010/main" xmlns="">
+            <a14:hiddenEffects xmlns="" xmlns:a14="http://schemas.microsoft.com/office/drawing/2010/main">
               <a:effectLst>
                 <a:outerShdw blurRad="63500" dist="35921" dir="2700000" algn="ctr" rotWithShape="0">
                   <a:schemeClr val="bg2"/>
@@ -10350,14 +11519,14 @@
         <a:effectLst/>
         <a:extLst>
           <a:ext uri="{909E8E84-426E-40dd-AFC4-6F175D3DCCD1}">
-            <a14:hiddenFill xmlns:a14="http://schemas.microsoft.com/office/drawing/2010/main" xmlns="">
+            <a14:hiddenFill xmlns="" xmlns:a14="http://schemas.microsoft.com/office/drawing/2010/main">
               <a:solidFill>
                 <a:schemeClr val="accent1"/>
               </a:solidFill>
             </a14:hiddenFill>
           </a:ext>
           <a:ext uri="{91240B29-F687-4f45-9708-019B960494DF}">
-            <a14:hiddenLine xmlns:a14="http://schemas.microsoft.com/office/drawing/2010/main" xmlns="" w="9525" cap="flat" cmpd="sng" algn="ctr">
+            <a14:hiddenLine xmlns="" xmlns:a14="http://schemas.microsoft.com/office/drawing/2010/main" w="9525" cap="flat" cmpd="sng" algn="ctr">
               <a:solidFill>
                 <a:schemeClr val="tx1"/>
               </a:solidFill>
@@ -10368,7 +11537,7 @@
             </a14:hiddenLine>
           </a:ext>
           <a:ext uri="{AF507438-7753-43e0-B8FC-AC1667EBCBE1}">
-            <a14:hiddenEffects xmlns:a14="http://schemas.microsoft.com/office/drawing/2010/main" xmlns="">
+            <a14:hiddenEffects xmlns="" xmlns:a14="http://schemas.microsoft.com/office/drawing/2010/main">
               <a:effectLst>
                 <a:outerShdw blurRad="63500" dist="35921" dir="2700000" algn="ctr" rotWithShape="0">
                   <a:schemeClr val="bg2"/>

</xml_diff>